<commit_message>
PPTX Commit and readme
</commit_message>
<xml_diff>
--- a/source/MySEProject/IMPLEMENT AND INVESTIGATE KNN - rookie_developer.pptx
+++ b/source/MySEProject/IMPLEMENT AND INVESTIGATE KNN - rookie_developer.pptx
@@ -3602,6 +3602,753 @@
 </dgm:colorsDef>
 </file>
 
+<file path=ppt/diagrams/colors5.xml><?xml version="1.0" encoding="utf-8"?>
+<dgm:colorsDef xmlns:dgm="http://schemas.openxmlformats.org/drawingml/2006/diagram" xmlns:a="http://schemas.openxmlformats.org/drawingml/2006/main" uniqueId="urn:microsoft.com/office/officeart/2005/8/colors/accent1_2">
+  <dgm:title val=""/>
+  <dgm:desc val=""/>
+  <dgm:catLst>
+    <dgm:cat type="accent1" pri="11200"/>
+  </dgm:catLst>
+  <dgm:styleLbl name="node0">
+    <dgm:fillClrLst meth="repeat">
+      <a:schemeClr val="accent1"/>
+    </dgm:fillClrLst>
+    <dgm:linClrLst meth="repeat">
+      <a:schemeClr val="lt1"/>
+    </dgm:linClrLst>
+    <dgm:effectClrLst/>
+    <dgm:txLinClrLst/>
+    <dgm:txFillClrLst/>
+    <dgm:txEffectClrLst/>
+  </dgm:styleLbl>
+  <dgm:styleLbl name="alignNode1">
+    <dgm:fillClrLst meth="repeat">
+      <a:schemeClr val="accent1"/>
+    </dgm:fillClrLst>
+    <dgm:linClrLst meth="repeat">
+      <a:schemeClr val="accent1"/>
+    </dgm:linClrLst>
+    <dgm:effectClrLst/>
+    <dgm:txLinClrLst/>
+    <dgm:txFillClrLst/>
+    <dgm:txEffectClrLst/>
+  </dgm:styleLbl>
+  <dgm:styleLbl name="node1">
+    <dgm:fillClrLst meth="repeat">
+      <a:schemeClr val="accent1"/>
+    </dgm:fillClrLst>
+    <dgm:linClrLst meth="repeat">
+      <a:schemeClr val="lt1"/>
+    </dgm:linClrLst>
+    <dgm:effectClrLst/>
+    <dgm:txLinClrLst/>
+    <dgm:txFillClrLst/>
+    <dgm:txEffectClrLst/>
+  </dgm:styleLbl>
+  <dgm:styleLbl name="lnNode1">
+    <dgm:fillClrLst meth="repeat">
+      <a:schemeClr val="accent1"/>
+    </dgm:fillClrLst>
+    <dgm:linClrLst meth="repeat">
+      <a:schemeClr val="lt1"/>
+    </dgm:linClrLst>
+    <dgm:effectClrLst/>
+    <dgm:txLinClrLst/>
+    <dgm:txFillClrLst/>
+    <dgm:txEffectClrLst/>
+  </dgm:styleLbl>
+  <dgm:styleLbl name="vennNode1">
+    <dgm:fillClrLst meth="repeat">
+      <a:schemeClr val="accent1">
+        <a:alpha val="50000"/>
+      </a:schemeClr>
+    </dgm:fillClrLst>
+    <dgm:linClrLst meth="repeat">
+      <a:schemeClr val="lt1"/>
+    </dgm:linClrLst>
+    <dgm:effectClrLst/>
+    <dgm:txLinClrLst/>
+    <dgm:txFillClrLst/>
+    <dgm:txEffectClrLst/>
+  </dgm:styleLbl>
+  <dgm:styleLbl name="node2">
+    <dgm:fillClrLst meth="repeat">
+      <a:schemeClr val="accent1"/>
+    </dgm:fillClrLst>
+    <dgm:linClrLst meth="repeat">
+      <a:schemeClr val="lt1"/>
+    </dgm:linClrLst>
+    <dgm:effectClrLst/>
+    <dgm:txLinClrLst/>
+    <dgm:txFillClrLst/>
+    <dgm:txEffectClrLst/>
+  </dgm:styleLbl>
+  <dgm:styleLbl name="node3">
+    <dgm:fillClrLst meth="repeat">
+      <a:schemeClr val="accent1"/>
+    </dgm:fillClrLst>
+    <dgm:linClrLst meth="repeat">
+      <a:schemeClr val="lt1"/>
+    </dgm:linClrLst>
+    <dgm:effectClrLst/>
+    <dgm:txLinClrLst/>
+    <dgm:txFillClrLst/>
+    <dgm:txEffectClrLst/>
+  </dgm:styleLbl>
+  <dgm:styleLbl name="node4">
+    <dgm:fillClrLst meth="repeat">
+      <a:schemeClr val="accent1"/>
+    </dgm:fillClrLst>
+    <dgm:linClrLst meth="repeat">
+      <a:schemeClr val="lt1"/>
+    </dgm:linClrLst>
+    <dgm:effectClrLst/>
+    <dgm:txLinClrLst/>
+    <dgm:txFillClrLst/>
+    <dgm:txEffectClrLst/>
+  </dgm:styleLbl>
+  <dgm:styleLbl name="fgImgPlace1">
+    <dgm:fillClrLst meth="repeat">
+      <a:schemeClr val="accent1">
+        <a:tint val="50000"/>
+      </a:schemeClr>
+    </dgm:fillClrLst>
+    <dgm:linClrLst meth="repeat">
+      <a:schemeClr val="lt1"/>
+    </dgm:linClrLst>
+    <dgm:effectClrLst/>
+    <dgm:txLinClrLst/>
+    <dgm:txFillClrLst meth="repeat">
+      <a:schemeClr val="lt1"/>
+    </dgm:txFillClrLst>
+    <dgm:txEffectClrLst/>
+  </dgm:styleLbl>
+  <dgm:styleLbl name="alignImgPlace1">
+    <dgm:fillClrLst meth="repeat">
+      <a:schemeClr val="accent1">
+        <a:tint val="50000"/>
+      </a:schemeClr>
+    </dgm:fillClrLst>
+    <dgm:linClrLst meth="repeat">
+      <a:schemeClr val="lt1"/>
+    </dgm:linClrLst>
+    <dgm:effectClrLst/>
+    <dgm:txLinClrLst/>
+    <dgm:txFillClrLst meth="repeat">
+      <a:schemeClr val="lt1"/>
+    </dgm:txFillClrLst>
+    <dgm:txEffectClrLst/>
+  </dgm:styleLbl>
+  <dgm:styleLbl name="bgImgPlace1">
+    <dgm:fillClrLst meth="repeat">
+      <a:schemeClr val="accent1">
+        <a:tint val="50000"/>
+      </a:schemeClr>
+    </dgm:fillClrLst>
+    <dgm:linClrLst meth="repeat">
+      <a:schemeClr val="lt1"/>
+    </dgm:linClrLst>
+    <dgm:effectClrLst/>
+    <dgm:txLinClrLst/>
+    <dgm:txFillClrLst meth="repeat">
+      <a:schemeClr val="lt1"/>
+    </dgm:txFillClrLst>
+    <dgm:txEffectClrLst/>
+  </dgm:styleLbl>
+  <dgm:styleLbl name="sibTrans2D1">
+    <dgm:fillClrLst meth="repeat">
+      <a:schemeClr val="accent1">
+        <a:tint val="60000"/>
+      </a:schemeClr>
+    </dgm:fillClrLst>
+    <dgm:linClrLst meth="repeat">
+      <a:schemeClr val="accent1">
+        <a:tint val="60000"/>
+      </a:schemeClr>
+    </dgm:linClrLst>
+    <dgm:effectClrLst/>
+    <dgm:txLinClrLst/>
+    <dgm:txFillClrLst/>
+    <dgm:txEffectClrLst/>
+  </dgm:styleLbl>
+  <dgm:styleLbl name="fgSibTrans2D1">
+    <dgm:fillClrLst meth="repeat">
+      <a:schemeClr val="accent1">
+        <a:tint val="60000"/>
+      </a:schemeClr>
+    </dgm:fillClrLst>
+    <dgm:linClrLst meth="repeat">
+      <a:schemeClr val="accent1">
+        <a:tint val="60000"/>
+      </a:schemeClr>
+    </dgm:linClrLst>
+    <dgm:effectClrLst/>
+    <dgm:txLinClrLst/>
+    <dgm:txFillClrLst/>
+    <dgm:txEffectClrLst/>
+  </dgm:styleLbl>
+  <dgm:styleLbl name="bgSibTrans2D1">
+    <dgm:fillClrLst meth="repeat">
+      <a:schemeClr val="accent1">
+        <a:tint val="60000"/>
+      </a:schemeClr>
+    </dgm:fillClrLst>
+    <dgm:linClrLst meth="repeat">
+      <a:schemeClr val="accent1">
+        <a:tint val="60000"/>
+      </a:schemeClr>
+    </dgm:linClrLst>
+    <dgm:effectClrLst/>
+    <dgm:txLinClrLst/>
+    <dgm:txFillClrLst/>
+    <dgm:txEffectClrLst/>
+  </dgm:styleLbl>
+  <dgm:styleLbl name="sibTrans1D1">
+    <dgm:fillClrLst meth="repeat">
+      <a:schemeClr val="accent1"/>
+    </dgm:fillClrLst>
+    <dgm:linClrLst meth="repeat">
+      <a:schemeClr val="accent1"/>
+    </dgm:linClrLst>
+    <dgm:effectClrLst/>
+    <dgm:txLinClrLst/>
+    <dgm:txFillClrLst meth="repeat">
+      <a:schemeClr val="tx1"/>
+    </dgm:txFillClrLst>
+    <dgm:txEffectClrLst/>
+  </dgm:styleLbl>
+  <dgm:styleLbl name="callout">
+    <dgm:fillClrLst meth="repeat">
+      <a:schemeClr val="accent1"/>
+    </dgm:fillClrLst>
+    <dgm:linClrLst meth="repeat">
+      <a:schemeClr val="accent1">
+        <a:tint val="50000"/>
+      </a:schemeClr>
+    </dgm:linClrLst>
+    <dgm:effectClrLst/>
+    <dgm:txLinClrLst/>
+    <dgm:txFillClrLst meth="repeat">
+      <a:schemeClr val="tx1"/>
+    </dgm:txFillClrLst>
+    <dgm:txEffectClrLst/>
+  </dgm:styleLbl>
+  <dgm:styleLbl name="asst0">
+    <dgm:fillClrLst meth="repeat">
+      <a:schemeClr val="accent1"/>
+    </dgm:fillClrLst>
+    <dgm:linClrLst meth="repeat">
+      <a:schemeClr val="lt1"/>
+    </dgm:linClrLst>
+    <dgm:effectClrLst/>
+    <dgm:txLinClrLst/>
+    <dgm:txFillClrLst/>
+    <dgm:txEffectClrLst/>
+  </dgm:styleLbl>
+  <dgm:styleLbl name="asst1">
+    <dgm:fillClrLst meth="repeat">
+      <a:schemeClr val="accent1"/>
+    </dgm:fillClrLst>
+    <dgm:linClrLst meth="repeat">
+      <a:schemeClr val="lt1"/>
+    </dgm:linClrLst>
+    <dgm:effectClrLst/>
+    <dgm:txLinClrLst/>
+    <dgm:txFillClrLst/>
+    <dgm:txEffectClrLst/>
+  </dgm:styleLbl>
+  <dgm:styleLbl name="asst2">
+    <dgm:fillClrLst meth="repeat">
+      <a:schemeClr val="accent1"/>
+    </dgm:fillClrLst>
+    <dgm:linClrLst meth="repeat">
+      <a:schemeClr val="lt1"/>
+    </dgm:linClrLst>
+    <dgm:effectClrLst/>
+    <dgm:txLinClrLst/>
+    <dgm:txFillClrLst/>
+    <dgm:txEffectClrLst/>
+  </dgm:styleLbl>
+  <dgm:styleLbl name="asst3">
+    <dgm:fillClrLst meth="repeat">
+      <a:schemeClr val="accent1"/>
+    </dgm:fillClrLst>
+    <dgm:linClrLst meth="repeat">
+      <a:schemeClr val="lt1"/>
+    </dgm:linClrLst>
+    <dgm:effectClrLst/>
+    <dgm:txLinClrLst/>
+    <dgm:txFillClrLst/>
+    <dgm:txEffectClrLst/>
+  </dgm:styleLbl>
+  <dgm:styleLbl name="asst4">
+    <dgm:fillClrLst meth="repeat">
+      <a:schemeClr val="accent1"/>
+    </dgm:fillClrLst>
+    <dgm:linClrLst meth="repeat">
+      <a:schemeClr val="lt1"/>
+    </dgm:linClrLst>
+    <dgm:effectClrLst/>
+    <dgm:txLinClrLst/>
+    <dgm:txFillClrLst/>
+    <dgm:txEffectClrLst/>
+  </dgm:styleLbl>
+  <dgm:styleLbl name="parChTrans2D1">
+    <dgm:fillClrLst meth="repeat">
+      <a:schemeClr val="accent1">
+        <a:tint val="60000"/>
+      </a:schemeClr>
+    </dgm:fillClrLst>
+    <dgm:linClrLst meth="repeat">
+      <a:schemeClr val="accent1">
+        <a:tint val="60000"/>
+      </a:schemeClr>
+    </dgm:linClrLst>
+    <dgm:effectClrLst/>
+    <dgm:txLinClrLst/>
+    <dgm:txFillClrLst meth="repeat">
+      <a:schemeClr val="lt1"/>
+    </dgm:txFillClrLst>
+    <dgm:txEffectClrLst/>
+  </dgm:styleLbl>
+  <dgm:styleLbl name="parChTrans2D2">
+    <dgm:fillClrLst meth="repeat">
+      <a:schemeClr val="accent1"/>
+    </dgm:fillClrLst>
+    <dgm:linClrLst meth="repeat">
+      <a:schemeClr val="accent1"/>
+    </dgm:linClrLst>
+    <dgm:effectClrLst/>
+    <dgm:txLinClrLst/>
+    <dgm:txFillClrLst meth="repeat">
+      <a:schemeClr val="lt1"/>
+    </dgm:txFillClrLst>
+    <dgm:txEffectClrLst/>
+  </dgm:styleLbl>
+  <dgm:styleLbl name="parChTrans2D3">
+    <dgm:fillClrLst meth="repeat">
+      <a:schemeClr val="accent1"/>
+    </dgm:fillClrLst>
+    <dgm:linClrLst meth="repeat">
+      <a:schemeClr val="accent1"/>
+    </dgm:linClrLst>
+    <dgm:effectClrLst/>
+    <dgm:txLinClrLst/>
+    <dgm:txFillClrLst meth="repeat">
+      <a:schemeClr val="lt1"/>
+    </dgm:txFillClrLst>
+    <dgm:txEffectClrLst/>
+  </dgm:styleLbl>
+  <dgm:styleLbl name="parChTrans2D4">
+    <dgm:fillClrLst meth="repeat">
+      <a:schemeClr val="accent1"/>
+    </dgm:fillClrLst>
+    <dgm:linClrLst meth="repeat">
+      <a:schemeClr val="accent1"/>
+    </dgm:linClrLst>
+    <dgm:effectClrLst/>
+    <dgm:txLinClrLst/>
+    <dgm:txFillClrLst meth="repeat">
+      <a:schemeClr val="lt1"/>
+    </dgm:txFillClrLst>
+    <dgm:txEffectClrLst/>
+  </dgm:styleLbl>
+  <dgm:styleLbl name="parChTrans1D1">
+    <dgm:fillClrLst meth="repeat">
+      <a:schemeClr val="accent1"/>
+    </dgm:fillClrLst>
+    <dgm:linClrLst meth="repeat">
+      <a:schemeClr val="accent1">
+        <a:shade val="60000"/>
+      </a:schemeClr>
+    </dgm:linClrLst>
+    <dgm:effectClrLst/>
+    <dgm:txLinClrLst/>
+    <dgm:txFillClrLst meth="repeat">
+      <a:schemeClr val="tx1"/>
+    </dgm:txFillClrLst>
+    <dgm:txEffectClrLst/>
+  </dgm:styleLbl>
+  <dgm:styleLbl name="parChTrans1D2">
+    <dgm:fillClrLst meth="repeat">
+      <a:schemeClr val="accent1"/>
+    </dgm:fillClrLst>
+    <dgm:linClrLst meth="repeat">
+      <a:schemeClr val="accent1">
+        <a:shade val="60000"/>
+      </a:schemeClr>
+    </dgm:linClrLst>
+    <dgm:effectClrLst/>
+    <dgm:txLinClrLst/>
+    <dgm:txFillClrLst meth="repeat">
+      <a:schemeClr val="tx1"/>
+    </dgm:txFillClrLst>
+    <dgm:txEffectClrLst/>
+  </dgm:styleLbl>
+  <dgm:styleLbl name="parChTrans1D3">
+    <dgm:fillClrLst meth="repeat">
+      <a:schemeClr val="accent1"/>
+    </dgm:fillClrLst>
+    <dgm:linClrLst meth="repeat">
+      <a:schemeClr val="accent1">
+        <a:shade val="80000"/>
+      </a:schemeClr>
+    </dgm:linClrLst>
+    <dgm:effectClrLst/>
+    <dgm:txLinClrLst/>
+    <dgm:txFillClrLst meth="repeat">
+      <a:schemeClr val="tx1"/>
+    </dgm:txFillClrLst>
+    <dgm:txEffectClrLst/>
+  </dgm:styleLbl>
+  <dgm:styleLbl name="parChTrans1D4">
+    <dgm:fillClrLst meth="repeat">
+      <a:schemeClr val="accent1"/>
+    </dgm:fillClrLst>
+    <dgm:linClrLst meth="repeat">
+      <a:schemeClr val="accent1">
+        <a:shade val="80000"/>
+      </a:schemeClr>
+    </dgm:linClrLst>
+    <dgm:effectClrLst/>
+    <dgm:txLinClrLst/>
+    <dgm:txFillClrLst meth="repeat">
+      <a:schemeClr val="tx1"/>
+    </dgm:txFillClrLst>
+    <dgm:txEffectClrLst/>
+  </dgm:styleLbl>
+  <dgm:styleLbl name="fgAcc1">
+    <dgm:fillClrLst meth="repeat">
+      <a:schemeClr val="lt1">
+        <a:alpha val="90000"/>
+      </a:schemeClr>
+    </dgm:fillClrLst>
+    <dgm:linClrLst meth="repeat">
+      <a:schemeClr val="accent1"/>
+    </dgm:linClrLst>
+    <dgm:effectClrLst/>
+    <dgm:txLinClrLst/>
+    <dgm:txFillClrLst meth="repeat">
+      <a:schemeClr val="dk1"/>
+    </dgm:txFillClrLst>
+    <dgm:txEffectClrLst/>
+  </dgm:styleLbl>
+  <dgm:styleLbl name="conFgAcc1">
+    <dgm:fillClrLst meth="repeat">
+      <a:schemeClr val="lt1">
+        <a:alpha val="90000"/>
+      </a:schemeClr>
+    </dgm:fillClrLst>
+    <dgm:linClrLst meth="repeat">
+      <a:schemeClr val="accent1"/>
+    </dgm:linClrLst>
+    <dgm:effectClrLst/>
+    <dgm:txLinClrLst/>
+    <dgm:txFillClrLst meth="repeat">
+      <a:schemeClr val="dk1"/>
+    </dgm:txFillClrLst>
+    <dgm:txEffectClrLst/>
+  </dgm:styleLbl>
+  <dgm:styleLbl name="alignAcc1">
+    <dgm:fillClrLst meth="repeat">
+      <a:schemeClr val="lt1">
+        <a:alpha val="90000"/>
+      </a:schemeClr>
+    </dgm:fillClrLst>
+    <dgm:linClrLst meth="repeat">
+      <a:schemeClr val="accent1"/>
+    </dgm:linClrLst>
+    <dgm:effectClrLst/>
+    <dgm:txLinClrLst/>
+    <dgm:txFillClrLst meth="repeat">
+      <a:schemeClr val="dk1"/>
+    </dgm:txFillClrLst>
+    <dgm:txEffectClrLst/>
+  </dgm:styleLbl>
+  <dgm:styleLbl name="trAlignAcc1">
+    <dgm:fillClrLst meth="repeat">
+      <a:schemeClr val="lt1">
+        <a:alpha val="40000"/>
+      </a:schemeClr>
+    </dgm:fillClrLst>
+    <dgm:linClrLst meth="repeat">
+      <a:schemeClr val="accent1"/>
+    </dgm:linClrLst>
+    <dgm:effectClrLst/>
+    <dgm:txLinClrLst/>
+    <dgm:txFillClrLst meth="repeat">
+      <a:schemeClr val="dk1"/>
+    </dgm:txFillClrLst>
+    <dgm:txEffectClrLst/>
+  </dgm:styleLbl>
+  <dgm:styleLbl name="bgAcc1">
+    <dgm:fillClrLst meth="repeat">
+      <a:schemeClr val="lt1">
+        <a:alpha val="90000"/>
+      </a:schemeClr>
+    </dgm:fillClrLst>
+    <dgm:linClrLst meth="repeat">
+      <a:schemeClr val="accent1"/>
+    </dgm:linClrLst>
+    <dgm:effectClrLst/>
+    <dgm:txLinClrLst/>
+    <dgm:txFillClrLst meth="repeat">
+      <a:schemeClr val="dk1"/>
+    </dgm:txFillClrLst>
+    <dgm:txEffectClrLst/>
+  </dgm:styleLbl>
+  <dgm:styleLbl name="solidFgAcc1">
+    <dgm:fillClrLst meth="repeat">
+      <a:schemeClr val="lt1"/>
+    </dgm:fillClrLst>
+    <dgm:linClrLst meth="repeat">
+      <a:schemeClr val="accent1"/>
+    </dgm:linClrLst>
+    <dgm:effectClrLst/>
+    <dgm:txLinClrLst/>
+    <dgm:txFillClrLst meth="repeat">
+      <a:schemeClr val="dk1"/>
+    </dgm:txFillClrLst>
+    <dgm:txEffectClrLst/>
+  </dgm:styleLbl>
+  <dgm:styleLbl name="solidAlignAcc1">
+    <dgm:fillClrLst meth="repeat">
+      <a:schemeClr val="lt1"/>
+    </dgm:fillClrLst>
+    <dgm:linClrLst meth="repeat">
+      <a:schemeClr val="accent1"/>
+    </dgm:linClrLst>
+    <dgm:effectClrLst/>
+    <dgm:txLinClrLst/>
+    <dgm:txFillClrLst meth="repeat">
+      <a:schemeClr val="dk1"/>
+    </dgm:txFillClrLst>
+    <dgm:txEffectClrLst/>
+  </dgm:styleLbl>
+  <dgm:styleLbl name="solidBgAcc1">
+    <dgm:fillClrLst meth="repeat">
+      <a:schemeClr val="lt1"/>
+    </dgm:fillClrLst>
+    <dgm:linClrLst meth="repeat">
+      <a:schemeClr val="accent1"/>
+    </dgm:linClrLst>
+    <dgm:effectClrLst/>
+    <dgm:txLinClrLst/>
+    <dgm:txFillClrLst meth="repeat">
+      <a:schemeClr val="dk1"/>
+    </dgm:txFillClrLst>
+    <dgm:txEffectClrLst/>
+  </dgm:styleLbl>
+  <dgm:styleLbl name="fgAccFollowNode1">
+    <dgm:fillClrLst meth="repeat">
+      <a:schemeClr val="accent1">
+        <a:alpha val="90000"/>
+        <a:tint val="40000"/>
+      </a:schemeClr>
+    </dgm:fillClrLst>
+    <dgm:linClrLst meth="repeat">
+      <a:schemeClr val="accent1">
+        <a:alpha val="90000"/>
+        <a:tint val="40000"/>
+      </a:schemeClr>
+    </dgm:linClrLst>
+    <dgm:effectClrLst/>
+    <dgm:txLinClrLst/>
+    <dgm:txFillClrLst meth="repeat">
+      <a:schemeClr val="dk1"/>
+    </dgm:txFillClrLst>
+    <dgm:txEffectClrLst/>
+  </dgm:styleLbl>
+  <dgm:styleLbl name="alignAccFollowNode1">
+    <dgm:fillClrLst meth="repeat">
+      <a:schemeClr val="accent1">
+        <a:alpha val="90000"/>
+        <a:tint val="40000"/>
+      </a:schemeClr>
+    </dgm:fillClrLst>
+    <dgm:linClrLst meth="repeat">
+      <a:schemeClr val="accent1">
+        <a:alpha val="90000"/>
+        <a:tint val="40000"/>
+      </a:schemeClr>
+    </dgm:linClrLst>
+    <dgm:effectClrLst/>
+    <dgm:txLinClrLst/>
+    <dgm:txFillClrLst meth="repeat">
+      <a:schemeClr val="dk1"/>
+    </dgm:txFillClrLst>
+    <dgm:txEffectClrLst/>
+  </dgm:styleLbl>
+  <dgm:styleLbl name="bgAccFollowNode1">
+    <dgm:fillClrLst meth="repeat">
+      <a:schemeClr val="accent1">
+        <a:alpha val="90000"/>
+        <a:tint val="40000"/>
+      </a:schemeClr>
+    </dgm:fillClrLst>
+    <dgm:linClrLst meth="repeat">
+      <a:schemeClr val="accent1">
+        <a:alpha val="90000"/>
+        <a:tint val="40000"/>
+      </a:schemeClr>
+    </dgm:linClrLst>
+    <dgm:effectClrLst/>
+    <dgm:txLinClrLst/>
+    <dgm:txFillClrLst meth="repeat">
+      <a:schemeClr val="dk1"/>
+    </dgm:txFillClrLst>
+    <dgm:txEffectClrLst/>
+  </dgm:styleLbl>
+  <dgm:styleLbl name="fgAcc0">
+    <dgm:fillClrLst meth="repeat">
+      <a:schemeClr val="lt1">
+        <a:alpha val="90000"/>
+      </a:schemeClr>
+    </dgm:fillClrLst>
+    <dgm:linClrLst meth="repeat">
+      <a:schemeClr val="accent1"/>
+    </dgm:linClrLst>
+    <dgm:effectClrLst/>
+    <dgm:txLinClrLst/>
+    <dgm:txFillClrLst meth="repeat">
+      <a:schemeClr val="dk1"/>
+    </dgm:txFillClrLst>
+    <dgm:txEffectClrLst/>
+  </dgm:styleLbl>
+  <dgm:styleLbl name="fgAcc2">
+    <dgm:fillClrLst meth="repeat">
+      <a:schemeClr val="lt1">
+        <a:alpha val="90000"/>
+      </a:schemeClr>
+    </dgm:fillClrLst>
+    <dgm:linClrLst meth="repeat">
+      <a:schemeClr val="accent1"/>
+    </dgm:linClrLst>
+    <dgm:effectClrLst/>
+    <dgm:txLinClrLst/>
+    <dgm:txFillClrLst meth="repeat">
+      <a:schemeClr val="dk1"/>
+    </dgm:txFillClrLst>
+    <dgm:txEffectClrLst/>
+  </dgm:styleLbl>
+  <dgm:styleLbl name="fgAcc3">
+    <dgm:fillClrLst meth="repeat">
+      <a:schemeClr val="lt1">
+        <a:alpha val="90000"/>
+      </a:schemeClr>
+    </dgm:fillClrLst>
+    <dgm:linClrLst meth="repeat">
+      <a:schemeClr val="accent1"/>
+    </dgm:linClrLst>
+    <dgm:effectClrLst/>
+    <dgm:txLinClrLst/>
+    <dgm:txFillClrLst meth="repeat">
+      <a:schemeClr val="dk1"/>
+    </dgm:txFillClrLst>
+    <dgm:txEffectClrLst/>
+  </dgm:styleLbl>
+  <dgm:styleLbl name="fgAcc4">
+    <dgm:fillClrLst meth="repeat">
+      <a:schemeClr val="lt1">
+        <a:alpha val="90000"/>
+      </a:schemeClr>
+    </dgm:fillClrLst>
+    <dgm:linClrLst meth="repeat">
+      <a:schemeClr val="accent1"/>
+    </dgm:linClrLst>
+    <dgm:effectClrLst/>
+    <dgm:txLinClrLst/>
+    <dgm:txFillClrLst meth="repeat">
+      <a:schemeClr val="dk1"/>
+    </dgm:txFillClrLst>
+    <dgm:txEffectClrLst/>
+  </dgm:styleLbl>
+  <dgm:styleLbl name="bgShp">
+    <dgm:fillClrLst meth="repeat">
+      <a:schemeClr val="accent1">
+        <a:tint val="40000"/>
+      </a:schemeClr>
+    </dgm:fillClrLst>
+    <dgm:linClrLst meth="repeat">
+      <a:schemeClr val="accent1"/>
+    </dgm:linClrLst>
+    <dgm:effectClrLst/>
+    <dgm:txLinClrLst/>
+    <dgm:txFillClrLst meth="repeat">
+      <a:schemeClr val="dk1"/>
+    </dgm:txFillClrLst>
+    <dgm:txEffectClrLst/>
+  </dgm:styleLbl>
+  <dgm:styleLbl name="dkBgShp">
+    <dgm:fillClrLst meth="repeat">
+      <a:schemeClr val="accent1">
+        <a:shade val="80000"/>
+      </a:schemeClr>
+    </dgm:fillClrLst>
+    <dgm:linClrLst meth="repeat">
+      <a:schemeClr val="accent1"/>
+    </dgm:linClrLst>
+    <dgm:effectClrLst/>
+    <dgm:txLinClrLst/>
+    <dgm:txFillClrLst meth="repeat">
+      <a:schemeClr val="lt1"/>
+    </dgm:txFillClrLst>
+    <dgm:txEffectClrLst/>
+  </dgm:styleLbl>
+  <dgm:styleLbl name="trBgShp">
+    <dgm:fillClrLst meth="repeat">
+      <a:schemeClr val="accent1">
+        <a:tint val="50000"/>
+        <a:alpha val="40000"/>
+      </a:schemeClr>
+    </dgm:fillClrLst>
+    <dgm:linClrLst meth="repeat">
+      <a:schemeClr val="accent1"/>
+    </dgm:linClrLst>
+    <dgm:effectClrLst/>
+    <dgm:txLinClrLst/>
+    <dgm:txFillClrLst meth="repeat">
+      <a:schemeClr val="lt1"/>
+    </dgm:txFillClrLst>
+    <dgm:txEffectClrLst/>
+  </dgm:styleLbl>
+  <dgm:styleLbl name="fgShp">
+    <dgm:fillClrLst meth="repeat">
+      <a:schemeClr val="accent1">
+        <a:tint val="60000"/>
+      </a:schemeClr>
+    </dgm:fillClrLst>
+    <dgm:linClrLst meth="repeat">
+      <a:schemeClr val="lt1"/>
+    </dgm:linClrLst>
+    <dgm:effectClrLst/>
+    <dgm:txLinClrLst/>
+    <dgm:txFillClrLst meth="repeat">
+      <a:schemeClr val="dk1"/>
+    </dgm:txFillClrLst>
+    <dgm:txEffectClrLst/>
+  </dgm:styleLbl>
+  <dgm:styleLbl name="revTx">
+    <dgm:fillClrLst meth="repeat">
+      <a:schemeClr val="lt1">
+        <a:alpha val="0"/>
+      </a:schemeClr>
+    </dgm:fillClrLst>
+    <dgm:linClrLst meth="repeat">
+      <a:schemeClr val="dk1">
+        <a:alpha val="0"/>
+      </a:schemeClr>
+    </dgm:linClrLst>
+    <dgm:effectClrLst/>
+    <dgm:txLinClrLst/>
+    <dgm:txFillClrLst meth="repeat">
+      <a:schemeClr val="tx1"/>
+    </dgm:txFillClrLst>
+    <dgm:txEffectClrLst/>
+  </dgm:styleLbl>
+</dgm:colorsDef>
+</file>
+
 <file path=ppt/diagrams/data1.xml><?xml version="1.0" encoding="utf-8"?>
 <dgm:dataModel xmlns:dgm="http://schemas.openxmlformats.org/drawingml/2006/diagram" xmlns:a="http://schemas.openxmlformats.org/drawingml/2006/main">
   <dgm:ptLst>
@@ -3629,13 +4376,13 @@
             </a:lnSpc>
           </a:pPr>
           <a:r>
-            <a:rPr lang="en-IN" sz="1600" b="1" i="1" dirty="0">
+            <a:rPr lang="en-IN" sz="1600" b="1" i="0" dirty="0">
               <a:latin typeface="Times New Roman" panose="02020603050405020304" pitchFamily="18" charset="0"/>
               <a:cs typeface="Times New Roman" panose="02020603050405020304" pitchFamily="18" charset="0"/>
             </a:rPr>
             <a:t>1. Problem Statement</a:t>
           </a:r>
-          <a:endParaRPr lang="en-US" sz="1600" b="1" i="1" dirty="0">
+          <a:endParaRPr lang="en-US" sz="1600" b="1" i="0" dirty="0">
             <a:latin typeface="Times New Roman" panose="02020603050405020304" pitchFamily="18" charset="0"/>
             <a:cs typeface="Times New Roman" panose="02020603050405020304" pitchFamily="18" charset="0"/>
           </a:endParaRPr>
@@ -3682,13 +4429,13 @@
             </a:lnSpc>
           </a:pPr>
           <a:r>
-            <a:rPr lang="en-IN" sz="1600" b="1" i="1" dirty="0">
+            <a:rPr lang="en-IN" sz="1600" b="1" i="0" dirty="0">
               <a:latin typeface="Times New Roman" panose="02020603050405020304" pitchFamily="18" charset="0"/>
               <a:cs typeface="Times New Roman" panose="02020603050405020304" pitchFamily="18" charset="0"/>
             </a:rPr>
             <a:t>2.Introduction</a:t>
           </a:r>
-          <a:endParaRPr lang="en-US" sz="1600" b="1" i="1" dirty="0">
+          <a:endParaRPr lang="en-US" sz="1600" b="1" i="0" dirty="0">
             <a:latin typeface="Times New Roman" panose="02020603050405020304" pitchFamily="18" charset="0"/>
             <a:cs typeface="Times New Roman" panose="02020603050405020304" pitchFamily="18" charset="0"/>
           </a:endParaRPr>
@@ -3735,13 +4482,13 @@
             </a:lnSpc>
           </a:pPr>
           <a:r>
-            <a:rPr lang="en-IN" sz="1600" b="1" i="1" dirty="0">
+            <a:rPr lang="en-IN" sz="1600" b="1" i="0" dirty="0">
               <a:latin typeface="Times New Roman" panose="02020603050405020304" pitchFamily="18" charset="0"/>
               <a:cs typeface="Times New Roman" panose="02020603050405020304" pitchFamily="18" charset="0"/>
             </a:rPr>
             <a:t>3.Working Principles of KNN</a:t>
           </a:r>
-          <a:endParaRPr lang="en-US" sz="1600" b="1" i="1" dirty="0">
+          <a:endParaRPr lang="en-US" sz="1600" b="1" i="0" dirty="0">
             <a:latin typeface="Times New Roman" panose="02020603050405020304" pitchFamily="18" charset="0"/>
             <a:cs typeface="Times New Roman" panose="02020603050405020304" pitchFamily="18" charset="0"/>
           </a:endParaRPr>
@@ -3788,13 +4535,13 @@
             </a:lnSpc>
           </a:pPr>
           <a:r>
-            <a:rPr lang="en-IN" sz="1600" b="1" i="1" dirty="0">
+            <a:rPr lang="en-IN" sz="1600" b="1" i="0" dirty="0">
               <a:latin typeface="Times New Roman" panose="02020603050405020304" pitchFamily="18" charset="0"/>
               <a:cs typeface="Times New Roman" panose="02020603050405020304" pitchFamily="18" charset="0"/>
             </a:rPr>
             <a:t>4.Design Principles of KNN Classifier</a:t>
           </a:r>
-          <a:endParaRPr lang="en-US" sz="1600" b="1" i="1" dirty="0">
+          <a:endParaRPr lang="en-US" sz="1600" b="1" i="0" dirty="0">
             <a:latin typeface="Times New Roman" panose="02020603050405020304" pitchFamily="18" charset="0"/>
             <a:cs typeface="Times New Roman" panose="02020603050405020304" pitchFamily="18" charset="0"/>
           </a:endParaRPr>
@@ -3841,13 +4588,13 @@
             </a:lnSpc>
           </a:pPr>
           <a:r>
-            <a:rPr lang="en-IN" sz="1600" b="1" i="1" dirty="0">
+            <a:rPr lang="en-IN" sz="1600" b="1" i="0" dirty="0">
               <a:latin typeface="Times New Roman" panose="02020603050405020304" pitchFamily="18" charset="0"/>
               <a:cs typeface="Times New Roman" panose="02020603050405020304" pitchFamily="18" charset="0"/>
             </a:rPr>
             <a:t>5.Building Blocks of the model</a:t>
           </a:r>
-          <a:endParaRPr lang="en-US" sz="1600" b="1" i="1" dirty="0">
+          <a:endParaRPr lang="en-US" sz="1600" b="1" i="0" dirty="0">
             <a:latin typeface="Times New Roman" panose="02020603050405020304" pitchFamily="18" charset="0"/>
             <a:cs typeface="Times New Roman" panose="02020603050405020304" pitchFamily="18" charset="0"/>
           </a:endParaRPr>
@@ -3894,13 +4641,13 @@
             </a:lnSpc>
           </a:pPr>
           <a:r>
-            <a:rPr lang="en-IN" sz="1600" b="1" i="1" dirty="0">
+            <a:rPr lang="en-IN" sz="1600" b="1" i="0" dirty="0">
               <a:latin typeface="Times New Roman" panose="02020603050405020304" pitchFamily="18" charset="0"/>
               <a:cs typeface="Times New Roman" panose="02020603050405020304" pitchFamily="18" charset="0"/>
             </a:rPr>
             <a:t>6.KNN model construction and Unit testing</a:t>
           </a:r>
-          <a:endParaRPr lang="en-US" sz="1600" b="1" i="1" dirty="0">
+          <a:endParaRPr lang="en-US" sz="1600" b="1" i="0" dirty="0">
             <a:latin typeface="Times New Roman" panose="02020603050405020304" pitchFamily="18" charset="0"/>
             <a:cs typeface="Times New Roman" panose="02020603050405020304" pitchFamily="18" charset="0"/>
           </a:endParaRPr>
@@ -3947,13 +4694,13 @@
             </a:lnSpc>
           </a:pPr>
           <a:r>
-            <a:rPr lang="en-IN" sz="1600" b="1" i="1" dirty="0">
+            <a:rPr lang="en-IN" sz="1600" b="1" i="0" dirty="0">
               <a:latin typeface="Times New Roman" panose="02020603050405020304" pitchFamily="18" charset="0"/>
               <a:cs typeface="Times New Roman" panose="02020603050405020304" pitchFamily="18" charset="0"/>
             </a:rPr>
             <a:t>7.Results </a:t>
           </a:r>
-          <a:endParaRPr lang="en-US" sz="1600" b="1" i="1" dirty="0">
+          <a:endParaRPr lang="en-US" sz="1600" b="1" i="0" dirty="0">
             <a:latin typeface="Times New Roman" panose="02020603050405020304" pitchFamily="18" charset="0"/>
             <a:cs typeface="Times New Roman" panose="02020603050405020304" pitchFamily="18" charset="0"/>
           </a:endParaRPr>
@@ -4000,13 +4747,13 @@
             </a:lnSpc>
           </a:pPr>
           <a:r>
-            <a:rPr lang="en-IN" sz="1600" b="1" i="1" dirty="0">
+            <a:rPr lang="en-IN" sz="1600" b="1" i="0" dirty="0">
               <a:latin typeface="Times New Roman" panose="02020603050405020304" pitchFamily="18" charset="0"/>
               <a:cs typeface="Times New Roman" panose="02020603050405020304" pitchFamily="18" charset="0"/>
             </a:rPr>
             <a:t>8. Conclusion </a:t>
           </a:r>
-          <a:endParaRPr lang="en-US" sz="1600" b="1" i="1" dirty="0">
+          <a:endParaRPr lang="en-US" sz="1600" b="1" i="0" dirty="0">
             <a:latin typeface="Times New Roman" panose="02020603050405020304" pitchFamily="18" charset="0"/>
             <a:cs typeface="Times New Roman" panose="02020603050405020304" pitchFamily="18" charset="0"/>
           </a:endParaRPr>
@@ -4416,7 +5163,7 @@
               <a:spcPct val="100000"/>
             </a:lnSpc>
           </a:pPr>
-          <a:endParaRPr lang="en-US" sz="1800" b="1" i="1" dirty="0">
+          <a:endParaRPr lang="en-US" sz="1600" b="1" i="0" dirty="0">
             <a:latin typeface="Times New Roman" pitchFamily="18"/>
             <a:cs typeface="Times New Roman" pitchFamily="18"/>
           </a:endParaRPr>
@@ -4428,14 +5175,14 @@
             </a:lnSpc>
           </a:pPr>
           <a:r>
-            <a:rPr lang="en-US" sz="1800" b="1" i="1" dirty="0">
+            <a:rPr lang="en-US" sz="1600" b="1" i="0" dirty="0">
               <a:latin typeface="Times New Roman" pitchFamily="18"/>
               <a:cs typeface="Times New Roman" pitchFamily="18"/>
             </a:rPr>
             <a:t>Design the </a:t>
           </a:r>
           <a:r>
-            <a:rPr lang="en-US" sz="1800" b="1" i="1" u="none" strike="noStrike" cap="none" spc="0" baseline="0" dirty="0">
+            <a:rPr lang="en-US" sz="1600" b="1" i="0" u="none" strike="noStrike" cap="none" spc="0" baseline="0" dirty="0">
               <a:uFillTx/>
               <a:latin typeface="Times New Roman" pitchFamily="18"/>
               <a:cs typeface="Times New Roman" pitchFamily="18"/>
@@ -4480,7 +5227,7 @@
             </a:lnSpc>
           </a:pPr>
           <a:r>
-            <a:rPr lang="en-US" sz="1800" b="1" i="1" u="none" strike="noStrike" cap="none" spc="0" baseline="0" dirty="0">
+            <a:rPr lang="en-US" sz="1600" b="1" i="0" u="none" strike="noStrike" cap="none" spc="0" baseline="0" dirty="0">
               <a:uFillTx/>
               <a:latin typeface="Times New Roman" pitchFamily="18"/>
               <a:cs typeface="Times New Roman" pitchFamily="18"/>
@@ -4488,13 +5235,13 @@
             <a:t>Investigate the model with </a:t>
           </a:r>
           <a:r>
-            <a:rPr lang="en-US" sz="1800" b="1" i="1" dirty="0">
+            <a:rPr lang="en-US" sz="1600" b="1" i="0" dirty="0">
               <a:latin typeface="Times New Roman" pitchFamily="18"/>
               <a:cs typeface="Times New Roman" pitchFamily="18"/>
             </a:rPr>
             <a:t>Unit Test </a:t>
           </a:r>
-          <a:endParaRPr lang="en-US" sz="1800" b="1" dirty="0"/>
+          <a:endParaRPr lang="en-US" sz="1600" b="1" i="0" dirty="0"/>
         </a:p>
       </dgm:t>
     </dgm:pt>
@@ -5192,6 +5939,792 @@
 </dgm:dataModel>
 </file>
 
+<file path=ppt/diagrams/data5.xml><?xml version="1.0" encoding="utf-8"?>
+<dgm:dataModel xmlns:dgm="http://schemas.openxmlformats.org/drawingml/2006/diagram" xmlns:a="http://schemas.openxmlformats.org/drawingml/2006/main">
+  <dgm:ptLst>
+    <dgm:pt modelId="{C943476A-9DDB-4163-BEC4-3486DA510308}" type="doc">
+      <dgm:prSet loTypeId="urn:microsoft.com/office/officeart/2005/8/layout/list1" loCatId="list" qsTypeId="urn:microsoft.com/office/officeart/2005/8/quickstyle/simple1" qsCatId="simple" csTypeId="urn:microsoft.com/office/officeart/2005/8/colors/accent1_2" csCatId="accent1" phldr="1"/>
+      <dgm:spPr/>
+      <dgm:t>
+        <a:bodyPr/>
+        <a:lstStyle/>
+        <a:p>
+          <a:endParaRPr lang="en-US"/>
+        </a:p>
+      </dgm:t>
+    </dgm:pt>
+    <dgm:pt modelId="{12472DA1-AD78-48F1-BBFC-82B0F123B572}">
+      <dgm:prSet/>
+      <dgm:spPr/>
+      <dgm:t>
+        <a:bodyPr/>
+        <a:lstStyle/>
+        <a:p>
+          <a:r>
+            <a:rPr lang="en-US" b="0" i="0"/>
+            <a:t>Input Handling:</a:t>
+          </a:r>
+          <a:endParaRPr lang="en-US" i="0"/>
+        </a:p>
+      </dgm:t>
+    </dgm:pt>
+    <dgm:pt modelId="{2AAE6DDE-FE86-4B33-95C8-97C2534F761F}" type="parTrans" cxnId="{640958FB-483B-4F8D-8A9D-AE4D799E1091}">
+      <dgm:prSet/>
+      <dgm:spPr/>
+      <dgm:t>
+        <a:bodyPr/>
+        <a:lstStyle/>
+        <a:p>
+          <a:endParaRPr lang="en-US"/>
+        </a:p>
+      </dgm:t>
+    </dgm:pt>
+    <dgm:pt modelId="{A0CF5BF4-949F-4ECA-B927-1533092DF057}" type="sibTrans" cxnId="{640958FB-483B-4F8D-8A9D-AE4D799E1091}">
+      <dgm:prSet/>
+      <dgm:spPr/>
+      <dgm:t>
+        <a:bodyPr/>
+        <a:lstStyle/>
+        <a:p>
+          <a:endParaRPr lang="en-US"/>
+        </a:p>
+      </dgm:t>
+    </dgm:pt>
+    <dgm:pt modelId="{CF9C7F7D-8BBF-4121-B4A8-6843E74C94CD}">
+      <dgm:prSet/>
+      <dgm:spPr/>
+      <dgm:t>
+        <a:bodyPr/>
+        <a:lstStyle/>
+        <a:p>
+          <a:r>
+            <a:rPr lang="en-US" b="0" i="0"/>
+            <a:t>Method: RunMultiSequenceLearningExperimentWithImage()</a:t>
+          </a:r>
+          <a:endParaRPr lang="en-US" i="0"/>
+        </a:p>
+      </dgm:t>
+    </dgm:pt>
+    <dgm:pt modelId="{795FFDC3-4EAA-4BB1-B018-4A5D24DA11DC}" type="parTrans" cxnId="{E0015E2E-DFC7-412D-AB49-C9F98B1E458B}">
+      <dgm:prSet/>
+      <dgm:spPr/>
+      <dgm:t>
+        <a:bodyPr/>
+        <a:lstStyle/>
+        <a:p>
+          <a:endParaRPr lang="en-US"/>
+        </a:p>
+      </dgm:t>
+    </dgm:pt>
+    <dgm:pt modelId="{7422BF06-5B79-4D89-B244-50457FA0D769}" type="sibTrans" cxnId="{E0015E2E-DFC7-412D-AB49-C9F98B1E458B}">
+      <dgm:prSet/>
+      <dgm:spPr/>
+      <dgm:t>
+        <a:bodyPr/>
+        <a:lstStyle/>
+        <a:p>
+          <a:endParaRPr lang="en-US"/>
+        </a:p>
+      </dgm:t>
+    </dgm:pt>
+    <dgm:pt modelId="{82299A1B-009C-4932-A512-1648B8A8AF64}">
+      <dgm:prSet/>
+      <dgm:spPr/>
+      <dgm:t>
+        <a:bodyPr/>
+        <a:lstStyle/>
+        <a:p>
+          <a:r>
+            <a:rPr lang="en-US" b="0" i="0" dirty="0"/>
+            <a:t>Receives input image for processing.</a:t>
+          </a:r>
+          <a:endParaRPr lang="en-US" i="0" dirty="0"/>
+        </a:p>
+      </dgm:t>
+    </dgm:pt>
+    <dgm:pt modelId="{3AFAE142-9CDA-4974-84AE-2EAD930F6EE4}" type="parTrans" cxnId="{788FA8DF-5D14-465B-9EDD-53849C276981}">
+      <dgm:prSet/>
+      <dgm:spPr/>
+      <dgm:t>
+        <a:bodyPr/>
+        <a:lstStyle/>
+        <a:p>
+          <a:endParaRPr lang="en-US"/>
+        </a:p>
+      </dgm:t>
+    </dgm:pt>
+    <dgm:pt modelId="{5B4DC42B-5604-4E56-9B06-3B2899E5F4E6}" type="sibTrans" cxnId="{788FA8DF-5D14-465B-9EDD-53849C276981}">
+      <dgm:prSet/>
+      <dgm:spPr/>
+      <dgm:t>
+        <a:bodyPr/>
+        <a:lstStyle/>
+        <a:p>
+          <a:endParaRPr lang="en-US"/>
+        </a:p>
+      </dgm:t>
+    </dgm:pt>
+    <dgm:pt modelId="{6A75E29B-0AA9-4A75-8FE5-EDD8FF92FEB3}">
+      <dgm:prSet/>
+      <dgm:spPr/>
+      <dgm:t>
+        <a:bodyPr/>
+        <a:lstStyle/>
+        <a:p>
+          <a:r>
+            <a:rPr lang="en-US" b="0" i="0"/>
+            <a:t>Transformation:</a:t>
+          </a:r>
+          <a:endParaRPr lang="en-US" i="0"/>
+        </a:p>
+      </dgm:t>
+    </dgm:pt>
+    <dgm:pt modelId="{9BE11743-D59D-407B-A578-29D1C8348E70}" type="parTrans" cxnId="{DA62A89D-6071-4378-BA47-9C85B36C0791}">
+      <dgm:prSet/>
+      <dgm:spPr/>
+      <dgm:t>
+        <a:bodyPr/>
+        <a:lstStyle/>
+        <a:p>
+          <a:endParaRPr lang="en-US"/>
+        </a:p>
+      </dgm:t>
+    </dgm:pt>
+    <dgm:pt modelId="{B83E95A3-6D8A-49D5-8EDE-C44F8DABCFB3}" type="sibTrans" cxnId="{DA62A89D-6071-4378-BA47-9C85B36C0791}">
+      <dgm:prSet/>
+      <dgm:spPr/>
+      <dgm:t>
+        <a:bodyPr/>
+        <a:lstStyle/>
+        <a:p>
+          <a:endParaRPr lang="en-US"/>
+        </a:p>
+      </dgm:t>
+    </dgm:pt>
+    <dgm:pt modelId="{1FBDAC05-72F4-4480-827C-89001B5491A6}">
+      <dgm:prSet/>
+      <dgm:spPr/>
+      <dgm:t>
+        <a:bodyPr/>
+        <a:lstStyle/>
+        <a:p>
+          <a:r>
+            <a:rPr lang="en-US" b="0" i="0"/>
+            <a:t>Function: </a:t>
+          </a:r>
+          <a:endParaRPr lang="en-US" i="0"/>
+        </a:p>
+      </dgm:t>
+    </dgm:pt>
+    <dgm:pt modelId="{E199F569-8D5E-40C3-9CE7-DE1D5A8B6D29}" type="parTrans" cxnId="{3B48E778-93DF-4ED3-817C-649D6D7F9DFA}">
+      <dgm:prSet/>
+      <dgm:spPr/>
+      <dgm:t>
+        <a:bodyPr/>
+        <a:lstStyle/>
+        <a:p>
+          <a:endParaRPr lang="en-US"/>
+        </a:p>
+      </dgm:t>
+    </dgm:pt>
+    <dgm:pt modelId="{C2591432-0070-4D47-89F4-D4795BC746A7}" type="sibTrans" cxnId="{3B48E778-93DF-4ED3-817C-649D6D7F9DFA}">
+      <dgm:prSet/>
+      <dgm:spPr/>
+      <dgm:t>
+        <a:bodyPr/>
+        <a:lstStyle/>
+        <a:p>
+          <a:endParaRPr lang="en-US"/>
+        </a:p>
+      </dgm:t>
+    </dgm:pt>
+    <dgm:pt modelId="{BE6C4B5A-649D-4EE9-8456-C236F6214F6E}">
+      <dgm:prSet/>
+      <dgm:spPr/>
+      <dgm:t>
+        <a:bodyPr/>
+        <a:lstStyle/>
+        <a:p>
+          <a:r>
+            <a:rPr lang="en-US" b="0" i="0" dirty="0"/>
+            <a:t>Method: </a:t>
+          </a:r>
+          <a:r>
+            <a:rPr lang="en-US" b="0" i="0" dirty="0" err="1"/>
+            <a:t>ConvertImageToSequence</a:t>
+          </a:r>
+          <a:r>
+            <a:rPr lang="en-US" b="0" i="0" dirty="0"/>
+            <a:t>()</a:t>
+          </a:r>
+          <a:endParaRPr lang="en-US" i="0" dirty="0"/>
+        </a:p>
+      </dgm:t>
+    </dgm:pt>
+    <dgm:pt modelId="{0C3B07E8-77AE-469C-B472-18F684BF56A9}" type="parTrans" cxnId="{8C2FE402-3AF9-4ABE-A269-598443FC16DF}">
+      <dgm:prSet/>
+      <dgm:spPr/>
+      <dgm:t>
+        <a:bodyPr/>
+        <a:lstStyle/>
+        <a:p>
+          <a:endParaRPr lang="en-US"/>
+        </a:p>
+      </dgm:t>
+    </dgm:pt>
+    <dgm:pt modelId="{1C2E360E-5DCA-4FB0-8320-548500D759B7}" type="sibTrans" cxnId="{8C2FE402-3AF9-4ABE-A269-598443FC16DF}">
+      <dgm:prSet/>
+      <dgm:spPr/>
+      <dgm:t>
+        <a:bodyPr/>
+        <a:lstStyle/>
+        <a:p>
+          <a:endParaRPr lang="en-US"/>
+        </a:p>
+      </dgm:t>
+    </dgm:pt>
+    <dgm:pt modelId="{581AC865-252D-42BF-81DA-C29B5D424212}">
+      <dgm:prSet/>
+      <dgm:spPr/>
+      <dgm:t>
+        <a:bodyPr/>
+        <a:lstStyle/>
+        <a:p>
+          <a:r>
+            <a:rPr lang="en-US" b="0" i="0"/>
+            <a:t>Converts image into a unique sequence of pixels.</a:t>
+          </a:r>
+          <a:endParaRPr lang="en-US" i="0"/>
+        </a:p>
+      </dgm:t>
+    </dgm:pt>
+    <dgm:pt modelId="{47F03D84-0DEA-4A03-A222-18298E7A4BB4}" type="parTrans" cxnId="{D0A7C4D9-D684-47C5-A411-B0B0A53FB828}">
+      <dgm:prSet/>
+      <dgm:spPr/>
+      <dgm:t>
+        <a:bodyPr/>
+        <a:lstStyle/>
+        <a:p>
+          <a:endParaRPr lang="en-US"/>
+        </a:p>
+      </dgm:t>
+    </dgm:pt>
+    <dgm:pt modelId="{6B92FB9D-DDD3-4454-A362-2EFB2F41207D}" type="sibTrans" cxnId="{D0A7C4D9-D684-47C5-A411-B0B0A53FB828}">
+      <dgm:prSet/>
+      <dgm:spPr/>
+      <dgm:t>
+        <a:bodyPr/>
+        <a:lstStyle/>
+        <a:p>
+          <a:endParaRPr lang="en-US"/>
+        </a:p>
+      </dgm:t>
+    </dgm:pt>
+    <dgm:pt modelId="{51A9A672-CFFE-4FE1-96EE-5CE20D3222CC}">
+      <dgm:prSet/>
+      <dgm:spPr/>
+      <dgm:t>
+        <a:bodyPr/>
+        <a:lstStyle/>
+        <a:p>
+          <a:r>
+            <a:rPr lang="en-US" b="0" i="0"/>
+            <a:t>Classification Process:</a:t>
+          </a:r>
+          <a:endParaRPr lang="en-US" i="0"/>
+        </a:p>
+      </dgm:t>
+    </dgm:pt>
+    <dgm:pt modelId="{4839638F-0240-4142-9503-0CDCA376DAEA}" type="parTrans" cxnId="{F0D50D00-8E58-465E-AC73-634CD2611DA3}">
+      <dgm:prSet/>
+      <dgm:spPr/>
+      <dgm:t>
+        <a:bodyPr/>
+        <a:lstStyle/>
+        <a:p>
+          <a:endParaRPr lang="en-US"/>
+        </a:p>
+      </dgm:t>
+    </dgm:pt>
+    <dgm:pt modelId="{032ACF9A-406E-4286-ADCC-9F88581997A4}" type="sibTrans" cxnId="{F0D50D00-8E58-465E-AC73-634CD2611DA3}">
+      <dgm:prSet/>
+      <dgm:spPr/>
+      <dgm:t>
+        <a:bodyPr/>
+        <a:lstStyle/>
+        <a:p>
+          <a:endParaRPr lang="en-US"/>
+        </a:p>
+      </dgm:t>
+    </dgm:pt>
+    <dgm:pt modelId="{D48E6D87-6472-4E12-A198-EF310FDE649F}">
+      <dgm:prSet/>
+      <dgm:spPr/>
+      <dgm:t>
+        <a:bodyPr/>
+        <a:lstStyle/>
+        <a:p>
+          <a:r>
+            <a:rPr lang="en-US" b="0" i="0"/>
+            <a:t>Utilizes pixel sequences to predict match or non-match.</a:t>
+          </a:r>
+          <a:endParaRPr lang="en-US" i="0"/>
+        </a:p>
+      </dgm:t>
+    </dgm:pt>
+    <dgm:pt modelId="{36D95CC0-9EA7-400D-AC1C-5BD932B8C92C}" type="parTrans" cxnId="{A6BC2058-7123-4BE2-81AE-45EE6EC2CB22}">
+      <dgm:prSet/>
+      <dgm:spPr/>
+      <dgm:t>
+        <a:bodyPr/>
+        <a:lstStyle/>
+        <a:p>
+          <a:endParaRPr lang="en-US"/>
+        </a:p>
+      </dgm:t>
+    </dgm:pt>
+    <dgm:pt modelId="{7178AF1D-BCDE-4D53-9C0F-79A08D0F7730}" type="sibTrans" cxnId="{A6BC2058-7123-4BE2-81AE-45EE6EC2CB22}">
+      <dgm:prSet/>
+      <dgm:spPr/>
+      <dgm:t>
+        <a:bodyPr/>
+        <a:lstStyle/>
+        <a:p>
+          <a:endParaRPr lang="en-US"/>
+        </a:p>
+      </dgm:t>
+    </dgm:pt>
+    <dgm:pt modelId="{185B5118-EEB4-4A86-94BB-8A5EFF6A72EC}">
+      <dgm:prSet/>
+      <dgm:spPr/>
+      <dgm:t>
+        <a:bodyPr/>
+        <a:lstStyle/>
+        <a:p>
+          <a:r>
+            <a:rPr lang="en-US" b="0" i="0"/>
+            <a:t>Compares input vs. output pixel sequences.</a:t>
+          </a:r>
+          <a:endParaRPr lang="en-US" i="0"/>
+        </a:p>
+      </dgm:t>
+    </dgm:pt>
+    <dgm:pt modelId="{071D9F0B-CA83-45A1-BE53-27DA07807CFB}" type="parTrans" cxnId="{C4B72023-92AD-4179-BB37-3E19EA2E195C}">
+      <dgm:prSet/>
+      <dgm:spPr/>
+      <dgm:t>
+        <a:bodyPr/>
+        <a:lstStyle/>
+        <a:p>
+          <a:endParaRPr lang="en-US"/>
+        </a:p>
+      </dgm:t>
+    </dgm:pt>
+    <dgm:pt modelId="{14CB0D30-CDBC-47BB-A851-CE0313A8E830}" type="sibTrans" cxnId="{C4B72023-92AD-4179-BB37-3E19EA2E195C}">
+      <dgm:prSet/>
+      <dgm:spPr/>
+      <dgm:t>
+        <a:bodyPr/>
+        <a:lstStyle/>
+        <a:p>
+          <a:endParaRPr lang="en-US"/>
+        </a:p>
+      </dgm:t>
+    </dgm:pt>
+    <dgm:pt modelId="{6A2B05C8-2516-4501-85C6-D475251E883B}">
+      <dgm:prSet/>
+      <dgm:spPr/>
+      <dgm:t>
+        <a:bodyPr/>
+        <a:lstStyle/>
+        <a:p>
+          <a:r>
+            <a:rPr lang="en-US" b="0" i="0"/>
+            <a:t>Match prediction based on alignment of pixel sequences.</a:t>
+          </a:r>
+          <a:endParaRPr lang="en-US" i="0"/>
+        </a:p>
+      </dgm:t>
+    </dgm:pt>
+    <dgm:pt modelId="{2C2469DF-FCCF-4B49-9B8E-407EEC33856E}" type="parTrans" cxnId="{6E2F6B42-EB84-4AD1-9AD4-224B21B19EA9}">
+      <dgm:prSet/>
+      <dgm:spPr/>
+      <dgm:t>
+        <a:bodyPr/>
+        <a:lstStyle/>
+        <a:p>
+          <a:endParaRPr lang="en-US"/>
+        </a:p>
+      </dgm:t>
+    </dgm:pt>
+    <dgm:pt modelId="{CC50BB1C-E416-4F32-BCAC-DB0BCEBCB17B}" type="sibTrans" cxnId="{6E2F6B42-EB84-4AD1-9AD4-224B21B19EA9}">
+      <dgm:prSet/>
+      <dgm:spPr/>
+      <dgm:t>
+        <a:bodyPr/>
+        <a:lstStyle/>
+        <a:p>
+          <a:endParaRPr lang="en-US"/>
+        </a:p>
+      </dgm:t>
+    </dgm:pt>
+    <dgm:pt modelId="{FF4F2D19-D473-402E-8A83-3A10913606E4}">
+      <dgm:prSet/>
+      <dgm:spPr/>
+      <dgm:t>
+        <a:bodyPr/>
+        <a:lstStyle/>
+        <a:p>
+          <a:r>
+            <a:rPr lang="en-US" b="0" i="0"/>
+            <a:t>Significance:</a:t>
+          </a:r>
+          <a:endParaRPr lang="en-US" i="0"/>
+        </a:p>
+      </dgm:t>
+    </dgm:pt>
+    <dgm:pt modelId="{8B001D15-9789-45EB-AB9E-116B6FB872C2}" type="parTrans" cxnId="{8D07F1E2-D37E-4BE0-9DEE-DFCACCA29587}">
+      <dgm:prSet/>
+      <dgm:spPr/>
+      <dgm:t>
+        <a:bodyPr/>
+        <a:lstStyle/>
+        <a:p>
+          <a:endParaRPr lang="en-US"/>
+        </a:p>
+      </dgm:t>
+    </dgm:pt>
+    <dgm:pt modelId="{B8F91E49-1B8E-4817-B025-4D156399DFF0}" type="sibTrans" cxnId="{8D07F1E2-D37E-4BE0-9DEE-DFCACCA29587}">
+      <dgm:prSet/>
+      <dgm:spPr/>
+      <dgm:t>
+        <a:bodyPr/>
+        <a:lstStyle/>
+        <a:p>
+          <a:endParaRPr lang="en-US"/>
+        </a:p>
+      </dgm:t>
+    </dgm:pt>
+    <dgm:pt modelId="{AD6A475C-2465-4BC2-BF7F-D4B2DF0192AA}">
+      <dgm:prSet/>
+      <dgm:spPr/>
+      <dgm:t>
+        <a:bodyPr/>
+        <a:lstStyle/>
+        <a:p>
+          <a:r>
+            <a:rPr lang="en-US" b="0" i="0"/>
+            <a:t>Pixel uniqueness crucial for classification.</a:t>
+          </a:r>
+          <a:endParaRPr lang="en-US" i="0"/>
+        </a:p>
+      </dgm:t>
+    </dgm:pt>
+    <dgm:pt modelId="{37B7DD37-071D-4831-BFAB-67F90CEF06B0}" type="parTrans" cxnId="{56BF3473-AC6E-4696-9570-BE2F3E2FC3AA}">
+      <dgm:prSet/>
+      <dgm:spPr/>
+      <dgm:t>
+        <a:bodyPr/>
+        <a:lstStyle/>
+        <a:p>
+          <a:endParaRPr lang="en-US"/>
+        </a:p>
+      </dgm:t>
+    </dgm:pt>
+    <dgm:pt modelId="{F07C14E5-0FE5-43D1-A6B6-EC80DD5EF32B}" type="sibTrans" cxnId="{56BF3473-AC6E-4696-9570-BE2F3E2FC3AA}">
+      <dgm:prSet/>
+      <dgm:spPr/>
+      <dgm:t>
+        <a:bodyPr/>
+        <a:lstStyle/>
+        <a:p>
+          <a:endParaRPr lang="en-US"/>
+        </a:p>
+      </dgm:t>
+    </dgm:pt>
+    <dgm:pt modelId="{6F40939D-3F12-4194-BE33-3E1CF49EAEA2}">
+      <dgm:prSet/>
+      <dgm:spPr/>
+      <dgm:t>
+        <a:bodyPr/>
+        <a:lstStyle/>
+        <a:p>
+          <a:r>
+            <a:rPr lang="en-US" b="0" i="0"/>
+            <a:t>Analyzes individual pixel sequences.</a:t>
+          </a:r>
+          <a:endParaRPr lang="en-US" i="0"/>
+        </a:p>
+      </dgm:t>
+    </dgm:pt>
+    <dgm:pt modelId="{8ED93F39-97F0-43CC-9414-C2FE1BBAC8A8}" type="parTrans" cxnId="{C4F4C554-2402-4AE4-9504-040F3AE13184}">
+      <dgm:prSet/>
+      <dgm:spPr/>
+      <dgm:t>
+        <a:bodyPr/>
+        <a:lstStyle/>
+        <a:p>
+          <a:endParaRPr lang="en-US"/>
+        </a:p>
+      </dgm:t>
+    </dgm:pt>
+    <dgm:pt modelId="{5FD7E32F-3934-4793-8106-A97C7A3311DF}" type="sibTrans" cxnId="{C4F4C554-2402-4AE4-9504-040F3AE13184}">
+      <dgm:prSet/>
+      <dgm:spPr/>
+      <dgm:t>
+        <a:bodyPr/>
+        <a:lstStyle/>
+        <a:p>
+          <a:endParaRPr lang="en-US"/>
+        </a:p>
+      </dgm:t>
+    </dgm:pt>
+    <dgm:pt modelId="{B44E69A3-078E-466B-960C-B62B7879671F}">
+      <dgm:prSet/>
+      <dgm:spPr/>
+      <dgm:t>
+        <a:bodyPr/>
+        <a:lstStyle/>
+        <a:p>
+          <a:r>
+            <a:rPr lang="en-US" b="0" i="0"/>
+            <a:t>Determines image similarity based on pixel compositions.</a:t>
+          </a:r>
+          <a:endParaRPr lang="en-US" i="0"/>
+        </a:p>
+      </dgm:t>
+    </dgm:pt>
+    <dgm:pt modelId="{E6E7F560-5F5A-40D1-A430-6D1E58BF74D5}" type="parTrans" cxnId="{E25EAAA8-B7C3-49C8-96D9-8293B633BC21}">
+      <dgm:prSet/>
+      <dgm:spPr/>
+      <dgm:t>
+        <a:bodyPr/>
+        <a:lstStyle/>
+        <a:p>
+          <a:endParaRPr lang="en-US"/>
+        </a:p>
+      </dgm:t>
+    </dgm:pt>
+    <dgm:pt modelId="{BF0F11E0-47FF-4A58-8CCD-1A1E043C49CD}" type="sibTrans" cxnId="{E25EAAA8-B7C3-49C8-96D9-8293B633BC21}">
+      <dgm:prSet/>
+      <dgm:spPr/>
+      <dgm:t>
+        <a:bodyPr/>
+        <a:lstStyle/>
+        <a:p>
+          <a:endParaRPr lang="en-US"/>
+        </a:p>
+      </dgm:t>
+    </dgm:pt>
+    <dgm:pt modelId="{4003E091-6602-4829-89B3-2E7F9DD5E3F1}" type="pres">
+      <dgm:prSet presAssocID="{C943476A-9DDB-4163-BEC4-3486DA510308}" presName="linear" presStyleCnt="0">
+        <dgm:presLayoutVars>
+          <dgm:dir/>
+          <dgm:animLvl val="lvl"/>
+          <dgm:resizeHandles val="exact"/>
+        </dgm:presLayoutVars>
+      </dgm:prSet>
+      <dgm:spPr/>
+    </dgm:pt>
+    <dgm:pt modelId="{8D043187-6634-4F28-AECE-E34556425878}" type="pres">
+      <dgm:prSet presAssocID="{12472DA1-AD78-48F1-BBFC-82B0F123B572}" presName="parentLin" presStyleCnt="0"/>
+      <dgm:spPr/>
+    </dgm:pt>
+    <dgm:pt modelId="{175A0E16-8F30-42BB-A2DA-F23360EE247C}" type="pres">
+      <dgm:prSet presAssocID="{12472DA1-AD78-48F1-BBFC-82B0F123B572}" presName="parentLeftMargin" presStyleLbl="node1" presStyleIdx="0" presStyleCnt="4"/>
+      <dgm:spPr/>
+    </dgm:pt>
+    <dgm:pt modelId="{38B729AF-1E8A-46B8-B029-FB71CC182613}" type="pres">
+      <dgm:prSet presAssocID="{12472DA1-AD78-48F1-BBFC-82B0F123B572}" presName="parentText" presStyleLbl="node1" presStyleIdx="0" presStyleCnt="4">
+        <dgm:presLayoutVars>
+          <dgm:chMax val="0"/>
+          <dgm:bulletEnabled val="1"/>
+        </dgm:presLayoutVars>
+      </dgm:prSet>
+      <dgm:spPr/>
+    </dgm:pt>
+    <dgm:pt modelId="{61C5FE1B-7AF8-4B7A-89E6-1B2539C1BE7D}" type="pres">
+      <dgm:prSet presAssocID="{12472DA1-AD78-48F1-BBFC-82B0F123B572}" presName="negativeSpace" presStyleCnt="0"/>
+      <dgm:spPr/>
+    </dgm:pt>
+    <dgm:pt modelId="{A383B95A-03E3-4E56-9B26-2400215044D9}" type="pres">
+      <dgm:prSet presAssocID="{12472DA1-AD78-48F1-BBFC-82B0F123B572}" presName="childText" presStyleLbl="conFgAcc1" presStyleIdx="0" presStyleCnt="4">
+        <dgm:presLayoutVars>
+          <dgm:bulletEnabled val="1"/>
+        </dgm:presLayoutVars>
+      </dgm:prSet>
+      <dgm:spPr/>
+    </dgm:pt>
+    <dgm:pt modelId="{1903BC8D-6E94-4E7C-8D48-12273CC6590C}" type="pres">
+      <dgm:prSet presAssocID="{A0CF5BF4-949F-4ECA-B927-1533092DF057}" presName="spaceBetweenRectangles" presStyleCnt="0"/>
+      <dgm:spPr/>
+    </dgm:pt>
+    <dgm:pt modelId="{18337641-A1B9-4B81-9DA9-B68185FBB582}" type="pres">
+      <dgm:prSet presAssocID="{1FBDAC05-72F4-4480-827C-89001B5491A6}" presName="parentLin" presStyleCnt="0"/>
+      <dgm:spPr/>
+    </dgm:pt>
+    <dgm:pt modelId="{F847B660-F973-4893-9E5D-18D59AE4C02A}" type="pres">
+      <dgm:prSet presAssocID="{1FBDAC05-72F4-4480-827C-89001B5491A6}" presName="parentLeftMargin" presStyleLbl="node1" presStyleIdx="0" presStyleCnt="4"/>
+      <dgm:spPr/>
+    </dgm:pt>
+    <dgm:pt modelId="{62D7583B-B76D-4CB7-907D-90C29E091D5C}" type="pres">
+      <dgm:prSet presAssocID="{1FBDAC05-72F4-4480-827C-89001B5491A6}" presName="parentText" presStyleLbl="node1" presStyleIdx="1" presStyleCnt="4">
+        <dgm:presLayoutVars>
+          <dgm:chMax val="0"/>
+          <dgm:bulletEnabled val="1"/>
+        </dgm:presLayoutVars>
+      </dgm:prSet>
+      <dgm:spPr/>
+    </dgm:pt>
+    <dgm:pt modelId="{15542EDB-D485-4F47-BA19-10040AF4B872}" type="pres">
+      <dgm:prSet presAssocID="{1FBDAC05-72F4-4480-827C-89001B5491A6}" presName="negativeSpace" presStyleCnt="0"/>
+      <dgm:spPr/>
+    </dgm:pt>
+    <dgm:pt modelId="{4E3BA3F2-15C8-451C-9F5E-1CFA274993DD}" type="pres">
+      <dgm:prSet presAssocID="{1FBDAC05-72F4-4480-827C-89001B5491A6}" presName="childText" presStyleLbl="conFgAcc1" presStyleIdx="1" presStyleCnt="4">
+        <dgm:presLayoutVars>
+          <dgm:bulletEnabled val="1"/>
+        </dgm:presLayoutVars>
+      </dgm:prSet>
+      <dgm:spPr/>
+    </dgm:pt>
+    <dgm:pt modelId="{BFB80725-DBDB-4FD8-90BF-88D64262C164}" type="pres">
+      <dgm:prSet presAssocID="{C2591432-0070-4D47-89F4-D4795BC746A7}" presName="spaceBetweenRectangles" presStyleCnt="0"/>
+      <dgm:spPr/>
+    </dgm:pt>
+    <dgm:pt modelId="{FD94BA82-BE35-424C-B898-C7296C59A126}" type="pres">
+      <dgm:prSet presAssocID="{51A9A672-CFFE-4FE1-96EE-5CE20D3222CC}" presName="parentLin" presStyleCnt="0"/>
+      <dgm:spPr/>
+    </dgm:pt>
+    <dgm:pt modelId="{15935B01-C24C-4372-8C2A-5D1C83BD7CA7}" type="pres">
+      <dgm:prSet presAssocID="{51A9A672-CFFE-4FE1-96EE-5CE20D3222CC}" presName="parentLeftMargin" presStyleLbl="node1" presStyleIdx="1" presStyleCnt="4"/>
+      <dgm:spPr/>
+    </dgm:pt>
+    <dgm:pt modelId="{25512264-5BF7-4A1A-8BC3-C13A92CE9DCB}" type="pres">
+      <dgm:prSet presAssocID="{51A9A672-CFFE-4FE1-96EE-5CE20D3222CC}" presName="parentText" presStyleLbl="node1" presStyleIdx="2" presStyleCnt="4">
+        <dgm:presLayoutVars>
+          <dgm:chMax val="0"/>
+          <dgm:bulletEnabled val="1"/>
+        </dgm:presLayoutVars>
+      </dgm:prSet>
+      <dgm:spPr/>
+    </dgm:pt>
+    <dgm:pt modelId="{00DE3E07-F29C-42DF-AA4E-0891FB1C3F6F}" type="pres">
+      <dgm:prSet presAssocID="{51A9A672-CFFE-4FE1-96EE-5CE20D3222CC}" presName="negativeSpace" presStyleCnt="0"/>
+      <dgm:spPr/>
+    </dgm:pt>
+    <dgm:pt modelId="{7C734A50-680F-4CB0-9334-3F75CE072784}" type="pres">
+      <dgm:prSet presAssocID="{51A9A672-CFFE-4FE1-96EE-5CE20D3222CC}" presName="childText" presStyleLbl="conFgAcc1" presStyleIdx="2" presStyleCnt="4">
+        <dgm:presLayoutVars>
+          <dgm:bulletEnabled val="1"/>
+        </dgm:presLayoutVars>
+      </dgm:prSet>
+      <dgm:spPr/>
+    </dgm:pt>
+    <dgm:pt modelId="{F461D10E-3F95-4C01-8A9E-54DF6DE8A180}" type="pres">
+      <dgm:prSet presAssocID="{032ACF9A-406E-4286-ADCC-9F88581997A4}" presName="spaceBetweenRectangles" presStyleCnt="0"/>
+      <dgm:spPr/>
+    </dgm:pt>
+    <dgm:pt modelId="{752A48C4-E0CA-45E6-BA67-FF376BD65F85}" type="pres">
+      <dgm:prSet presAssocID="{FF4F2D19-D473-402E-8A83-3A10913606E4}" presName="parentLin" presStyleCnt="0"/>
+      <dgm:spPr/>
+    </dgm:pt>
+    <dgm:pt modelId="{3830F23F-EED2-41C8-A690-C1DBC1F42FDC}" type="pres">
+      <dgm:prSet presAssocID="{FF4F2D19-D473-402E-8A83-3A10913606E4}" presName="parentLeftMargin" presStyleLbl="node1" presStyleIdx="2" presStyleCnt="4"/>
+      <dgm:spPr/>
+    </dgm:pt>
+    <dgm:pt modelId="{4BED44EF-1FA4-4761-821E-7AD7CDF82849}" type="pres">
+      <dgm:prSet presAssocID="{FF4F2D19-D473-402E-8A83-3A10913606E4}" presName="parentText" presStyleLbl="node1" presStyleIdx="3" presStyleCnt="4">
+        <dgm:presLayoutVars>
+          <dgm:chMax val="0"/>
+          <dgm:bulletEnabled val="1"/>
+        </dgm:presLayoutVars>
+      </dgm:prSet>
+      <dgm:spPr/>
+    </dgm:pt>
+    <dgm:pt modelId="{2ED46FE7-C7C7-46BE-9752-6ECB2C7E5F00}" type="pres">
+      <dgm:prSet presAssocID="{FF4F2D19-D473-402E-8A83-3A10913606E4}" presName="negativeSpace" presStyleCnt="0"/>
+      <dgm:spPr/>
+    </dgm:pt>
+    <dgm:pt modelId="{9D681EC6-E7AB-4FA1-BAF0-E4E10900E762}" type="pres">
+      <dgm:prSet presAssocID="{FF4F2D19-D473-402E-8A83-3A10913606E4}" presName="childText" presStyleLbl="conFgAcc1" presStyleIdx="3" presStyleCnt="4">
+        <dgm:presLayoutVars>
+          <dgm:bulletEnabled val="1"/>
+        </dgm:presLayoutVars>
+      </dgm:prSet>
+      <dgm:spPr/>
+    </dgm:pt>
+  </dgm:ptLst>
+  <dgm:cxnLst>
+    <dgm:cxn modelId="{F0D50D00-8E58-465E-AC73-634CD2611DA3}" srcId="{C943476A-9DDB-4163-BEC4-3486DA510308}" destId="{51A9A672-CFFE-4FE1-96EE-5CE20D3222CC}" srcOrd="2" destOrd="0" parTransId="{4839638F-0240-4142-9503-0CDCA376DAEA}" sibTransId="{032ACF9A-406E-4286-ADCC-9F88581997A4}"/>
+    <dgm:cxn modelId="{1D8DD602-047E-4D90-9235-D83D8442BBC8}" type="presOf" srcId="{185B5118-EEB4-4A86-94BB-8A5EFF6A72EC}" destId="{7C734A50-680F-4CB0-9334-3F75CE072784}" srcOrd="0" destOrd="1" presId="urn:microsoft.com/office/officeart/2005/8/layout/list1"/>
+    <dgm:cxn modelId="{8C2FE402-3AF9-4ABE-A269-598443FC16DF}" srcId="{1FBDAC05-72F4-4480-827C-89001B5491A6}" destId="{BE6C4B5A-649D-4EE9-8456-C236F6214F6E}" srcOrd="0" destOrd="0" parTransId="{0C3B07E8-77AE-469C-B472-18F684BF56A9}" sibTransId="{1C2E360E-5DCA-4FB0-8320-548500D759B7}"/>
+    <dgm:cxn modelId="{9B6A0C04-0716-4DA6-B435-8F7D1A96289A}" type="presOf" srcId="{1FBDAC05-72F4-4480-827C-89001B5491A6}" destId="{F847B660-F973-4893-9E5D-18D59AE4C02A}" srcOrd="0" destOrd="0" presId="urn:microsoft.com/office/officeart/2005/8/layout/list1"/>
+    <dgm:cxn modelId="{95970E04-9672-478F-9870-8EECA0F07B76}" type="presOf" srcId="{FF4F2D19-D473-402E-8A83-3A10913606E4}" destId="{3830F23F-EED2-41C8-A690-C1DBC1F42FDC}" srcOrd="0" destOrd="0" presId="urn:microsoft.com/office/officeart/2005/8/layout/list1"/>
+    <dgm:cxn modelId="{C4B72023-92AD-4179-BB37-3E19EA2E195C}" srcId="{51A9A672-CFFE-4FE1-96EE-5CE20D3222CC}" destId="{185B5118-EEB4-4A86-94BB-8A5EFF6A72EC}" srcOrd="1" destOrd="0" parTransId="{071D9F0B-CA83-45A1-BE53-27DA07807CFB}" sibTransId="{14CB0D30-CDBC-47BB-A851-CE0313A8E830}"/>
+    <dgm:cxn modelId="{3CCE182D-1714-4BF7-8B25-D43851D0C3D5}" type="presOf" srcId="{B44E69A3-078E-466B-960C-B62B7879671F}" destId="{9D681EC6-E7AB-4FA1-BAF0-E4E10900E762}" srcOrd="0" destOrd="2" presId="urn:microsoft.com/office/officeart/2005/8/layout/list1"/>
+    <dgm:cxn modelId="{E0015E2E-DFC7-412D-AB49-C9F98B1E458B}" srcId="{12472DA1-AD78-48F1-BBFC-82B0F123B572}" destId="{CF9C7F7D-8BBF-4121-B4A8-6843E74C94CD}" srcOrd="0" destOrd="0" parTransId="{795FFDC3-4EAA-4BB1-B018-4A5D24DA11DC}" sibTransId="{7422BF06-5B79-4D89-B244-50457FA0D769}"/>
+    <dgm:cxn modelId="{45D82B34-4641-42C0-B7E0-0ECC65AA8E0F}" type="presOf" srcId="{51A9A672-CFFE-4FE1-96EE-5CE20D3222CC}" destId="{15935B01-C24C-4372-8C2A-5D1C83BD7CA7}" srcOrd="0" destOrd="0" presId="urn:microsoft.com/office/officeart/2005/8/layout/list1"/>
+    <dgm:cxn modelId="{ECD17E3E-D541-4F9B-BE26-4D70918C6FD4}" type="presOf" srcId="{D48E6D87-6472-4E12-A198-EF310FDE649F}" destId="{7C734A50-680F-4CB0-9334-3F75CE072784}" srcOrd="0" destOrd="0" presId="urn:microsoft.com/office/officeart/2005/8/layout/list1"/>
+    <dgm:cxn modelId="{CF57BB3E-F92A-4C33-A96E-16D884919295}" type="presOf" srcId="{12472DA1-AD78-48F1-BBFC-82B0F123B572}" destId="{38B729AF-1E8A-46B8-B029-FB71CC182613}" srcOrd="1" destOrd="0" presId="urn:microsoft.com/office/officeart/2005/8/layout/list1"/>
+    <dgm:cxn modelId="{6E2F6B42-EB84-4AD1-9AD4-224B21B19EA9}" srcId="{51A9A672-CFFE-4FE1-96EE-5CE20D3222CC}" destId="{6A2B05C8-2516-4501-85C6-D475251E883B}" srcOrd="2" destOrd="0" parTransId="{2C2469DF-FCCF-4B49-9B8E-407EEC33856E}" sibTransId="{CC50BB1C-E416-4F32-BCAC-DB0BCEBCB17B}"/>
+    <dgm:cxn modelId="{222D6171-14E8-4DF5-8100-78364D74F7D1}" type="presOf" srcId="{BE6C4B5A-649D-4EE9-8456-C236F6214F6E}" destId="{4E3BA3F2-15C8-451C-9F5E-1CFA274993DD}" srcOrd="0" destOrd="0" presId="urn:microsoft.com/office/officeart/2005/8/layout/list1"/>
+    <dgm:cxn modelId="{56BF3473-AC6E-4696-9570-BE2F3E2FC3AA}" srcId="{FF4F2D19-D473-402E-8A83-3A10913606E4}" destId="{AD6A475C-2465-4BC2-BF7F-D4B2DF0192AA}" srcOrd="0" destOrd="0" parTransId="{37B7DD37-071D-4831-BFAB-67F90CEF06B0}" sibTransId="{F07C14E5-0FE5-43D1-A6B6-EC80DD5EF32B}"/>
+    <dgm:cxn modelId="{C4F4C554-2402-4AE4-9504-040F3AE13184}" srcId="{FF4F2D19-D473-402E-8A83-3A10913606E4}" destId="{6F40939D-3F12-4194-BE33-3E1CF49EAEA2}" srcOrd="1" destOrd="0" parTransId="{8ED93F39-97F0-43CC-9414-C2FE1BBAC8A8}" sibTransId="{5FD7E32F-3934-4793-8106-A97C7A3311DF}"/>
+    <dgm:cxn modelId="{03D89575-C623-4382-8928-EE58DC0C08E1}" type="presOf" srcId="{FF4F2D19-D473-402E-8A83-3A10913606E4}" destId="{4BED44EF-1FA4-4761-821E-7AD7CDF82849}" srcOrd="1" destOrd="0" presId="urn:microsoft.com/office/officeart/2005/8/layout/list1"/>
+    <dgm:cxn modelId="{A6BC2058-7123-4BE2-81AE-45EE6EC2CB22}" srcId="{51A9A672-CFFE-4FE1-96EE-5CE20D3222CC}" destId="{D48E6D87-6472-4E12-A198-EF310FDE649F}" srcOrd="0" destOrd="0" parTransId="{36D95CC0-9EA7-400D-AC1C-5BD932B8C92C}" sibTransId="{7178AF1D-BCDE-4D53-9C0F-79A08D0F7730}"/>
+    <dgm:cxn modelId="{3B48E778-93DF-4ED3-817C-649D6D7F9DFA}" srcId="{C943476A-9DDB-4163-BEC4-3486DA510308}" destId="{1FBDAC05-72F4-4480-827C-89001B5491A6}" srcOrd="1" destOrd="0" parTransId="{E199F569-8D5E-40C3-9CE7-DE1D5A8B6D29}" sibTransId="{C2591432-0070-4D47-89F4-D4795BC746A7}"/>
+    <dgm:cxn modelId="{E85A2D8A-48E8-4D22-AD44-CB94A5AB3DA1}" type="presOf" srcId="{581AC865-252D-42BF-81DA-C29B5D424212}" destId="{4E3BA3F2-15C8-451C-9F5E-1CFA274993DD}" srcOrd="0" destOrd="1" presId="urn:microsoft.com/office/officeart/2005/8/layout/list1"/>
+    <dgm:cxn modelId="{5FA08697-0844-4B38-9727-315B50B8384A}" type="presOf" srcId="{82299A1B-009C-4932-A512-1648B8A8AF64}" destId="{A383B95A-03E3-4E56-9B26-2400215044D9}" srcOrd="0" destOrd="1" presId="urn:microsoft.com/office/officeart/2005/8/layout/list1"/>
+    <dgm:cxn modelId="{DA62A89D-6071-4378-BA47-9C85B36C0791}" srcId="{12472DA1-AD78-48F1-BBFC-82B0F123B572}" destId="{6A75E29B-0AA9-4A75-8FE5-EDD8FF92FEB3}" srcOrd="2" destOrd="0" parTransId="{9BE11743-D59D-407B-A578-29D1C8348E70}" sibTransId="{B83E95A3-6D8A-49D5-8EDE-C44F8DABCFB3}"/>
+    <dgm:cxn modelId="{EFB4AC9E-4CEC-4178-8462-AB245442A0BA}" type="presOf" srcId="{C943476A-9DDB-4163-BEC4-3486DA510308}" destId="{4003E091-6602-4829-89B3-2E7F9DD5E3F1}" srcOrd="0" destOrd="0" presId="urn:microsoft.com/office/officeart/2005/8/layout/list1"/>
+    <dgm:cxn modelId="{65240CA2-601E-450E-82E0-50261C837822}" type="presOf" srcId="{1FBDAC05-72F4-4480-827C-89001B5491A6}" destId="{62D7583B-B76D-4CB7-907D-90C29E091D5C}" srcOrd="1" destOrd="0" presId="urn:microsoft.com/office/officeart/2005/8/layout/list1"/>
+    <dgm:cxn modelId="{E25EAAA8-B7C3-49C8-96D9-8293B633BC21}" srcId="{FF4F2D19-D473-402E-8A83-3A10913606E4}" destId="{B44E69A3-078E-466B-960C-B62B7879671F}" srcOrd="2" destOrd="0" parTransId="{E6E7F560-5F5A-40D1-A430-6D1E58BF74D5}" sibTransId="{BF0F11E0-47FF-4A58-8CCD-1A1E043C49CD}"/>
+    <dgm:cxn modelId="{69BC8FB7-070C-45FD-9B66-DA5531E8A74E}" type="presOf" srcId="{AD6A475C-2465-4BC2-BF7F-D4B2DF0192AA}" destId="{9D681EC6-E7AB-4FA1-BAF0-E4E10900E762}" srcOrd="0" destOrd="0" presId="urn:microsoft.com/office/officeart/2005/8/layout/list1"/>
+    <dgm:cxn modelId="{331B7BC3-423B-4B6D-AD43-E131AB233A3E}" type="presOf" srcId="{6A75E29B-0AA9-4A75-8FE5-EDD8FF92FEB3}" destId="{A383B95A-03E3-4E56-9B26-2400215044D9}" srcOrd="0" destOrd="2" presId="urn:microsoft.com/office/officeart/2005/8/layout/list1"/>
+    <dgm:cxn modelId="{D1AFFECC-315C-4148-9775-67601554C4DA}" type="presOf" srcId="{6F40939D-3F12-4194-BE33-3E1CF49EAEA2}" destId="{9D681EC6-E7AB-4FA1-BAF0-E4E10900E762}" srcOrd="0" destOrd="1" presId="urn:microsoft.com/office/officeart/2005/8/layout/list1"/>
+    <dgm:cxn modelId="{85D5E4D8-B333-4482-AF4D-66F852A20608}" type="presOf" srcId="{51A9A672-CFFE-4FE1-96EE-5CE20D3222CC}" destId="{25512264-5BF7-4A1A-8BC3-C13A92CE9DCB}" srcOrd="1" destOrd="0" presId="urn:microsoft.com/office/officeart/2005/8/layout/list1"/>
+    <dgm:cxn modelId="{D0A7C4D9-D684-47C5-A411-B0B0A53FB828}" srcId="{1FBDAC05-72F4-4480-827C-89001B5491A6}" destId="{581AC865-252D-42BF-81DA-C29B5D424212}" srcOrd="1" destOrd="0" parTransId="{47F03D84-0DEA-4A03-A222-18298E7A4BB4}" sibTransId="{6B92FB9D-DDD3-4454-A362-2EFB2F41207D}"/>
+    <dgm:cxn modelId="{788FA8DF-5D14-465B-9EDD-53849C276981}" srcId="{12472DA1-AD78-48F1-BBFC-82B0F123B572}" destId="{82299A1B-009C-4932-A512-1648B8A8AF64}" srcOrd="1" destOrd="0" parTransId="{3AFAE142-9CDA-4974-84AE-2EAD930F6EE4}" sibTransId="{5B4DC42B-5604-4E56-9B06-3B2899E5F4E6}"/>
+    <dgm:cxn modelId="{8D07F1E2-D37E-4BE0-9DEE-DFCACCA29587}" srcId="{C943476A-9DDB-4163-BEC4-3486DA510308}" destId="{FF4F2D19-D473-402E-8A83-3A10913606E4}" srcOrd="3" destOrd="0" parTransId="{8B001D15-9789-45EB-AB9E-116B6FB872C2}" sibTransId="{B8F91E49-1B8E-4817-B025-4D156399DFF0}"/>
+    <dgm:cxn modelId="{DBA107E6-7124-4EE5-8A7C-8BB56895A4D7}" type="presOf" srcId="{6A2B05C8-2516-4501-85C6-D475251E883B}" destId="{7C734A50-680F-4CB0-9334-3F75CE072784}" srcOrd="0" destOrd="2" presId="urn:microsoft.com/office/officeart/2005/8/layout/list1"/>
+    <dgm:cxn modelId="{A8CBE6EB-F431-41BD-9999-E3535863497D}" type="presOf" srcId="{12472DA1-AD78-48F1-BBFC-82B0F123B572}" destId="{175A0E16-8F30-42BB-A2DA-F23360EE247C}" srcOrd="0" destOrd="0" presId="urn:microsoft.com/office/officeart/2005/8/layout/list1"/>
+    <dgm:cxn modelId="{6AAC1AFA-692A-461C-B6AF-8E082E3A03E0}" type="presOf" srcId="{CF9C7F7D-8BBF-4121-B4A8-6843E74C94CD}" destId="{A383B95A-03E3-4E56-9B26-2400215044D9}" srcOrd="0" destOrd="0" presId="urn:microsoft.com/office/officeart/2005/8/layout/list1"/>
+    <dgm:cxn modelId="{640958FB-483B-4F8D-8A9D-AE4D799E1091}" srcId="{C943476A-9DDB-4163-BEC4-3486DA510308}" destId="{12472DA1-AD78-48F1-BBFC-82B0F123B572}" srcOrd="0" destOrd="0" parTransId="{2AAE6DDE-FE86-4B33-95C8-97C2534F761F}" sibTransId="{A0CF5BF4-949F-4ECA-B927-1533092DF057}"/>
+    <dgm:cxn modelId="{724AE8BF-93F2-41A9-B9D4-EFA3664992D5}" type="presParOf" srcId="{4003E091-6602-4829-89B3-2E7F9DD5E3F1}" destId="{8D043187-6634-4F28-AECE-E34556425878}" srcOrd="0" destOrd="0" presId="urn:microsoft.com/office/officeart/2005/8/layout/list1"/>
+    <dgm:cxn modelId="{40FCBD9A-85DE-44D8-84BD-C97A804F97BC}" type="presParOf" srcId="{8D043187-6634-4F28-AECE-E34556425878}" destId="{175A0E16-8F30-42BB-A2DA-F23360EE247C}" srcOrd="0" destOrd="0" presId="urn:microsoft.com/office/officeart/2005/8/layout/list1"/>
+    <dgm:cxn modelId="{FD9B2485-D01F-466D-83B9-E7B5B442C4DF}" type="presParOf" srcId="{8D043187-6634-4F28-AECE-E34556425878}" destId="{38B729AF-1E8A-46B8-B029-FB71CC182613}" srcOrd="1" destOrd="0" presId="urn:microsoft.com/office/officeart/2005/8/layout/list1"/>
+    <dgm:cxn modelId="{79894185-DAFF-4F04-B70E-4F06B1B2C813}" type="presParOf" srcId="{4003E091-6602-4829-89B3-2E7F9DD5E3F1}" destId="{61C5FE1B-7AF8-4B7A-89E6-1B2539C1BE7D}" srcOrd="1" destOrd="0" presId="urn:microsoft.com/office/officeart/2005/8/layout/list1"/>
+    <dgm:cxn modelId="{F1077986-E430-480C-B6A5-FE93E1A3D729}" type="presParOf" srcId="{4003E091-6602-4829-89B3-2E7F9DD5E3F1}" destId="{A383B95A-03E3-4E56-9B26-2400215044D9}" srcOrd="2" destOrd="0" presId="urn:microsoft.com/office/officeart/2005/8/layout/list1"/>
+    <dgm:cxn modelId="{69C23163-427A-44D6-AEB4-C98B720C0649}" type="presParOf" srcId="{4003E091-6602-4829-89B3-2E7F9DD5E3F1}" destId="{1903BC8D-6E94-4E7C-8D48-12273CC6590C}" srcOrd="3" destOrd="0" presId="urn:microsoft.com/office/officeart/2005/8/layout/list1"/>
+    <dgm:cxn modelId="{6AC8B95B-5FFF-4C87-A9CB-E399E0CC784A}" type="presParOf" srcId="{4003E091-6602-4829-89B3-2E7F9DD5E3F1}" destId="{18337641-A1B9-4B81-9DA9-B68185FBB582}" srcOrd="4" destOrd="0" presId="urn:microsoft.com/office/officeart/2005/8/layout/list1"/>
+    <dgm:cxn modelId="{3CB82E51-A441-4F37-99A7-36B51A20077D}" type="presParOf" srcId="{18337641-A1B9-4B81-9DA9-B68185FBB582}" destId="{F847B660-F973-4893-9E5D-18D59AE4C02A}" srcOrd="0" destOrd="0" presId="urn:microsoft.com/office/officeart/2005/8/layout/list1"/>
+    <dgm:cxn modelId="{ACEB2FBD-6F78-43AB-8CC1-BAD038F7BF91}" type="presParOf" srcId="{18337641-A1B9-4B81-9DA9-B68185FBB582}" destId="{62D7583B-B76D-4CB7-907D-90C29E091D5C}" srcOrd="1" destOrd="0" presId="urn:microsoft.com/office/officeart/2005/8/layout/list1"/>
+    <dgm:cxn modelId="{AB7FA343-AE87-404F-B680-C1C773DF0103}" type="presParOf" srcId="{4003E091-6602-4829-89B3-2E7F9DD5E3F1}" destId="{15542EDB-D485-4F47-BA19-10040AF4B872}" srcOrd="5" destOrd="0" presId="urn:microsoft.com/office/officeart/2005/8/layout/list1"/>
+    <dgm:cxn modelId="{B7A16E38-BA8A-419B-9C02-0078D4E68DEE}" type="presParOf" srcId="{4003E091-6602-4829-89B3-2E7F9DD5E3F1}" destId="{4E3BA3F2-15C8-451C-9F5E-1CFA274993DD}" srcOrd="6" destOrd="0" presId="urn:microsoft.com/office/officeart/2005/8/layout/list1"/>
+    <dgm:cxn modelId="{1EB6EDF1-9101-4B05-AB73-52860D35FA6F}" type="presParOf" srcId="{4003E091-6602-4829-89B3-2E7F9DD5E3F1}" destId="{BFB80725-DBDB-4FD8-90BF-88D64262C164}" srcOrd="7" destOrd="0" presId="urn:microsoft.com/office/officeart/2005/8/layout/list1"/>
+    <dgm:cxn modelId="{7EA7BD70-4BAF-4610-8A63-7F25F47C805F}" type="presParOf" srcId="{4003E091-6602-4829-89B3-2E7F9DD5E3F1}" destId="{FD94BA82-BE35-424C-B898-C7296C59A126}" srcOrd="8" destOrd="0" presId="urn:microsoft.com/office/officeart/2005/8/layout/list1"/>
+    <dgm:cxn modelId="{D9C16D26-74D7-4B40-9A60-F4C208E8F814}" type="presParOf" srcId="{FD94BA82-BE35-424C-B898-C7296C59A126}" destId="{15935B01-C24C-4372-8C2A-5D1C83BD7CA7}" srcOrd="0" destOrd="0" presId="urn:microsoft.com/office/officeart/2005/8/layout/list1"/>
+    <dgm:cxn modelId="{2312D977-DFBD-4208-B15E-4CE7E9368198}" type="presParOf" srcId="{FD94BA82-BE35-424C-B898-C7296C59A126}" destId="{25512264-5BF7-4A1A-8BC3-C13A92CE9DCB}" srcOrd="1" destOrd="0" presId="urn:microsoft.com/office/officeart/2005/8/layout/list1"/>
+    <dgm:cxn modelId="{E4EE6AD5-C65B-4187-A8EC-32A06411B577}" type="presParOf" srcId="{4003E091-6602-4829-89B3-2E7F9DD5E3F1}" destId="{00DE3E07-F29C-42DF-AA4E-0891FB1C3F6F}" srcOrd="9" destOrd="0" presId="urn:microsoft.com/office/officeart/2005/8/layout/list1"/>
+    <dgm:cxn modelId="{F4B6704B-4BF4-41EF-B407-EB3514E76621}" type="presParOf" srcId="{4003E091-6602-4829-89B3-2E7F9DD5E3F1}" destId="{7C734A50-680F-4CB0-9334-3F75CE072784}" srcOrd="10" destOrd="0" presId="urn:microsoft.com/office/officeart/2005/8/layout/list1"/>
+    <dgm:cxn modelId="{05A515C7-0786-4DD2-83CE-B0254D02BD25}" type="presParOf" srcId="{4003E091-6602-4829-89B3-2E7F9DD5E3F1}" destId="{F461D10E-3F95-4C01-8A9E-54DF6DE8A180}" srcOrd="11" destOrd="0" presId="urn:microsoft.com/office/officeart/2005/8/layout/list1"/>
+    <dgm:cxn modelId="{9AF6EE28-0679-4FE1-A336-65E3363CE15E}" type="presParOf" srcId="{4003E091-6602-4829-89B3-2E7F9DD5E3F1}" destId="{752A48C4-E0CA-45E6-BA67-FF376BD65F85}" srcOrd="12" destOrd="0" presId="urn:microsoft.com/office/officeart/2005/8/layout/list1"/>
+    <dgm:cxn modelId="{2F19CBDC-B936-434E-88DD-EE1A7C6097ED}" type="presParOf" srcId="{752A48C4-E0CA-45E6-BA67-FF376BD65F85}" destId="{3830F23F-EED2-41C8-A690-C1DBC1F42FDC}" srcOrd="0" destOrd="0" presId="urn:microsoft.com/office/officeart/2005/8/layout/list1"/>
+    <dgm:cxn modelId="{F7AD15E0-44BC-492E-837B-697B8E387B54}" type="presParOf" srcId="{752A48C4-E0CA-45E6-BA67-FF376BD65F85}" destId="{4BED44EF-1FA4-4761-821E-7AD7CDF82849}" srcOrd="1" destOrd="0" presId="urn:microsoft.com/office/officeart/2005/8/layout/list1"/>
+    <dgm:cxn modelId="{7DB54767-EBE1-48EC-847C-C259A3269D04}" type="presParOf" srcId="{4003E091-6602-4829-89B3-2E7F9DD5E3F1}" destId="{2ED46FE7-C7C7-46BE-9752-6ECB2C7E5F00}" srcOrd="13" destOrd="0" presId="urn:microsoft.com/office/officeart/2005/8/layout/list1"/>
+    <dgm:cxn modelId="{919CC7D0-7176-4F84-9BFA-FB8F301F05A4}" type="presParOf" srcId="{4003E091-6602-4829-89B3-2E7F9DD5E3F1}" destId="{9D681EC6-E7AB-4FA1-BAF0-E4E10900E762}" srcOrd="14" destOrd="0" presId="urn:microsoft.com/office/officeart/2005/8/layout/list1"/>
+  </dgm:cxnLst>
+  <dgm:bg/>
+  <dgm:whole/>
+  <dgm:extLst>
+    <a:ext uri="http://schemas.microsoft.com/office/drawing/2008/diagram">
+      <dsp:dataModelExt xmlns:dsp="http://schemas.microsoft.com/office/drawing/2008/diagram" relId="rId7" minVer="http://schemas.openxmlformats.org/drawingml/2006/diagram"/>
+    </a:ext>
+  </dgm:extLst>
+</dgm:dataModel>
+</file>
+
 <file path=ppt/diagrams/drawing1.xml><?xml version="1.0" encoding="utf-8"?>
 <dsp:drawing xmlns:dgm="http://schemas.openxmlformats.org/drawingml/2006/diagram" xmlns:dsp="http://schemas.microsoft.com/office/drawing/2008/diagram" xmlns:a="http://schemas.openxmlformats.org/drawingml/2006/main">
   <dsp:spTree>
@@ -5318,13 +6851,13 @@
             <a:buNone/>
           </a:pPr>
           <a:r>
-            <a:rPr lang="en-IN" sz="1600" b="1" i="1" kern="1200" dirty="0">
+            <a:rPr lang="en-IN" sz="1600" b="1" i="0" kern="1200" dirty="0">
               <a:latin typeface="Times New Roman" panose="02020603050405020304" pitchFamily="18" charset="0"/>
               <a:cs typeface="Times New Roman" panose="02020603050405020304" pitchFamily="18" charset="0"/>
             </a:rPr>
             <a:t>1. Problem Statement</a:t>
           </a:r>
-          <a:endParaRPr lang="en-US" sz="1600" b="1" i="1" kern="1200" dirty="0">
+          <a:endParaRPr lang="en-US" sz="1600" b="1" i="0" kern="1200" dirty="0">
             <a:latin typeface="Times New Roman" panose="02020603050405020304" pitchFamily="18" charset="0"/>
             <a:cs typeface="Times New Roman" panose="02020603050405020304" pitchFamily="18" charset="0"/>
           </a:endParaRPr>
@@ -5453,13 +6986,13 @@
             <a:buNone/>
           </a:pPr>
           <a:r>
-            <a:rPr lang="en-IN" sz="1600" b="1" i="1" kern="1200" dirty="0">
+            <a:rPr lang="en-IN" sz="1600" b="1" i="0" kern="1200" dirty="0">
               <a:latin typeface="Times New Roman" panose="02020603050405020304" pitchFamily="18" charset="0"/>
               <a:cs typeface="Times New Roman" panose="02020603050405020304" pitchFamily="18" charset="0"/>
             </a:rPr>
             <a:t>2.Introduction</a:t>
           </a:r>
-          <a:endParaRPr lang="en-US" sz="1600" b="1" i="1" kern="1200" dirty="0">
+          <a:endParaRPr lang="en-US" sz="1600" b="1" i="0" kern="1200" dirty="0">
             <a:latin typeface="Times New Roman" panose="02020603050405020304" pitchFamily="18" charset="0"/>
             <a:cs typeface="Times New Roman" panose="02020603050405020304" pitchFamily="18" charset="0"/>
           </a:endParaRPr>
@@ -5588,13 +7121,13 @@
             <a:buNone/>
           </a:pPr>
           <a:r>
-            <a:rPr lang="en-IN" sz="1600" b="1" i="1" kern="1200" dirty="0">
+            <a:rPr lang="en-IN" sz="1600" b="1" i="0" kern="1200" dirty="0">
               <a:latin typeface="Times New Roman" panose="02020603050405020304" pitchFamily="18" charset="0"/>
               <a:cs typeface="Times New Roman" panose="02020603050405020304" pitchFamily="18" charset="0"/>
             </a:rPr>
             <a:t>3.Working Principles of KNN</a:t>
           </a:r>
-          <a:endParaRPr lang="en-US" sz="1600" b="1" i="1" kern="1200" dirty="0">
+          <a:endParaRPr lang="en-US" sz="1600" b="1" i="0" kern="1200" dirty="0">
             <a:latin typeface="Times New Roman" panose="02020603050405020304" pitchFamily="18" charset="0"/>
             <a:cs typeface="Times New Roman" panose="02020603050405020304" pitchFamily="18" charset="0"/>
           </a:endParaRPr>
@@ -5723,13 +7256,13 @@
             <a:buNone/>
           </a:pPr>
           <a:r>
-            <a:rPr lang="en-IN" sz="1600" b="1" i="1" kern="1200" dirty="0">
+            <a:rPr lang="en-IN" sz="1600" b="1" i="0" kern="1200" dirty="0">
               <a:latin typeface="Times New Roman" panose="02020603050405020304" pitchFamily="18" charset="0"/>
               <a:cs typeface="Times New Roman" panose="02020603050405020304" pitchFamily="18" charset="0"/>
             </a:rPr>
             <a:t>4.Design Principles of KNN Classifier</a:t>
           </a:r>
-          <a:endParaRPr lang="en-US" sz="1600" b="1" i="1" kern="1200" dirty="0">
+          <a:endParaRPr lang="en-US" sz="1600" b="1" i="0" kern="1200" dirty="0">
             <a:latin typeface="Times New Roman" panose="02020603050405020304" pitchFamily="18" charset="0"/>
             <a:cs typeface="Times New Roman" panose="02020603050405020304" pitchFamily="18" charset="0"/>
           </a:endParaRPr>
@@ -5858,13 +7391,13 @@
             <a:buNone/>
           </a:pPr>
           <a:r>
-            <a:rPr lang="en-IN" sz="1600" b="1" i="1" kern="1200" dirty="0">
+            <a:rPr lang="en-IN" sz="1600" b="1" i="0" kern="1200" dirty="0">
               <a:latin typeface="Times New Roman" panose="02020603050405020304" pitchFamily="18" charset="0"/>
               <a:cs typeface="Times New Roman" panose="02020603050405020304" pitchFamily="18" charset="0"/>
             </a:rPr>
             <a:t>5.Building Blocks of the model</a:t>
           </a:r>
-          <a:endParaRPr lang="en-US" sz="1600" b="1" i="1" kern="1200" dirty="0">
+          <a:endParaRPr lang="en-US" sz="1600" b="1" i="0" kern="1200" dirty="0">
             <a:latin typeface="Times New Roman" panose="02020603050405020304" pitchFamily="18" charset="0"/>
             <a:cs typeface="Times New Roman" panose="02020603050405020304" pitchFamily="18" charset="0"/>
           </a:endParaRPr>
@@ -5993,13 +7526,13 @@
             <a:buNone/>
           </a:pPr>
           <a:r>
-            <a:rPr lang="en-IN" sz="1600" b="1" i="1" kern="1200" dirty="0">
+            <a:rPr lang="en-IN" sz="1600" b="1" i="0" kern="1200" dirty="0">
               <a:latin typeface="Times New Roman" panose="02020603050405020304" pitchFamily="18" charset="0"/>
               <a:cs typeface="Times New Roman" panose="02020603050405020304" pitchFamily="18" charset="0"/>
             </a:rPr>
             <a:t>6.KNN model construction and Unit testing</a:t>
           </a:r>
-          <a:endParaRPr lang="en-US" sz="1600" b="1" i="1" kern="1200" dirty="0">
+          <a:endParaRPr lang="en-US" sz="1600" b="1" i="0" kern="1200" dirty="0">
             <a:latin typeface="Times New Roman" panose="02020603050405020304" pitchFamily="18" charset="0"/>
             <a:cs typeface="Times New Roman" panose="02020603050405020304" pitchFamily="18" charset="0"/>
           </a:endParaRPr>
@@ -6128,13 +7661,13 @@
             <a:buNone/>
           </a:pPr>
           <a:r>
-            <a:rPr lang="en-IN" sz="1600" b="1" i="1" kern="1200" dirty="0">
+            <a:rPr lang="en-IN" sz="1600" b="1" i="0" kern="1200" dirty="0">
               <a:latin typeface="Times New Roman" panose="02020603050405020304" pitchFamily="18" charset="0"/>
               <a:cs typeface="Times New Roman" panose="02020603050405020304" pitchFamily="18" charset="0"/>
             </a:rPr>
             <a:t>7.Results </a:t>
           </a:r>
-          <a:endParaRPr lang="en-US" sz="1600" b="1" i="1" kern="1200" dirty="0">
+          <a:endParaRPr lang="en-US" sz="1600" b="1" i="0" kern="1200" dirty="0">
             <a:latin typeface="Times New Roman" panose="02020603050405020304" pitchFamily="18" charset="0"/>
             <a:cs typeface="Times New Roman" panose="02020603050405020304" pitchFamily="18" charset="0"/>
           </a:endParaRPr>
@@ -6263,13 +7796,13 @@
             <a:buNone/>
           </a:pPr>
           <a:r>
-            <a:rPr lang="en-IN" sz="1600" b="1" i="1" kern="1200" dirty="0">
+            <a:rPr lang="en-IN" sz="1600" b="1" i="0" kern="1200" dirty="0">
               <a:latin typeface="Times New Roman" panose="02020603050405020304" pitchFamily="18" charset="0"/>
               <a:cs typeface="Times New Roman" panose="02020603050405020304" pitchFamily="18" charset="0"/>
             </a:rPr>
             <a:t>8. Conclusion </a:t>
           </a:r>
-          <a:endParaRPr lang="en-US" sz="1600" b="1" i="1" kern="1200" dirty="0">
+          <a:endParaRPr lang="en-US" sz="1600" b="1" i="0" kern="1200" dirty="0">
             <a:latin typeface="Times New Roman" panose="02020603050405020304" pitchFamily="18" charset="0"/>
             <a:cs typeface="Times New Roman" panose="02020603050405020304" pitchFamily="18" charset="0"/>
           </a:endParaRPr>
@@ -6299,8 +7832,8 @@
       </dsp:nvSpPr>
       <dsp:spPr>
         <a:xfrm>
-          <a:off x="0" y="564940"/>
-          <a:ext cx="10927829" cy="1141409"/>
+          <a:off x="0" y="599528"/>
+          <a:ext cx="10927829" cy="1106821"/>
         </a:xfrm>
         <a:prstGeom prst="roundRect">
           <a:avLst>
@@ -6341,8 +7874,8 @@
       </dsp:nvSpPr>
       <dsp:spPr>
         <a:xfrm>
-          <a:off x="345276" y="821757"/>
-          <a:ext cx="627775" cy="627775"/>
+          <a:off x="334813" y="848563"/>
+          <a:ext cx="608751" cy="608751"/>
         </a:xfrm>
         <a:prstGeom prst="rect">
           <a:avLst/>
@@ -6398,8 +7931,8 @@
       </dsp:nvSpPr>
       <dsp:spPr>
         <a:xfrm>
-          <a:off x="1318328" y="564940"/>
-          <a:ext cx="9609500" cy="1141409"/>
+          <a:off x="1278378" y="599528"/>
+          <a:ext cx="9649450" cy="1106821"/>
         </a:xfrm>
         <a:prstGeom prst="rect">
           <a:avLst/>
@@ -6423,12 +7956,12 @@
         <a:fontRef idx="minor"/>
       </dsp:style>
       <dsp:txBody>
-        <a:bodyPr spcFirstLastPara="0" vert="horz" wrap="square" lIns="120799" tIns="120799" rIns="120799" bIns="120799" numCol="1" spcCol="1270" anchor="ctr" anchorCtr="0">
+        <a:bodyPr spcFirstLastPara="0" vert="horz" wrap="square" lIns="117139" tIns="117139" rIns="117139" bIns="117139" numCol="1" spcCol="1270" anchor="ctr" anchorCtr="0">
           <a:noAutofit/>
         </a:bodyPr>
         <a:lstStyle/>
         <a:p>
-          <a:pPr marL="0" lvl="0" indent="0" algn="l" defTabSz="800100">
+          <a:pPr marL="0" lvl="0" indent="0" algn="l" defTabSz="711200">
             <a:lnSpc>
               <a:spcPct val="100000"/>
             </a:lnSpc>
@@ -6440,13 +7973,13 @@
             </a:spcAft>
             <a:buNone/>
           </a:pPr>
-          <a:endParaRPr lang="en-US" sz="1800" b="1" i="1" kern="1200" dirty="0">
+          <a:endParaRPr lang="en-US" sz="1600" b="1" i="0" kern="1200" dirty="0">
             <a:latin typeface="Times New Roman" pitchFamily="18"/>
             <a:cs typeface="Times New Roman" pitchFamily="18"/>
           </a:endParaRPr>
         </a:p>
         <a:p>
-          <a:pPr marL="0" lvl="0" indent="0" algn="l" defTabSz="800100">
+          <a:pPr marL="0" lvl="0" indent="0" algn="l" defTabSz="711200">
             <a:lnSpc>
               <a:spcPct val="100000"/>
             </a:lnSpc>
@@ -6459,14 +7992,14 @@
             <a:buNone/>
           </a:pPr>
           <a:r>
-            <a:rPr lang="en-US" sz="1800" b="1" i="1" kern="1200" dirty="0">
+            <a:rPr lang="en-US" sz="1600" b="1" i="0" kern="1200" dirty="0">
               <a:latin typeface="Times New Roman" pitchFamily="18"/>
               <a:cs typeface="Times New Roman" pitchFamily="18"/>
             </a:rPr>
             <a:t>Design the </a:t>
           </a:r>
           <a:r>
-            <a:rPr lang="en-US" sz="1800" b="1" i="1" u="none" strike="noStrike" kern="1200" cap="none" spc="0" baseline="0" dirty="0">
+            <a:rPr lang="en-US" sz="1600" b="1" i="0" u="none" strike="noStrike" kern="1200" cap="none" spc="0" baseline="0" dirty="0">
               <a:uFillTx/>
               <a:latin typeface="Times New Roman" pitchFamily="18"/>
               <a:cs typeface="Times New Roman" pitchFamily="18"/>
@@ -6476,8 +8009,8 @@
         </a:p>
       </dsp:txBody>
       <dsp:txXfrm>
-        <a:off x="1318328" y="564940"/>
-        <a:ext cx="9609500" cy="1141409"/>
+        <a:off x="1278378" y="599528"/>
+        <a:ext cx="9649450" cy="1106821"/>
       </dsp:txXfrm>
     </dsp:sp>
     <dsp:sp modelId="{C0536F8D-2F13-4ACD-ADC0-C76E10F98373}">
@@ -6488,7 +8021,7 @@
       <dsp:spPr>
         <a:xfrm>
           <a:off x="0" y="1983055"/>
-          <a:ext cx="10927829" cy="1141409"/>
+          <a:ext cx="10927829" cy="1106821"/>
         </a:xfrm>
         <a:prstGeom prst="roundRect">
           <a:avLst>
@@ -6529,8 +8062,8 @@
       </dsp:nvSpPr>
       <dsp:spPr>
         <a:xfrm>
-          <a:off x="345276" y="2239872"/>
-          <a:ext cx="627775" cy="627775"/>
+          <a:off x="334813" y="2232090"/>
+          <a:ext cx="608751" cy="608751"/>
         </a:xfrm>
         <a:prstGeom prst="rect">
           <a:avLst/>
@@ -6586,8 +8119,8 @@
       </dsp:nvSpPr>
       <dsp:spPr>
         <a:xfrm>
-          <a:off x="1318328" y="1983055"/>
-          <a:ext cx="9609500" cy="1141409"/>
+          <a:off x="1278378" y="1983055"/>
+          <a:ext cx="9649450" cy="1106821"/>
         </a:xfrm>
         <a:prstGeom prst="rect">
           <a:avLst/>
@@ -6611,12 +8144,12 @@
         <a:fontRef idx="minor"/>
       </dsp:style>
       <dsp:txBody>
-        <a:bodyPr spcFirstLastPara="0" vert="horz" wrap="square" lIns="120799" tIns="120799" rIns="120799" bIns="120799" numCol="1" spcCol="1270" anchor="ctr" anchorCtr="0">
+        <a:bodyPr spcFirstLastPara="0" vert="horz" wrap="square" lIns="117139" tIns="117139" rIns="117139" bIns="117139" numCol="1" spcCol="1270" anchor="ctr" anchorCtr="0">
           <a:noAutofit/>
         </a:bodyPr>
         <a:lstStyle/>
         <a:p>
-          <a:pPr marL="0" lvl="0" indent="0" algn="l" defTabSz="800100">
+          <a:pPr marL="0" lvl="0" indent="0" algn="l" defTabSz="711200">
             <a:lnSpc>
               <a:spcPct val="100000"/>
             </a:lnSpc>
@@ -6629,7 +8162,7 @@
             <a:buNone/>
           </a:pPr>
           <a:r>
-            <a:rPr lang="en-US" sz="1800" b="1" i="1" u="none" strike="noStrike" kern="1200" cap="none" spc="0" baseline="0" dirty="0">
+            <a:rPr lang="en-US" sz="1600" b="1" i="0" u="none" strike="noStrike" kern="1200" cap="none" spc="0" baseline="0" dirty="0">
               <a:uFillTx/>
               <a:latin typeface="Times New Roman" pitchFamily="18"/>
               <a:cs typeface="Times New Roman" pitchFamily="18"/>
@@ -6637,18 +8170,18 @@
             <a:t>Investigate the model with </a:t>
           </a:r>
           <a:r>
-            <a:rPr lang="en-US" sz="1800" b="1" i="1" kern="1200" dirty="0">
+            <a:rPr lang="en-US" sz="1600" b="1" i="0" kern="1200" dirty="0">
               <a:latin typeface="Times New Roman" pitchFamily="18"/>
               <a:cs typeface="Times New Roman" pitchFamily="18"/>
             </a:rPr>
             <a:t>Unit Test </a:t>
           </a:r>
-          <a:endParaRPr lang="en-US" sz="1800" b="1" kern="1200" dirty="0"/>
+          <a:endParaRPr lang="en-US" sz="1600" b="1" i="0" kern="1200" dirty="0"/>
         </a:p>
       </dsp:txBody>
       <dsp:txXfrm>
-        <a:off x="1318328" y="1983055"/>
-        <a:ext cx="9609500" cy="1141409"/>
+        <a:off x="1278378" y="1983055"/>
+        <a:ext cx="9649450" cy="1106821"/>
       </dsp:txXfrm>
     </dsp:sp>
   </dsp:spTree>
@@ -7751,6 +9284,787 @@
 </dsp:drawing>
 </file>
 
+<file path=ppt/diagrams/drawing5.xml><?xml version="1.0" encoding="utf-8"?>
+<dsp:drawing xmlns:dgm="http://schemas.openxmlformats.org/drawingml/2006/diagram" xmlns:dsp="http://schemas.microsoft.com/office/drawing/2008/diagram" xmlns:a="http://schemas.openxmlformats.org/drawingml/2006/main">
+  <dsp:spTree>
+    <dsp:nvGrpSpPr>
+      <dsp:cNvPr id="0" name=""/>
+      <dsp:cNvGrpSpPr/>
+    </dsp:nvGrpSpPr>
+    <dsp:grpSpPr/>
+    <dsp:sp modelId="{A383B95A-03E3-4E56-9B26-2400215044D9}">
+      <dsp:nvSpPr>
+        <dsp:cNvPr id="0" name=""/>
+        <dsp:cNvSpPr/>
+      </dsp:nvSpPr>
+      <dsp:spPr>
+        <a:xfrm>
+          <a:off x="0" y="362091"/>
+          <a:ext cx="10212698" cy="1058400"/>
+        </a:xfrm>
+        <a:prstGeom prst="rect">
+          <a:avLst/>
+        </a:prstGeom>
+        <a:solidFill>
+          <a:schemeClr val="lt1">
+            <a:alpha val="90000"/>
+            <a:hueOff val="0"/>
+            <a:satOff val="0"/>
+            <a:lumOff val="0"/>
+            <a:alphaOff val="0"/>
+          </a:schemeClr>
+        </a:solidFill>
+        <a:ln w="12700" cap="flat" cmpd="sng" algn="ctr">
+          <a:solidFill>
+            <a:schemeClr val="accent1">
+              <a:hueOff val="0"/>
+              <a:satOff val="0"/>
+              <a:lumOff val="0"/>
+              <a:alphaOff val="0"/>
+            </a:schemeClr>
+          </a:solidFill>
+          <a:prstDash val="solid"/>
+          <a:miter lim="800000"/>
+        </a:ln>
+        <a:effectLst/>
+      </dsp:spPr>
+      <dsp:style>
+        <a:lnRef idx="2">
+          <a:scrgbClr r="0" g="0" b="0"/>
+        </a:lnRef>
+        <a:fillRef idx="1">
+          <a:scrgbClr r="0" g="0" b="0"/>
+        </a:fillRef>
+        <a:effectRef idx="0">
+          <a:scrgbClr r="0" g="0" b="0"/>
+        </a:effectRef>
+        <a:fontRef idx="minor"/>
+      </dsp:style>
+      <dsp:txBody>
+        <a:bodyPr spcFirstLastPara="0" vert="horz" wrap="square" lIns="792619" tIns="291592" rIns="792619" bIns="99568" numCol="1" spcCol="1270" anchor="t" anchorCtr="0">
+          <a:noAutofit/>
+        </a:bodyPr>
+        <a:lstStyle/>
+        <a:p>
+          <a:pPr marL="114300" lvl="1" indent="-114300" algn="l" defTabSz="622300">
+            <a:lnSpc>
+              <a:spcPct val="90000"/>
+            </a:lnSpc>
+            <a:spcBef>
+              <a:spcPct val="0"/>
+            </a:spcBef>
+            <a:spcAft>
+              <a:spcPct val="15000"/>
+            </a:spcAft>
+            <a:buChar char="•"/>
+          </a:pPr>
+          <a:r>
+            <a:rPr lang="en-US" sz="1400" b="0" i="0" kern="1200"/>
+            <a:t>Method: RunMultiSequenceLearningExperimentWithImage()</a:t>
+          </a:r>
+          <a:endParaRPr lang="en-US" sz="1400" i="0" kern="1200"/>
+        </a:p>
+        <a:p>
+          <a:pPr marL="114300" lvl="1" indent="-114300" algn="l" defTabSz="622300">
+            <a:lnSpc>
+              <a:spcPct val="90000"/>
+            </a:lnSpc>
+            <a:spcBef>
+              <a:spcPct val="0"/>
+            </a:spcBef>
+            <a:spcAft>
+              <a:spcPct val="15000"/>
+            </a:spcAft>
+            <a:buChar char="•"/>
+          </a:pPr>
+          <a:r>
+            <a:rPr lang="en-US" sz="1400" b="0" i="0" kern="1200" dirty="0"/>
+            <a:t>Receives input image for processing.</a:t>
+          </a:r>
+          <a:endParaRPr lang="en-US" sz="1400" i="0" kern="1200" dirty="0"/>
+        </a:p>
+        <a:p>
+          <a:pPr marL="114300" lvl="1" indent="-114300" algn="l" defTabSz="622300">
+            <a:lnSpc>
+              <a:spcPct val="90000"/>
+            </a:lnSpc>
+            <a:spcBef>
+              <a:spcPct val="0"/>
+            </a:spcBef>
+            <a:spcAft>
+              <a:spcPct val="15000"/>
+            </a:spcAft>
+            <a:buChar char="•"/>
+          </a:pPr>
+          <a:r>
+            <a:rPr lang="en-US" sz="1400" b="0" i="0" kern="1200"/>
+            <a:t>Transformation:</a:t>
+          </a:r>
+          <a:endParaRPr lang="en-US" sz="1400" i="0" kern="1200"/>
+        </a:p>
+      </dsp:txBody>
+      <dsp:txXfrm>
+        <a:off x="0" y="362091"/>
+        <a:ext cx="10212698" cy="1058400"/>
+      </dsp:txXfrm>
+    </dsp:sp>
+    <dsp:sp modelId="{38B729AF-1E8A-46B8-B029-FB71CC182613}">
+      <dsp:nvSpPr>
+        <dsp:cNvPr id="0" name=""/>
+        <dsp:cNvSpPr/>
+      </dsp:nvSpPr>
+      <dsp:spPr>
+        <a:xfrm>
+          <a:off x="510634" y="155451"/>
+          <a:ext cx="7148888" cy="413280"/>
+        </a:xfrm>
+        <a:prstGeom prst="roundRect">
+          <a:avLst/>
+        </a:prstGeom>
+        <a:solidFill>
+          <a:schemeClr val="accent1">
+            <a:hueOff val="0"/>
+            <a:satOff val="0"/>
+            <a:lumOff val="0"/>
+            <a:alphaOff val="0"/>
+          </a:schemeClr>
+        </a:solidFill>
+        <a:ln w="12700" cap="flat" cmpd="sng" algn="ctr">
+          <a:solidFill>
+            <a:schemeClr val="lt1">
+              <a:hueOff val="0"/>
+              <a:satOff val="0"/>
+              <a:lumOff val="0"/>
+              <a:alphaOff val="0"/>
+            </a:schemeClr>
+          </a:solidFill>
+          <a:prstDash val="solid"/>
+          <a:miter lim="800000"/>
+        </a:ln>
+        <a:effectLst/>
+      </dsp:spPr>
+      <dsp:style>
+        <a:lnRef idx="2">
+          <a:scrgbClr r="0" g="0" b="0"/>
+        </a:lnRef>
+        <a:fillRef idx="1">
+          <a:scrgbClr r="0" g="0" b="0"/>
+        </a:fillRef>
+        <a:effectRef idx="0">
+          <a:scrgbClr r="0" g="0" b="0"/>
+        </a:effectRef>
+        <a:fontRef idx="minor">
+          <a:schemeClr val="lt1"/>
+        </a:fontRef>
+      </dsp:style>
+      <dsp:txBody>
+        <a:bodyPr spcFirstLastPara="0" vert="horz" wrap="square" lIns="270211" tIns="0" rIns="270211" bIns="0" numCol="1" spcCol="1270" anchor="ctr" anchorCtr="0">
+          <a:noAutofit/>
+        </a:bodyPr>
+        <a:lstStyle/>
+        <a:p>
+          <a:pPr marL="0" lvl="0" indent="0" algn="l" defTabSz="622300">
+            <a:lnSpc>
+              <a:spcPct val="90000"/>
+            </a:lnSpc>
+            <a:spcBef>
+              <a:spcPct val="0"/>
+            </a:spcBef>
+            <a:spcAft>
+              <a:spcPct val="35000"/>
+            </a:spcAft>
+            <a:buNone/>
+          </a:pPr>
+          <a:r>
+            <a:rPr lang="en-US" sz="1400" b="0" i="0" kern="1200"/>
+            <a:t>Input Handling:</a:t>
+          </a:r>
+          <a:endParaRPr lang="en-US" sz="1400" i="0" kern="1200"/>
+        </a:p>
+      </dsp:txBody>
+      <dsp:txXfrm>
+        <a:off x="530809" y="175626"/>
+        <a:ext cx="7108538" cy="372930"/>
+      </dsp:txXfrm>
+    </dsp:sp>
+    <dsp:sp modelId="{4E3BA3F2-15C8-451C-9F5E-1CFA274993DD}">
+      <dsp:nvSpPr>
+        <dsp:cNvPr id="0" name=""/>
+        <dsp:cNvSpPr/>
+      </dsp:nvSpPr>
+      <dsp:spPr>
+        <a:xfrm>
+          <a:off x="0" y="1702731"/>
+          <a:ext cx="10212698" cy="815850"/>
+        </a:xfrm>
+        <a:prstGeom prst="rect">
+          <a:avLst/>
+        </a:prstGeom>
+        <a:solidFill>
+          <a:schemeClr val="lt1">
+            <a:alpha val="90000"/>
+            <a:hueOff val="0"/>
+            <a:satOff val="0"/>
+            <a:lumOff val="0"/>
+            <a:alphaOff val="0"/>
+          </a:schemeClr>
+        </a:solidFill>
+        <a:ln w="12700" cap="flat" cmpd="sng" algn="ctr">
+          <a:solidFill>
+            <a:schemeClr val="accent1">
+              <a:hueOff val="0"/>
+              <a:satOff val="0"/>
+              <a:lumOff val="0"/>
+              <a:alphaOff val="0"/>
+            </a:schemeClr>
+          </a:solidFill>
+          <a:prstDash val="solid"/>
+          <a:miter lim="800000"/>
+        </a:ln>
+        <a:effectLst/>
+      </dsp:spPr>
+      <dsp:style>
+        <a:lnRef idx="2">
+          <a:scrgbClr r="0" g="0" b="0"/>
+        </a:lnRef>
+        <a:fillRef idx="1">
+          <a:scrgbClr r="0" g="0" b="0"/>
+        </a:fillRef>
+        <a:effectRef idx="0">
+          <a:scrgbClr r="0" g="0" b="0"/>
+        </a:effectRef>
+        <a:fontRef idx="minor"/>
+      </dsp:style>
+      <dsp:txBody>
+        <a:bodyPr spcFirstLastPara="0" vert="horz" wrap="square" lIns="792619" tIns="291592" rIns="792619" bIns="99568" numCol="1" spcCol="1270" anchor="t" anchorCtr="0">
+          <a:noAutofit/>
+        </a:bodyPr>
+        <a:lstStyle/>
+        <a:p>
+          <a:pPr marL="114300" lvl="1" indent="-114300" algn="l" defTabSz="622300">
+            <a:lnSpc>
+              <a:spcPct val="90000"/>
+            </a:lnSpc>
+            <a:spcBef>
+              <a:spcPct val="0"/>
+            </a:spcBef>
+            <a:spcAft>
+              <a:spcPct val="15000"/>
+            </a:spcAft>
+            <a:buChar char="•"/>
+          </a:pPr>
+          <a:r>
+            <a:rPr lang="en-US" sz="1400" b="0" i="0" kern="1200" dirty="0"/>
+            <a:t>Method: </a:t>
+          </a:r>
+          <a:r>
+            <a:rPr lang="en-US" sz="1400" b="0" i="0" kern="1200" dirty="0" err="1"/>
+            <a:t>ConvertImageToSequence</a:t>
+          </a:r>
+          <a:r>
+            <a:rPr lang="en-US" sz="1400" b="0" i="0" kern="1200" dirty="0"/>
+            <a:t>()</a:t>
+          </a:r>
+          <a:endParaRPr lang="en-US" sz="1400" i="0" kern="1200" dirty="0"/>
+        </a:p>
+        <a:p>
+          <a:pPr marL="114300" lvl="1" indent="-114300" algn="l" defTabSz="622300">
+            <a:lnSpc>
+              <a:spcPct val="90000"/>
+            </a:lnSpc>
+            <a:spcBef>
+              <a:spcPct val="0"/>
+            </a:spcBef>
+            <a:spcAft>
+              <a:spcPct val="15000"/>
+            </a:spcAft>
+            <a:buChar char="•"/>
+          </a:pPr>
+          <a:r>
+            <a:rPr lang="en-US" sz="1400" b="0" i="0" kern="1200"/>
+            <a:t>Converts image into a unique sequence of pixels.</a:t>
+          </a:r>
+          <a:endParaRPr lang="en-US" sz="1400" i="0" kern="1200"/>
+        </a:p>
+      </dsp:txBody>
+      <dsp:txXfrm>
+        <a:off x="0" y="1702731"/>
+        <a:ext cx="10212698" cy="815850"/>
+      </dsp:txXfrm>
+    </dsp:sp>
+    <dsp:sp modelId="{62D7583B-B76D-4CB7-907D-90C29E091D5C}">
+      <dsp:nvSpPr>
+        <dsp:cNvPr id="0" name=""/>
+        <dsp:cNvSpPr/>
+      </dsp:nvSpPr>
+      <dsp:spPr>
+        <a:xfrm>
+          <a:off x="510634" y="1496091"/>
+          <a:ext cx="7148888" cy="413280"/>
+        </a:xfrm>
+        <a:prstGeom prst="roundRect">
+          <a:avLst/>
+        </a:prstGeom>
+        <a:solidFill>
+          <a:schemeClr val="accent1">
+            <a:hueOff val="0"/>
+            <a:satOff val="0"/>
+            <a:lumOff val="0"/>
+            <a:alphaOff val="0"/>
+          </a:schemeClr>
+        </a:solidFill>
+        <a:ln w="12700" cap="flat" cmpd="sng" algn="ctr">
+          <a:solidFill>
+            <a:schemeClr val="lt1">
+              <a:hueOff val="0"/>
+              <a:satOff val="0"/>
+              <a:lumOff val="0"/>
+              <a:alphaOff val="0"/>
+            </a:schemeClr>
+          </a:solidFill>
+          <a:prstDash val="solid"/>
+          <a:miter lim="800000"/>
+        </a:ln>
+        <a:effectLst/>
+      </dsp:spPr>
+      <dsp:style>
+        <a:lnRef idx="2">
+          <a:scrgbClr r="0" g="0" b="0"/>
+        </a:lnRef>
+        <a:fillRef idx="1">
+          <a:scrgbClr r="0" g="0" b="0"/>
+        </a:fillRef>
+        <a:effectRef idx="0">
+          <a:scrgbClr r="0" g="0" b="0"/>
+        </a:effectRef>
+        <a:fontRef idx="minor">
+          <a:schemeClr val="lt1"/>
+        </a:fontRef>
+      </dsp:style>
+      <dsp:txBody>
+        <a:bodyPr spcFirstLastPara="0" vert="horz" wrap="square" lIns="270211" tIns="0" rIns="270211" bIns="0" numCol="1" spcCol="1270" anchor="ctr" anchorCtr="0">
+          <a:noAutofit/>
+        </a:bodyPr>
+        <a:lstStyle/>
+        <a:p>
+          <a:pPr marL="0" lvl="0" indent="0" algn="l" defTabSz="622300">
+            <a:lnSpc>
+              <a:spcPct val="90000"/>
+            </a:lnSpc>
+            <a:spcBef>
+              <a:spcPct val="0"/>
+            </a:spcBef>
+            <a:spcAft>
+              <a:spcPct val="35000"/>
+            </a:spcAft>
+            <a:buNone/>
+          </a:pPr>
+          <a:r>
+            <a:rPr lang="en-US" sz="1400" b="0" i="0" kern="1200"/>
+            <a:t>Function: </a:t>
+          </a:r>
+          <a:endParaRPr lang="en-US" sz="1400" i="0" kern="1200"/>
+        </a:p>
+      </dsp:txBody>
+      <dsp:txXfrm>
+        <a:off x="530809" y="1516266"/>
+        <a:ext cx="7108538" cy="372930"/>
+      </dsp:txXfrm>
+    </dsp:sp>
+    <dsp:sp modelId="{7C734A50-680F-4CB0-9334-3F75CE072784}">
+      <dsp:nvSpPr>
+        <dsp:cNvPr id="0" name=""/>
+        <dsp:cNvSpPr/>
+      </dsp:nvSpPr>
+      <dsp:spPr>
+        <a:xfrm>
+          <a:off x="0" y="2800821"/>
+          <a:ext cx="10212698" cy="1058400"/>
+        </a:xfrm>
+        <a:prstGeom prst="rect">
+          <a:avLst/>
+        </a:prstGeom>
+        <a:solidFill>
+          <a:schemeClr val="lt1">
+            <a:alpha val="90000"/>
+            <a:hueOff val="0"/>
+            <a:satOff val="0"/>
+            <a:lumOff val="0"/>
+            <a:alphaOff val="0"/>
+          </a:schemeClr>
+        </a:solidFill>
+        <a:ln w="12700" cap="flat" cmpd="sng" algn="ctr">
+          <a:solidFill>
+            <a:schemeClr val="accent1">
+              <a:hueOff val="0"/>
+              <a:satOff val="0"/>
+              <a:lumOff val="0"/>
+              <a:alphaOff val="0"/>
+            </a:schemeClr>
+          </a:solidFill>
+          <a:prstDash val="solid"/>
+          <a:miter lim="800000"/>
+        </a:ln>
+        <a:effectLst/>
+      </dsp:spPr>
+      <dsp:style>
+        <a:lnRef idx="2">
+          <a:scrgbClr r="0" g="0" b="0"/>
+        </a:lnRef>
+        <a:fillRef idx="1">
+          <a:scrgbClr r="0" g="0" b="0"/>
+        </a:fillRef>
+        <a:effectRef idx="0">
+          <a:scrgbClr r="0" g="0" b="0"/>
+        </a:effectRef>
+        <a:fontRef idx="minor"/>
+      </dsp:style>
+      <dsp:txBody>
+        <a:bodyPr spcFirstLastPara="0" vert="horz" wrap="square" lIns="792619" tIns="291592" rIns="792619" bIns="99568" numCol="1" spcCol="1270" anchor="t" anchorCtr="0">
+          <a:noAutofit/>
+        </a:bodyPr>
+        <a:lstStyle/>
+        <a:p>
+          <a:pPr marL="114300" lvl="1" indent="-114300" algn="l" defTabSz="622300">
+            <a:lnSpc>
+              <a:spcPct val="90000"/>
+            </a:lnSpc>
+            <a:spcBef>
+              <a:spcPct val="0"/>
+            </a:spcBef>
+            <a:spcAft>
+              <a:spcPct val="15000"/>
+            </a:spcAft>
+            <a:buChar char="•"/>
+          </a:pPr>
+          <a:r>
+            <a:rPr lang="en-US" sz="1400" b="0" i="0" kern="1200"/>
+            <a:t>Utilizes pixel sequences to predict match or non-match.</a:t>
+          </a:r>
+          <a:endParaRPr lang="en-US" sz="1400" i="0" kern="1200"/>
+        </a:p>
+        <a:p>
+          <a:pPr marL="114300" lvl="1" indent="-114300" algn="l" defTabSz="622300">
+            <a:lnSpc>
+              <a:spcPct val="90000"/>
+            </a:lnSpc>
+            <a:spcBef>
+              <a:spcPct val="0"/>
+            </a:spcBef>
+            <a:spcAft>
+              <a:spcPct val="15000"/>
+            </a:spcAft>
+            <a:buChar char="•"/>
+          </a:pPr>
+          <a:r>
+            <a:rPr lang="en-US" sz="1400" b="0" i="0" kern="1200"/>
+            <a:t>Compares input vs. output pixel sequences.</a:t>
+          </a:r>
+          <a:endParaRPr lang="en-US" sz="1400" i="0" kern="1200"/>
+        </a:p>
+        <a:p>
+          <a:pPr marL="114300" lvl="1" indent="-114300" algn="l" defTabSz="622300">
+            <a:lnSpc>
+              <a:spcPct val="90000"/>
+            </a:lnSpc>
+            <a:spcBef>
+              <a:spcPct val="0"/>
+            </a:spcBef>
+            <a:spcAft>
+              <a:spcPct val="15000"/>
+            </a:spcAft>
+            <a:buChar char="•"/>
+          </a:pPr>
+          <a:r>
+            <a:rPr lang="en-US" sz="1400" b="0" i="0" kern="1200"/>
+            <a:t>Match prediction based on alignment of pixel sequences.</a:t>
+          </a:r>
+          <a:endParaRPr lang="en-US" sz="1400" i="0" kern="1200"/>
+        </a:p>
+      </dsp:txBody>
+      <dsp:txXfrm>
+        <a:off x="0" y="2800821"/>
+        <a:ext cx="10212698" cy="1058400"/>
+      </dsp:txXfrm>
+    </dsp:sp>
+    <dsp:sp modelId="{25512264-5BF7-4A1A-8BC3-C13A92CE9DCB}">
+      <dsp:nvSpPr>
+        <dsp:cNvPr id="0" name=""/>
+        <dsp:cNvSpPr/>
+      </dsp:nvSpPr>
+      <dsp:spPr>
+        <a:xfrm>
+          <a:off x="510634" y="2594180"/>
+          <a:ext cx="7148888" cy="413280"/>
+        </a:xfrm>
+        <a:prstGeom prst="roundRect">
+          <a:avLst/>
+        </a:prstGeom>
+        <a:solidFill>
+          <a:schemeClr val="accent1">
+            <a:hueOff val="0"/>
+            <a:satOff val="0"/>
+            <a:lumOff val="0"/>
+            <a:alphaOff val="0"/>
+          </a:schemeClr>
+        </a:solidFill>
+        <a:ln w="12700" cap="flat" cmpd="sng" algn="ctr">
+          <a:solidFill>
+            <a:schemeClr val="lt1">
+              <a:hueOff val="0"/>
+              <a:satOff val="0"/>
+              <a:lumOff val="0"/>
+              <a:alphaOff val="0"/>
+            </a:schemeClr>
+          </a:solidFill>
+          <a:prstDash val="solid"/>
+          <a:miter lim="800000"/>
+        </a:ln>
+        <a:effectLst/>
+      </dsp:spPr>
+      <dsp:style>
+        <a:lnRef idx="2">
+          <a:scrgbClr r="0" g="0" b="0"/>
+        </a:lnRef>
+        <a:fillRef idx="1">
+          <a:scrgbClr r="0" g="0" b="0"/>
+        </a:fillRef>
+        <a:effectRef idx="0">
+          <a:scrgbClr r="0" g="0" b="0"/>
+        </a:effectRef>
+        <a:fontRef idx="minor">
+          <a:schemeClr val="lt1"/>
+        </a:fontRef>
+      </dsp:style>
+      <dsp:txBody>
+        <a:bodyPr spcFirstLastPara="0" vert="horz" wrap="square" lIns="270211" tIns="0" rIns="270211" bIns="0" numCol="1" spcCol="1270" anchor="ctr" anchorCtr="0">
+          <a:noAutofit/>
+        </a:bodyPr>
+        <a:lstStyle/>
+        <a:p>
+          <a:pPr marL="0" lvl="0" indent="0" algn="l" defTabSz="622300">
+            <a:lnSpc>
+              <a:spcPct val="90000"/>
+            </a:lnSpc>
+            <a:spcBef>
+              <a:spcPct val="0"/>
+            </a:spcBef>
+            <a:spcAft>
+              <a:spcPct val="35000"/>
+            </a:spcAft>
+            <a:buNone/>
+          </a:pPr>
+          <a:r>
+            <a:rPr lang="en-US" sz="1400" b="0" i="0" kern="1200"/>
+            <a:t>Classification Process:</a:t>
+          </a:r>
+          <a:endParaRPr lang="en-US" sz="1400" i="0" kern="1200"/>
+        </a:p>
+      </dsp:txBody>
+      <dsp:txXfrm>
+        <a:off x="530809" y="2614355"/>
+        <a:ext cx="7108538" cy="372930"/>
+      </dsp:txXfrm>
+    </dsp:sp>
+    <dsp:sp modelId="{9D681EC6-E7AB-4FA1-BAF0-E4E10900E762}">
+      <dsp:nvSpPr>
+        <dsp:cNvPr id="0" name=""/>
+        <dsp:cNvSpPr/>
+      </dsp:nvSpPr>
+      <dsp:spPr>
+        <a:xfrm>
+          <a:off x="0" y="4141461"/>
+          <a:ext cx="10212698" cy="1058400"/>
+        </a:xfrm>
+        <a:prstGeom prst="rect">
+          <a:avLst/>
+        </a:prstGeom>
+        <a:solidFill>
+          <a:schemeClr val="lt1">
+            <a:alpha val="90000"/>
+            <a:hueOff val="0"/>
+            <a:satOff val="0"/>
+            <a:lumOff val="0"/>
+            <a:alphaOff val="0"/>
+          </a:schemeClr>
+        </a:solidFill>
+        <a:ln w="12700" cap="flat" cmpd="sng" algn="ctr">
+          <a:solidFill>
+            <a:schemeClr val="accent1">
+              <a:hueOff val="0"/>
+              <a:satOff val="0"/>
+              <a:lumOff val="0"/>
+              <a:alphaOff val="0"/>
+            </a:schemeClr>
+          </a:solidFill>
+          <a:prstDash val="solid"/>
+          <a:miter lim="800000"/>
+        </a:ln>
+        <a:effectLst/>
+      </dsp:spPr>
+      <dsp:style>
+        <a:lnRef idx="2">
+          <a:scrgbClr r="0" g="0" b="0"/>
+        </a:lnRef>
+        <a:fillRef idx="1">
+          <a:scrgbClr r="0" g="0" b="0"/>
+        </a:fillRef>
+        <a:effectRef idx="0">
+          <a:scrgbClr r="0" g="0" b="0"/>
+        </a:effectRef>
+        <a:fontRef idx="minor"/>
+      </dsp:style>
+      <dsp:txBody>
+        <a:bodyPr spcFirstLastPara="0" vert="horz" wrap="square" lIns="792619" tIns="291592" rIns="792619" bIns="99568" numCol="1" spcCol="1270" anchor="t" anchorCtr="0">
+          <a:noAutofit/>
+        </a:bodyPr>
+        <a:lstStyle/>
+        <a:p>
+          <a:pPr marL="114300" lvl="1" indent="-114300" algn="l" defTabSz="622300">
+            <a:lnSpc>
+              <a:spcPct val="90000"/>
+            </a:lnSpc>
+            <a:spcBef>
+              <a:spcPct val="0"/>
+            </a:spcBef>
+            <a:spcAft>
+              <a:spcPct val="15000"/>
+            </a:spcAft>
+            <a:buChar char="•"/>
+          </a:pPr>
+          <a:r>
+            <a:rPr lang="en-US" sz="1400" b="0" i="0" kern="1200"/>
+            <a:t>Pixel uniqueness crucial for classification.</a:t>
+          </a:r>
+          <a:endParaRPr lang="en-US" sz="1400" i="0" kern="1200"/>
+        </a:p>
+        <a:p>
+          <a:pPr marL="114300" lvl="1" indent="-114300" algn="l" defTabSz="622300">
+            <a:lnSpc>
+              <a:spcPct val="90000"/>
+            </a:lnSpc>
+            <a:spcBef>
+              <a:spcPct val="0"/>
+            </a:spcBef>
+            <a:spcAft>
+              <a:spcPct val="15000"/>
+            </a:spcAft>
+            <a:buChar char="•"/>
+          </a:pPr>
+          <a:r>
+            <a:rPr lang="en-US" sz="1400" b="0" i="0" kern="1200"/>
+            <a:t>Analyzes individual pixel sequences.</a:t>
+          </a:r>
+          <a:endParaRPr lang="en-US" sz="1400" i="0" kern="1200"/>
+        </a:p>
+        <a:p>
+          <a:pPr marL="114300" lvl="1" indent="-114300" algn="l" defTabSz="622300">
+            <a:lnSpc>
+              <a:spcPct val="90000"/>
+            </a:lnSpc>
+            <a:spcBef>
+              <a:spcPct val="0"/>
+            </a:spcBef>
+            <a:spcAft>
+              <a:spcPct val="15000"/>
+            </a:spcAft>
+            <a:buChar char="•"/>
+          </a:pPr>
+          <a:r>
+            <a:rPr lang="en-US" sz="1400" b="0" i="0" kern="1200"/>
+            <a:t>Determines image similarity based on pixel compositions.</a:t>
+          </a:r>
+          <a:endParaRPr lang="en-US" sz="1400" i="0" kern="1200"/>
+        </a:p>
+      </dsp:txBody>
+      <dsp:txXfrm>
+        <a:off x="0" y="4141461"/>
+        <a:ext cx="10212698" cy="1058400"/>
+      </dsp:txXfrm>
+    </dsp:sp>
+    <dsp:sp modelId="{4BED44EF-1FA4-4761-821E-7AD7CDF82849}">
+      <dsp:nvSpPr>
+        <dsp:cNvPr id="0" name=""/>
+        <dsp:cNvSpPr/>
+      </dsp:nvSpPr>
+      <dsp:spPr>
+        <a:xfrm>
+          <a:off x="510634" y="3934821"/>
+          <a:ext cx="7148888" cy="413280"/>
+        </a:xfrm>
+        <a:prstGeom prst="roundRect">
+          <a:avLst/>
+        </a:prstGeom>
+        <a:solidFill>
+          <a:schemeClr val="accent1">
+            <a:hueOff val="0"/>
+            <a:satOff val="0"/>
+            <a:lumOff val="0"/>
+            <a:alphaOff val="0"/>
+          </a:schemeClr>
+        </a:solidFill>
+        <a:ln w="12700" cap="flat" cmpd="sng" algn="ctr">
+          <a:solidFill>
+            <a:schemeClr val="lt1">
+              <a:hueOff val="0"/>
+              <a:satOff val="0"/>
+              <a:lumOff val="0"/>
+              <a:alphaOff val="0"/>
+            </a:schemeClr>
+          </a:solidFill>
+          <a:prstDash val="solid"/>
+          <a:miter lim="800000"/>
+        </a:ln>
+        <a:effectLst/>
+      </dsp:spPr>
+      <dsp:style>
+        <a:lnRef idx="2">
+          <a:scrgbClr r="0" g="0" b="0"/>
+        </a:lnRef>
+        <a:fillRef idx="1">
+          <a:scrgbClr r="0" g="0" b="0"/>
+        </a:fillRef>
+        <a:effectRef idx="0">
+          <a:scrgbClr r="0" g="0" b="0"/>
+        </a:effectRef>
+        <a:fontRef idx="minor">
+          <a:schemeClr val="lt1"/>
+        </a:fontRef>
+      </dsp:style>
+      <dsp:txBody>
+        <a:bodyPr spcFirstLastPara="0" vert="horz" wrap="square" lIns="270211" tIns="0" rIns="270211" bIns="0" numCol="1" spcCol="1270" anchor="ctr" anchorCtr="0">
+          <a:noAutofit/>
+        </a:bodyPr>
+        <a:lstStyle/>
+        <a:p>
+          <a:pPr marL="0" lvl="0" indent="0" algn="l" defTabSz="622300">
+            <a:lnSpc>
+              <a:spcPct val="90000"/>
+            </a:lnSpc>
+            <a:spcBef>
+              <a:spcPct val="0"/>
+            </a:spcBef>
+            <a:spcAft>
+              <a:spcPct val="35000"/>
+            </a:spcAft>
+            <a:buNone/>
+          </a:pPr>
+          <a:r>
+            <a:rPr lang="en-US" sz="1400" b="0" i="0" kern="1200"/>
+            <a:t>Significance:</a:t>
+          </a:r>
+          <a:endParaRPr lang="en-US" sz="1400" i="0" kern="1200"/>
+        </a:p>
+      </dsp:txBody>
+      <dsp:txXfrm>
+        <a:off x="530809" y="3954996"/>
+        <a:ext cx="7108538" cy="372930"/>
+      </dsp:txXfrm>
+    </dsp:sp>
+  </dsp:spTree>
+</dsp:drawing>
+</file>
+
 <file path=ppt/diagrams/layout1.xml><?xml version="1.0" encoding="utf-8"?>
 <dgm:layoutDef xmlns:dgm="http://schemas.openxmlformats.org/drawingml/2006/diagram" xmlns:a="http://schemas.openxmlformats.org/drawingml/2006/main" uniqueId="urn:microsoft.com/office/officeart/2005/8/layout/list1">
   <dgm:title val=""/>
@@ -8686,6 +11000,231 @@
 </dgm:layoutDef>
 </file>
 
+<file path=ppt/diagrams/layout5.xml><?xml version="1.0" encoding="utf-8"?>
+<dgm:layoutDef xmlns:dgm="http://schemas.openxmlformats.org/drawingml/2006/diagram" xmlns:a="http://schemas.openxmlformats.org/drawingml/2006/main" uniqueId="urn:microsoft.com/office/officeart/2005/8/layout/list1">
+  <dgm:title val=""/>
+  <dgm:desc val=""/>
+  <dgm:catLst>
+    <dgm:cat type="list" pri="4000"/>
+  </dgm:catLst>
+  <dgm:sampData>
+    <dgm:dataModel>
+      <dgm:ptLst>
+        <dgm:pt modelId="0" type="doc"/>
+        <dgm:pt modelId="1">
+          <dgm:prSet phldr="1"/>
+        </dgm:pt>
+        <dgm:pt modelId="2">
+          <dgm:prSet phldr="1"/>
+        </dgm:pt>
+        <dgm:pt modelId="3">
+          <dgm:prSet phldr="1"/>
+        </dgm:pt>
+      </dgm:ptLst>
+      <dgm:cxnLst>
+        <dgm:cxn modelId="4" srcId="0" destId="1" srcOrd="0" destOrd="0"/>
+        <dgm:cxn modelId="5" srcId="0" destId="2" srcOrd="1" destOrd="0"/>
+        <dgm:cxn modelId="6" srcId="0" destId="3" srcOrd="2" destOrd="0"/>
+      </dgm:cxnLst>
+      <dgm:bg/>
+      <dgm:whole/>
+    </dgm:dataModel>
+  </dgm:sampData>
+  <dgm:styleData>
+    <dgm:dataModel>
+      <dgm:ptLst>
+        <dgm:pt modelId="0" type="doc"/>
+        <dgm:pt modelId="1"/>
+        <dgm:pt modelId="2"/>
+      </dgm:ptLst>
+      <dgm:cxnLst>
+        <dgm:cxn modelId="4" srcId="0" destId="1" srcOrd="0" destOrd="0"/>
+        <dgm:cxn modelId="5" srcId="0" destId="2" srcOrd="1" destOrd="0"/>
+      </dgm:cxnLst>
+      <dgm:bg/>
+      <dgm:whole/>
+    </dgm:dataModel>
+  </dgm:styleData>
+  <dgm:clrData>
+    <dgm:dataModel>
+      <dgm:ptLst>
+        <dgm:pt modelId="0" type="doc"/>
+        <dgm:pt modelId="1"/>
+        <dgm:pt modelId="2"/>
+        <dgm:pt modelId="3"/>
+        <dgm:pt modelId="4"/>
+      </dgm:ptLst>
+      <dgm:cxnLst>
+        <dgm:cxn modelId="5" srcId="0" destId="1" srcOrd="0" destOrd="0"/>
+        <dgm:cxn modelId="6" srcId="0" destId="2" srcOrd="1" destOrd="0"/>
+        <dgm:cxn modelId="7" srcId="0" destId="3" srcOrd="2" destOrd="0"/>
+        <dgm:cxn modelId="8" srcId="0" destId="4" srcOrd="3" destOrd="0"/>
+      </dgm:cxnLst>
+      <dgm:bg/>
+      <dgm:whole/>
+    </dgm:dataModel>
+  </dgm:clrData>
+  <dgm:layoutNode name="linear">
+    <dgm:varLst>
+      <dgm:dir/>
+      <dgm:animLvl val="lvl"/>
+      <dgm:resizeHandles val="exact"/>
+    </dgm:varLst>
+    <dgm:choose name="Name0">
+      <dgm:if name="Name1" func="var" arg="dir" op="equ" val="norm">
+        <dgm:alg type="lin">
+          <dgm:param type="linDir" val="fromT"/>
+          <dgm:param type="vertAlign" val="mid"/>
+          <dgm:param type="horzAlign" val="l"/>
+          <dgm:param type="nodeHorzAlign" val="l"/>
+        </dgm:alg>
+      </dgm:if>
+      <dgm:else name="Name2">
+        <dgm:alg type="lin">
+          <dgm:param type="linDir" val="fromT"/>
+          <dgm:param type="vertAlign" val="mid"/>
+          <dgm:param type="horzAlign" val="r"/>
+          <dgm:param type="nodeHorzAlign" val="r"/>
+        </dgm:alg>
+      </dgm:else>
+    </dgm:choose>
+    <dgm:shape xmlns:r="http://schemas.openxmlformats.org/officeDocument/2006/relationships" r:blip="">
+      <dgm:adjLst/>
+    </dgm:shape>
+    <dgm:presOf/>
+    <dgm:constrLst>
+      <dgm:constr type="w" for="ch" forName="parentLin" refType="w"/>
+      <dgm:constr type="h" for="ch" forName="parentLin" val="INF"/>
+      <dgm:constr type="w" for="des" forName="parentLeftMargin" refType="w" fact="0.05"/>
+      <dgm:constr type="w" for="des" forName="parentText" refType="w" fact="0.7"/>
+      <dgm:constr type="h" for="des" forName="parentText" refType="primFontSz" refFor="des" refForName="parentText" fact="0.82"/>
+      <dgm:constr type="h" for="ch" forName="negativeSpace" refType="primFontSz" refFor="des" refForName="parentText" fact="-0.41"/>
+      <dgm:constr type="h" for="ch" forName="negativeSpace" refType="h" refFor="des" refForName="parentText" op="lte" fact="-0.82"/>
+      <dgm:constr type="h" for="ch" forName="negativeSpace" refType="h" refFor="des" refForName="parentText" op="gte" fact="-0.82"/>
+      <dgm:constr type="w" for="ch" forName="childText" refType="w"/>
+      <dgm:constr type="h" for="ch" forName="childText" refType="primFontSz" refFor="des" refForName="parentText" fact="0.7"/>
+      <dgm:constr type="primFontSz" for="des" forName="parentText" val="65"/>
+      <dgm:constr type="primFontSz" for="ch" forName="childText" refType="primFontSz" refFor="des" refForName="parentText"/>
+      <dgm:constr type="tMarg" for="ch" forName="childText" refType="primFontSz" refFor="des" refForName="parentText" fact="1.64"/>
+      <dgm:constr type="tMarg" for="ch" forName="childText" refType="h" refFor="des" refForName="parentText" op="lte" fact="3.28"/>
+      <dgm:constr type="tMarg" for="ch" forName="childText" refType="h" refFor="des" refForName="parentText" op="gte" fact="3.28"/>
+      <dgm:constr type="lMarg" for="ch" forName="childText" refType="w" fact="0.22"/>
+      <dgm:constr type="rMarg" for="ch" forName="childText" refType="lMarg" refFor="ch" refForName="childText"/>
+      <dgm:constr type="lMarg" for="des" forName="parentText" refType="w" fact="0.075"/>
+      <dgm:constr type="rMarg" for="des" forName="parentText" refType="lMarg" refFor="des" refForName="parentText"/>
+      <dgm:constr type="h" for="ch" forName="spaceBetweenRectangles" refType="primFontSz" refFor="des" refForName="parentText" fact="0.15"/>
+    </dgm:constrLst>
+    <dgm:ruleLst>
+      <dgm:rule type="primFontSz" for="des" forName="parentText" val="5" fact="NaN" max="NaN"/>
+    </dgm:ruleLst>
+    <dgm:forEach name="Name3" axis="ch" ptType="node">
+      <dgm:layoutNode name="parentLin">
+        <dgm:choose name="Name4">
+          <dgm:if name="Name5" func="var" arg="dir" op="equ" val="norm">
+            <dgm:alg type="lin">
+              <dgm:param type="linDir" val="fromL"/>
+              <dgm:param type="horzAlign" val="l"/>
+              <dgm:param type="nodeHorzAlign" val="l"/>
+            </dgm:alg>
+          </dgm:if>
+          <dgm:else name="Name6">
+            <dgm:alg type="lin">
+              <dgm:param type="linDir" val="fromR"/>
+              <dgm:param type="horzAlign" val="r"/>
+              <dgm:param type="nodeHorzAlign" val="r"/>
+            </dgm:alg>
+          </dgm:else>
+        </dgm:choose>
+        <dgm:shape xmlns:r="http://schemas.openxmlformats.org/officeDocument/2006/relationships" r:blip="">
+          <dgm:adjLst/>
+        </dgm:shape>
+        <dgm:presOf/>
+        <dgm:constrLst/>
+        <dgm:ruleLst/>
+        <dgm:layoutNode name="parentLeftMargin">
+          <dgm:alg type="sp"/>
+          <dgm:shape xmlns:r="http://schemas.openxmlformats.org/officeDocument/2006/relationships" type="rect" r:blip="" hideGeom="1">
+            <dgm:adjLst/>
+          </dgm:shape>
+          <dgm:presOf axis="self"/>
+          <dgm:constrLst>
+            <dgm:constr type="h"/>
+          </dgm:constrLst>
+          <dgm:ruleLst/>
+        </dgm:layoutNode>
+        <dgm:layoutNode name="parentText" styleLbl="node1">
+          <dgm:varLst>
+            <dgm:chMax val="0"/>
+            <dgm:bulletEnabled val="1"/>
+          </dgm:varLst>
+          <dgm:choose name="Name7">
+            <dgm:if name="Name8" func="var" arg="dir" op="equ" val="norm">
+              <dgm:alg type="tx">
+                <dgm:param type="parTxLTRAlign" val="l"/>
+                <dgm:param type="parTxRTLAlign" val="l"/>
+              </dgm:alg>
+            </dgm:if>
+            <dgm:else name="Name9">
+              <dgm:alg type="tx">
+                <dgm:param type="parTxLTRAlign" val="r"/>
+                <dgm:param type="parTxRTLAlign" val="r"/>
+              </dgm:alg>
+            </dgm:else>
+          </dgm:choose>
+          <dgm:shape xmlns:r="http://schemas.openxmlformats.org/officeDocument/2006/relationships" type="roundRect" r:blip="">
+            <dgm:adjLst/>
+          </dgm:shape>
+          <dgm:presOf axis="self" ptType="node"/>
+          <dgm:constrLst>
+            <dgm:constr type="tMarg"/>
+            <dgm:constr type="bMarg"/>
+          </dgm:constrLst>
+          <dgm:ruleLst/>
+        </dgm:layoutNode>
+      </dgm:layoutNode>
+      <dgm:layoutNode name="negativeSpace">
+        <dgm:alg type="sp"/>
+        <dgm:shape xmlns:r="http://schemas.openxmlformats.org/officeDocument/2006/relationships" r:blip="">
+          <dgm:adjLst/>
+        </dgm:shape>
+        <dgm:presOf/>
+        <dgm:constrLst/>
+        <dgm:ruleLst/>
+      </dgm:layoutNode>
+      <dgm:layoutNode name="childText" styleLbl="conFgAcc1">
+        <dgm:varLst>
+          <dgm:bulletEnabled val="1"/>
+        </dgm:varLst>
+        <dgm:alg type="tx">
+          <dgm:param type="stBulletLvl" val="1"/>
+        </dgm:alg>
+        <dgm:shape xmlns:r="http://schemas.openxmlformats.org/officeDocument/2006/relationships" type="rect" r:blip="" zOrderOff="-2">
+          <dgm:adjLst/>
+        </dgm:shape>
+        <dgm:presOf axis="des" ptType="node"/>
+        <dgm:constrLst>
+          <dgm:constr type="secFontSz" refType="primFontSz"/>
+        </dgm:constrLst>
+        <dgm:ruleLst>
+          <dgm:rule type="h" val="INF" fact="NaN" max="NaN"/>
+        </dgm:ruleLst>
+      </dgm:layoutNode>
+      <dgm:forEach name="Name10" axis="followSib" ptType="sibTrans" cnt="1">
+        <dgm:layoutNode name="spaceBetweenRectangles">
+          <dgm:alg type="sp"/>
+          <dgm:shape xmlns:r="http://schemas.openxmlformats.org/officeDocument/2006/relationships" r:blip="">
+            <dgm:adjLst/>
+          </dgm:shape>
+          <dgm:presOf/>
+          <dgm:constrLst/>
+          <dgm:ruleLst/>
+        </dgm:layoutNode>
+      </dgm:forEach>
+    </dgm:forEach>
+  </dgm:layoutNode>
+</dgm:layoutDef>
+</file>
+
 <file path=ppt/diagrams/quickStyle1.xml><?xml version="1.0" encoding="utf-8"?>
 <dgm:styleDef xmlns:dgm="http://schemas.openxmlformats.org/drawingml/2006/diagram" xmlns:a="http://schemas.openxmlformats.org/drawingml/2006/main" uniqueId="urn:microsoft.com/office/officeart/2005/8/quickstyle/simple1">
   <dgm:title val=""/>
@@ -11789,6 +14328,1040 @@
 </file>
 
 <file path=ppt/diagrams/quickStyle4.xml><?xml version="1.0" encoding="utf-8"?>
+<dgm:styleDef xmlns:dgm="http://schemas.openxmlformats.org/drawingml/2006/diagram" xmlns:a="http://schemas.openxmlformats.org/drawingml/2006/main" uniqueId="urn:microsoft.com/office/officeart/2005/8/quickstyle/simple1">
+  <dgm:title val=""/>
+  <dgm:desc val=""/>
+  <dgm:catLst>
+    <dgm:cat type="simple" pri="10100"/>
+  </dgm:catLst>
+  <dgm:scene3d>
+    <a:camera prst="orthographicFront"/>
+    <a:lightRig rig="threePt" dir="t"/>
+  </dgm:scene3d>
+  <dgm:styleLbl name="node0">
+    <dgm:scene3d>
+      <a:camera prst="orthographicFront"/>
+      <a:lightRig rig="threePt" dir="t"/>
+    </dgm:scene3d>
+    <dgm:sp3d/>
+    <dgm:txPr/>
+    <dgm:style>
+      <a:lnRef idx="2">
+        <a:scrgbClr r="0" g="0" b="0"/>
+      </a:lnRef>
+      <a:fillRef idx="1">
+        <a:scrgbClr r="0" g="0" b="0"/>
+      </a:fillRef>
+      <a:effectRef idx="0">
+        <a:scrgbClr r="0" g="0" b="0"/>
+      </a:effectRef>
+      <a:fontRef idx="minor">
+        <a:schemeClr val="lt1"/>
+      </a:fontRef>
+    </dgm:style>
+  </dgm:styleLbl>
+  <dgm:styleLbl name="lnNode1">
+    <dgm:scene3d>
+      <a:camera prst="orthographicFront"/>
+      <a:lightRig rig="threePt" dir="t"/>
+    </dgm:scene3d>
+    <dgm:sp3d/>
+    <dgm:txPr/>
+    <dgm:style>
+      <a:lnRef idx="2">
+        <a:scrgbClr r="0" g="0" b="0"/>
+      </a:lnRef>
+      <a:fillRef idx="1">
+        <a:scrgbClr r="0" g="0" b="0"/>
+      </a:fillRef>
+      <a:effectRef idx="0">
+        <a:scrgbClr r="0" g="0" b="0"/>
+      </a:effectRef>
+      <a:fontRef idx="minor">
+        <a:schemeClr val="lt1"/>
+      </a:fontRef>
+    </dgm:style>
+  </dgm:styleLbl>
+  <dgm:styleLbl name="vennNode1">
+    <dgm:scene3d>
+      <a:camera prst="orthographicFront"/>
+      <a:lightRig rig="threePt" dir="t"/>
+    </dgm:scene3d>
+    <dgm:sp3d/>
+    <dgm:txPr/>
+    <dgm:style>
+      <a:lnRef idx="2">
+        <a:scrgbClr r="0" g="0" b="0"/>
+      </a:lnRef>
+      <a:fillRef idx="1">
+        <a:scrgbClr r="0" g="0" b="0"/>
+      </a:fillRef>
+      <a:effectRef idx="0">
+        <a:scrgbClr r="0" g="0" b="0"/>
+      </a:effectRef>
+      <a:fontRef idx="minor">
+        <a:schemeClr val="tx1"/>
+      </a:fontRef>
+    </dgm:style>
+  </dgm:styleLbl>
+  <dgm:styleLbl name="alignNode1">
+    <dgm:scene3d>
+      <a:camera prst="orthographicFront"/>
+      <a:lightRig rig="threePt" dir="t"/>
+    </dgm:scene3d>
+    <dgm:sp3d/>
+    <dgm:txPr/>
+    <dgm:style>
+      <a:lnRef idx="2">
+        <a:scrgbClr r="0" g="0" b="0"/>
+      </a:lnRef>
+      <a:fillRef idx="1">
+        <a:scrgbClr r="0" g="0" b="0"/>
+      </a:fillRef>
+      <a:effectRef idx="0">
+        <a:scrgbClr r="0" g="0" b="0"/>
+      </a:effectRef>
+      <a:fontRef idx="minor">
+        <a:schemeClr val="lt1"/>
+      </a:fontRef>
+    </dgm:style>
+  </dgm:styleLbl>
+  <dgm:styleLbl name="node1">
+    <dgm:scene3d>
+      <a:camera prst="orthographicFront"/>
+      <a:lightRig rig="threePt" dir="t"/>
+    </dgm:scene3d>
+    <dgm:sp3d/>
+    <dgm:txPr/>
+    <dgm:style>
+      <a:lnRef idx="2">
+        <a:scrgbClr r="0" g="0" b="0"/>
+      </a:lnRef>
+      <a:fillRef idx="1">
+        <a:scrgbClr r="0" g="0" b="0"/>
+      </a:fillRef>
+      <a:effectRef idx="0">
+        <a:scrgbClr r="0" g="0" b="0"/>
+      </a:effectRef>
+      <a:fontRef idx="minor">
+        <a:schemeClr val="lt1"/>
+      </a:fontRef>
+    </dgm:style>
+  </dgm:styleLbl>
+  <dgm:styleLbl name="node2">
+    <dgm:scene3d>
+      <a:camera prst="orthographicFront"/>
+      <a:lightRig rig="threePt" dir="t"/>
+    </dgm:scene3d>
+    <dgm:sp3d/>
+    <dgm:txPr/>
+    <dgm:style>
+      <a:lnRef idx="2">
+        <a:scrgbClr r="0" g="0" b="0"/>
+      </a:lnRef>
+      <a:fillRef idx="1">
+        <a:scrgbClr r="0" g="0" b="0"/>
+      </a:fillRef>
+      <a:effectRef idx="0">
+        <a:scrgbClr r="0" g="0" b="0"/>
+      </a:effectRef>
+      <a:fontRef idx="minor">
+        <a:schemeClr val="lt1"/>
+      </a:fontRef>
+    </dgm:style>
+  </dgm:styleLbl>
+  <dgm:styleLbl name="node3">
+    <dgm:scene3d>
+      <a:camera prst="orthographicFront"/>
+      <a:lightRig rig="threePt" dir="t"/>
+    </dgm:scene3d>
+    <dgm:sp3d/>
+    <dgm:txPr/>
+    <dgm:style>
+      <a:lnRef idx="2">
+        <a:scrgbClr r="0" g="0" b="0"/>
+      </a:lnRef>
+      <a:fillRef idx="1">
+        <a:scrgbClr r="0" g="0" b="0"/>
+      </a:fillRef>
+      <a:effectRef idx="0">
+        <a:scrgbClr r="0" g="0" b="0"/>
+      </a:effectRef>
+      <a:fontRef idx="minor">
+        <a:schemeClr val="lt1"/>
+      </a:fontRef>
+    </dgm:style>
+  </dgm:styleLbl>
+  <dgm:styleLbl name="node4">
+    <dgm:scene3d>
+      <a:camera prst="orthographicFront"/>
+      <a:lightRig rig="threePt" dir="t"/>
+    </dgm:scene3d>
+    <dgm:sp3d/>
+    <dgm:txPr/>
+    <dgm:style>
+      <a:lnRef idx="2">
+        <a:scrgbClr r="0" g="0" b="0"/>
+      </a:lnRef>
+      <a:fillRef idx="1">
+        <a:scrgbClr r="0" g="0" b="0"/>
+      </a:fillRef>
+      <a:effectRef idx="0">
+        <a:scrgbClr r="0" g="0" b="0"/>
+      </a:effectRef>
+      <a:fontRef idx="minor">
+        <a:schemeClr val="lt1"/>
+      </a:fontRef>
+    </dgm:style>
+  </dgm:styleLbl>
+  <dgm:styleLbl name="fgImgPlace1">
+    <dgm:scene3d>
+      <a:camera prst="orthographicFront"/>
+      <a:lightRig rig="threePt" dir="t"/>
+    </dgm:scene3d>
+    <dgm:sp3d/>
+    <dgm:txPr/>
+    <dgm:style>
+      <a:lnRef idx="2">
+        <a:scrgbClr r="0" g="0" b="0"/>
+      </a:lnRef>
+      <a:fillRef idx="1">
+        <a:scrgbClr r="0" g="0" b="0"/>
+      </a:fillRef>
+      <a:effectRef idx="0">
+        <a:scrgbClr r="0" g="0" b="0"/>
+      </a:effectRef>
+      <a:fontRef idx="minor"/>
+    </dgm:style>
+  </dgm:styleLbl>
+  <dgm:styleLbl name="alignImgPlace1">
+    <dgm:scene3d>
+      <a:camera prst="orthographicFront"/>
+      <a:lightRig rig="threePt" dir="t"/>
+    </dgm:scene3d>
+    <dgm:sp3d/>
+    <dgm:txPr/>
+    <dgm:style>
+      <a:lnRef idx="2">
+        <a:scrgbClr r="0" g="0" b="0"/>
+      </a:lnRef>
+      <a:fillRef idx="1">
+        <a:scrgbClr r="0" g="0" b="0"/>
+      </a:fillRef>
+      <a:effectRef idx="0">
+        <a:scrgbClr r="0" g="0" b="0"/>
+      </a:effectRef>
+      <a:fontRef idx="minor"/>
+    </dgm:style>
+  </dgm:styleLbl>
+  <dgm:styleLbl name="bgImgPlace1">
+    <dgm:scene3d>
+      <a:camera prst="orthographicFront"/>
+      <a:lightRig rig="threePt" dir="t"/>
+    </dgm:scene3d>
+    <dgm:sp3d/>
+    <dgm:txPr/>
+    <dgm:style>
+      <a:lnRef idx="2">
+        <a:scrgbClr r="0" g="0" b="0"/>
+      </a:lnRef>
+      <a:fillRef idx="1">
+        <a:scrgbClr r="0" g="0" b="0"/>
+      </a:fillRef>
+      <a:effectRef idx="0">
+        <a:scrgbClr r="0" g="0" b="0"/>
+      </a:effectRef>
+      <a:fontRef idx="minor"/>
+    </dgm:style>
+  </dgm:styleLbl>
+  <dgm:styleLbl name="sibTrans2D1">
+    <dgm:scene3d>
+      <a:camera prst="orthographicFront"/>
+      <a:lightRig rig="threePt" dir="t"/>
+    </dgm:scene3d>
+    <dgm:sp3d/>
+    <dgm:txPr/>
+    <dgm:style>
+      <a:lnRef idx="0">
+        <a:scrgbClr r="0" g="0" b="0"/>
+      </a:lnRef>
+      <a:fillRef idx="1">
+        <a:scrgbClr r="0" g="0" b="0"/>
+      </a:fillRef>
+      <a:effectRef idx="0">
+        <a:scrgbClr r="0" g="0" b="0"/>
+      </a:effectRef>
+      <a:fontRef idx="minor">
+        <a:schemeClr val="lt1"/>
+      </a:fontRef>
+    </dgm:style>
+  </dgm:styleLbl>
+  <dgm:styleLbl name="fgSibTrans2D1">
+    <dgm:scene3d>
+      <a:camera prst="orthographicFront"/>
+      <a:lightRig rig="threePt" dir="t"/>
+    </dgm:scene3d>
+    <dgm:sp3d/>
+    <dgm:txPr/>
+    <dgm:style>
+      <a:lnRef idx="0">
+        <a:scrgbClr r="0" g="0" b="0"/>
+      </a:lnRef>
+      <a:fillRef idx="1">
+        <a:scrgbClr r="0" g="0" b="0"/>
+      </a:fillRef>
+      <a:effectRef idx="0">
+        <a:scrgbClr r="0" g="0" b="0"/>
+      </a:effectRef>
+      <a:fontRef idx="minor">
+        <a:schemeClr val="lt1"/>
+      </a:fontRef>
+    </dgm:style>
+  </dgm:styleLbl>
+  <dgm:styleLbl name="bgSibTrans2D1">
+    <dgm:scene3d>
+      <a:camera prst="orthographicFront"/>
+      <a:lightRig rig="threePt" dir="t"/>
+    </dgm:scene3d>
+    <dgm:sp3d/>
+    <dgm:txPr/>
+    <dgm:style>
+      <a:lnRef idx="0">
+        <a:scrgbClr r="0" g="0" b="0"/>
+      </a:lnRef>
+      <a:fillRef idx="1">
+        <a:scrgbClr r="0" g="0" b="0"/>
+      </a:fillRef>
+      <a:effectRef idx="0">
+        <a:scrgbClr r="0" g="0" b="0"/>
+      </a:effectRef>
+      <a:fontRef idx="minor">
+        <a:schemeClr val="lt1"/>
+      </a:fontRef>
+    </dgm:style>
+  </dgm:styleLbl>
+  <dgm:styleLbl name="sibTrans1D1">
+    <dgm:scene3d>
+      <a:camera prst="orthographicFront"/>
+      <a:lightRig rig="threePt" dir="t"/>
+    </dgm:scene3d>
+    <dgm:sp3d/>
+    <dgm:txPr/>
+    <dgm:style>
+      <a:lnRef idx="1">
+        <a:scrgbClr r="0" g="0" b="0"/>
+      </a:lnRef>
+      <a:fillRef idx="0">
+        <a:scrgbClr r="0" g="0" b="0"/>
+      </a:fillRef>
+      <a:effectRef idx="0">
+        <a:scrgbClr r="0" g="0" b="0"/>
+      </a:effectRef>
+      <a:fontRef idx="minor"/>
+    </dgm:style>
+  </dgm:styleLbl>
+  <dgm:styleLbl name="callout">
+    <dgm:scene3d>
+      <a:camera prst="orthographicFront"/>
+      <a:lightRig rig="threePt" dir="t"/>
+    </dgm:scene3d>
+    <dgm:sp3d/>
+    <dgm:txPr/>
+    <dgm:style>
+      <a:lnRef idx="2">
+        <a:scrgbClr r="0" g="0" b="0"/>
+      </a:lnRef>
+      <a:fillRef idx="1">
+        <a:scrgbClr r="0" g="0" b="0"/>
+      </a:fillRef>
+      <a:effectRef idx="0">
+        <a:scrgbClr r="0" g="0" b="0"/>
+      </a:effectRef>
+      <a:fontRef idx="minor"/>
+    </dgm:style>
+  </dgm:styleLbl>
+  <dgm:styleLbl name="asst0">
+    <dgm:scene3d>
+      <a:camera prst="orthographicFront"/>
+      <a:lightRig rig="threePt" dir="t"/>
+    </dgm:scene3d>
+    <dgm:sp3d/>
+    <dgm:txPr/>
+    <dgm:style>
+      <a:lnRef idx="2">
+        <a:scrgbClr r="0" g="0" b="0"/>
+      </a:lnRef>
+      <a:fillRef idx="1">
+        <a:scrgbClr r="0" g="0" b="0"/>
+      </a:fillRef>
+      <a:effectRef idx="0">
+        <a:scrgbClr r="0" g="0" b="0"/>
+      </a:effectRef>
+      <a:fontRef idx="minor">
+        <a:schemeClr val="lt1"/>
+      </a:fontRef>
+    </dgm:style>
+  </dgm:styleLbl>
+  <dgm:styleLbl name="asst1">
+    <dgm:scene3d>
+      <a:camera prst="orthographicFront"/>
+      <a:lightRig rig="threePt" dir="t"/>
+    </dgm:scene3d>
+    <dgm:sp3d/>
+    <dgm:txPr/>
+    <dgm:style>
+      <a:lnRef idx="2">
+        <a:scrgbClr r="0" g="0" b="0"/>
+      </a:lnRef>
+      <a:fillRef idx="1">
+        <a:scrgbClr r="0" g="0" b="0"/>
+      </a:fillRef>
+      <a:effectRef idx="0">
+        <a:scrgbClr r="0" g="0" b="0"/>
+      </a:effectRef>
+      <a:fontRef idx="minor">
+        <a:schemeClr val="lt1"/>
+      </a:fontRef>
+    </dgm:style>
+  </dgm:styleLbl>
+  <dgm:styleLbl name="asst2">
+    <dgm:scene3d>
+      <a:camera prst="orthographicFront"/>
+      <a:lightRig rig="threePt" dir="t"/>
+    </dgm:scene3d>
+    <dgm:sp3d/>
+    <dgm:txPr/>
+    <dgm:style>
+      <a:lnRef idx="2">
+        <a:scrgbClr r="0" g="0" b="0"/>
+      </a:lnRef>
+      <a:fillRef idx="1">
+        <a:scrgbClr r="0" g="0" b="0"/>
+      </a:fillRef>
+      <a:effectRef idx="0">
+        <a:scrgbClr r="0" g="0" b="0"/>
+      </a:effectRef>
+      <a:fontRef idx="minor">
+        <a:schemeClr val="lt1"/>
+      </a:fontRef>
+    </dgm:style>
+  </dgm:styleLbl>
+  <dgm:styleLbl name="asst3">
+    <dgm:scene3d>
+      <a:camera prst="orthographicFront"/>
+      <a:lightRig rig="threePt" dir="t"/>
+    </dgm:scene3d>
+    <dgm:sp3d/>
+    <dgm:txPr/>
+    <dgm:style>
+      <a:lnRef idx="2">
+        <a:scrgbClr r="0" g="0" b="0"/>
+      </a:lnRef>
+      <a:fillRef idx="1">
+        <a:scrgbClr r="0" g="0" b="0"/>
+      </a:fillRef>
+      <a:effectRef idx="0">
+        <a:scrgbClr r="0" g="0" b="0"/>
+      </a:effectRef>
+      <a:fontRef idx="minor">
+        <a:schemeClr val="lt1"/>
+      </a:fontRef>
+    </dgm:style>
+  </dgm:styleLbl>
+  <dgm:styleLbl name="asst4">
+    <dgm:scene3d>
+      <a:camera prst="orthographicFront"/>
+      <a:lightRig rig="threePt" dir="t"/>
+    </dgm:scene3d>
+    <dgm:sp3d/>
+    <dgm:txPr/>
+    <dgm:style>
+      <a:lnRef idx="2">
+        <a:scrgbClr r="0" g="0" b="0"/>
+      </a:lnRef>
+      <a:fillRef idx="1">
+        <a:scrgbClr r="0" g="0" b="0"/>
+      </a:fillRef>
+      <a:effectRef idx="0">
+        <a:scrgbClr r="0" g="0" b="0"/>
+      </a:effectRef>
+      <a:fontRef idx="minor">
+        <a:schemeClr val="lt1"/>
+      </a:fontRef>
+    </dgm:style>
+  </dgm:styleLbl>
+  <dgm:styleLbl name="parChTrans2D1">
+    <dgm:scene3d>
+      <a:camera prst="orthographicFront"/>
+      <a:lightRig rig="threePt" dir="t"/>
+    </dgm:scene3d>
+    <dgm:sp3d/>
+    <dgm:txPr/>
+    <dgm:style>
+      <a:lnRef idx="2">
+        <a:scrgbClr r="0" g="0" b="0"/>
+      </a:lnRef>
+      <a:fillRef idx="1">
+        <a:scrgbClr r="0" g="0" b="0"/>
+      </a:fillRef>
+      <a:effectRef idx="0">
+        <a:scrgbClr r="0" g="0" b="0"/>
+      </a:effectRef>
+      <a:fontRef idx="minor">
+        <a:schemeClr val="lt1"/>
+      </a:fontRef>
+    </dgm:style>
+  </dgm:styleLbl>
+  <dgm:styleLbl name="parChTrans2D2">
+    <dgm:scene3d>
+      <a:camera prst="orthographicFront"/>
+      <a:lightRig rig="threePt" dir="t"/>
+    </dgm:scene3d>
+    <dgm:sp3d/>
+    <dgm:txPr/>
+    <dgm:style>
+      <a:lnRef idx="2">
+        <a:scrgbClr r="0" g="0" b="0"/>
+      </a:lnRef>
+      <a:fillRef idx="1">
+        <a:scrgbClr r="0" g="0" b="0"/>
+      </a:fillRef>
+      <a:effectRef idx="0">
+        <a:scrgbClr r="0" g="0" b="0"/>
+      </a:effectRef>
+      <a:fontRef idx="minor">
+        <a:schemeClr val="lt1"/>
+      </a:fontRef>
+    </dgm:style>
+  </dgm:styleLbl>
+  <dgm:styleLbl name="parChTrans2D3">
+    <dgm:scene3d>
+      <a:camera prst="orthographicFront"/>
+      <a:lightRig rig="threePt" dir="t"/>
+    </dgm:scene3d>
+    <dgm:sp3d/>
+    <dgm:txPr/>
+    <dgm:style>
+      <a:lnRef idx="2">
+        <a:scrgbClr r="0" g="0" b="0"/>
+      </a:lnRef>
+      <a:fillRef idx="1">
+        <a:scrgbClr r="0" g="0" b="0"/>
+      </a:fillRef>
+      <a:effectRef idx="0">
+        <a:scrgbClr r="0" g="0" b="0"/>
+      </a:effectRef>
+      <a:fontRef idx="minor">
+        <a:schemeClr val="lt1"/>
+      </a:fontRef>
+    </dgm:style>
+  </dgm:styleLbl>
+  <dgm:styleLbl name="parChTrans2D4">
+    <dgm:scene3d>
+      <a:camera prst="orthographicFront"/>
+      <a:lightRig rig="threePt" dir="t"/>
+    </dgm:scene3d>
+    <dgm:sp3d/>
+    <dgm:txPr/>
+    <dgm:style>
+      <a:lnRef idx="2">
+        <a:scrgbClr r="0" g="0" b="0"/>
+      </a:lnRef>
+      <a:fillRef idx="1">
+        <a:scrgbClr r="0" g="0" b="0"/>
+      </a:fillRef>
+      <a:effectRef idx="0">
+        <a:scrgbClr r="0" g="0" b="0"/>
+      </a:effectRef>
+      <a:fontRef idx="minor">
+        <a:schemeClr val="lt1"/>
+      </a:fontRef>
+    </dgm:style>
+  </dgm:styleLbl>
+  <dgm:styleLbl name="parChTrans1D1">
+    <dgm:scene3d>
+      <a:camera prst="orthographicFront"/>
+      <a:lightRig rig="threePt" dir="t"/>
+    </dgm:scene3d>
+    <dgm:sp3d/>
+    <dgm:txPr/>
+    <dgm:style>
+      <a:lnRef idx="2">
+        <a:scrgbClr r="0" g="0" b="0"/>
+      </a:lnRef>
+      <a:fillRef idx="0">
+        <a:scrgbClr r="0" g="0" b="0"/>
+      </a:fillRef>
+      <a:effectRef idx="0">
+        <a:scrgbClr r="0" g="0" b="0"/>
+      </a:effectRef>
+      <a:fontRef idx="minor"/>
+    </dgm:style>
+  </dgm:styleLbl>
+  <dgm:styleLbl name="parChTrans1D2">
+    <dgm:scene3d>
+      <a:camera prst="orthographicFront"/>
+      <a:lightRig rig="threePt" dir="t"/>
+    </dgm:scene3d>
+    <dgm:sp3d/>
+    <dgm:txPr/>
+    <dgm:style>
+      <a:lnRef idx="2">
+        <a:scrgbClr r="0" g="0" b="0"/>
+      </a:lnRef>
+      <a:fillRef idx="0">
+        <a:scrgbClr r="0" g="0" b="0"/>
+      </a:fillRef>
+      <a:effectRef idx="0">
+        <a:scrgbClr r="0" g="0" b="0"/>
+      </a:effectRef>
+      <a:fontRef idx="minor"/>
+    </dgm:style>
+  </dgm:styleLbl>
+  <dgm:styleLbl name="parChTrans1D3">
+    <dgm:scene3d>
+      <a:camera prst="orthographicFront"/>
+      <a:lightRig rig="threePt" dir="t"/>
+    </dgm:scene3d>
+    <dgm:sp3d/>
+    <dgm:txPr/>
+    <dgm:style>
+      <a:lnRef idx="2">
+        <a:scrgbClr r="0" g="0" b="0"/>
+      </a:lnRef>
+      <a:fillRef idx="0">
+        <a:scrgbClr r="0" g="0" b="0"/>
+      </a:fillRef>
+      <a:effectRef idx="0">
+        <a:scrgbClr r="0" g="0" b="0"/>
+      </a:effectRef>
+      <a:fontRef idx="minor"/>
+    </dgm:style>
+  </dgm:styleLbl>
+  <dgm:styleLbl name="parChTrans1D4">
+    <dgm:scene3d>
+      <a:camera prst="orthographicFront"/>
+      <a:lightRig rig="threePt" dir="t"/>
+    </dgm:scene3d>
+    <dgm:sp3d/>
+    <dgm:txPr/>
+    <dgm:style>
+      <a:lnRef idx="2">
+        <a:scrgbClr r="0" g="0" b="0"/>
+      </a:lnRef>
+      <a:fillRef idx="0">
+        <a:scrgbClr r="0" g="0" b="0"/>
+      </a:fillRef>
+      <a:effectRef idx="0">
+        <a:scrgbClr r="0" g="0" b="0"/>
+      </a:effectRef>
+      <a:fontRef idx="minor"/>
+    </dgm:style>
+  </dgm:styleLbl>
+  <dgm:styleLbl name="fgAcc1">
+    <dgm:scene3d>
+      <a:camera prst="orthographicFront"/>
+      <a:lightRig rig="threePt" dir="t"/>
+    </dgm:scene3d>
+    <dgm:sp3d/>
+    <dgm:txPr/>
+    <dgm:style>
+      <a:lnRef idx="2">
+        <a:scrgbClr r="0" g="0" b="0"/>
+      </a:lnRef>
+      <a:fillRef idx="1">
+        <a:scrgbClr r="0" g="0" b="0"/>
+      </a:fillRef>
+      <a:effectRef idx="0">
+        <a:scrgbClr r="0" g="0" b="0"/>
+      </a:effectRef>
+      <a:fontRef idx="minor"/>
+    </dgm:style>
+  </dgm:styleLbl>
+  <dgm:styleLbl name="conFgAcc1">
+    <dgm:scene3d>
+      <a:camera prst="orthographicFront"/>
+      <a:lightRig rig="threePt" dir="t"/>
+    </dgm:scene3d>
+    <dgm:sp3d/>
+    <dgm:txPr/>
+    <dgm:style>
+      <a:lnRef idx="2">
+        <a:scrgbClr r="0" g="0" b="0"/>
+      </a:lnRef>
+      <a:fillRef idx="1">
+        <a:scrgbClr r="0" g="0" b="0"/>
+      </a:fillRef>
+      <a:effectRef idx="0">
+        <a:scrgbClr r="0" g="0" b="0"/>
+      </a:effectRef>
+      <a:fontRef idx="minor"/>
+    </dgm:style>
+  </dgm:styleLbl>
+  <dgm:styleLbl name="alignAcc1">
+    <dgm:scene3d>
+      <a:camera prst="orthographicFront"/>
+      <a:lightRig rig="threePt" dir="t"/>
+    </dgm:scene3d>
+    <dgm:sp3d/>
+    <dgm:txPr/>
+    <dgm:style>
+      <a:lnRef idx="2">
+        <a:scrgbClr r="0" g="0" b="0"/>
+      </a:lnRef>
+      <a:fillRef idx="1">
+        <a:scrgbClr r="0" g="0" b="0"/>
+      </a:fillRef>
+      <a:effectRef idx="0">
+        <a:scrgbClr r="0" g="0" b="0"/>
+      </a:effectRef>
+      <a:fontRef idx="minor"/>
+    </dgm:style>
+  </dgm:styleLbl>
+  <dgm:styleLbl name="trAlignAcc1">
+    <dgm:scene3d>
+      <a:camera prst="orthographicFront"/>
+      <a:lightRig rig="threePt" dir="t"/>
+    </dgm:scene3d>
+    <dgm:sp3d/>
+    <dgm:txPr/>
+    <dgm:style>
+      <a:lnRef idx="1">
+        <a:scrgbClr r="0" g="0" b="0"/>
+      </a:lnRef>
+      <a:fillRef idx="1">
+        <a:scrgbClr r="0" g="0" b="0"/>
+      </a:fillRef>
+      <a:effectRef idx="0">
+        <a:scrgbClr r="0" g="0" b="0"/>
+      </a:effectRef>
+      <a:fontRef idx="minor"/>
+    </dgm:style>
+  </dgm:styleLbl>
+  <dgm:styleLbl name="bgAcc1">
+    <dgm:scene3d>
+      <a:camera prst="orthographicFront"/>
+      <a:lightRig rig="threePt" dir="t"/>
+    </dgm:scene3d>
+    <dgm:sp3d/>
+    <dgm:txPr/>
+    <dgm:style>
+      <a:lnRef idx="2">
+        <a:scrgbClr r="0" g="0" b="0"/>
+      </a:lnRef>
+      <a:fillRef idx="1">
+        <a:scrgbClr r="0" g="0" b="0"/>
+      </a:fillRef>
+      <a:effectRef idx="0">
+        <a:scrgbClr r="0" g="0" b="0"/>
+      </a:effectRef>
+      <a:fontRef idx="minor"/>
+    </dgm:style>
+  </dgm:styleLbl>
+  <dgm:styleLbl name="solidFgAcc1">
+    <dgm:scene3d>
+      <a:camera prst="orthographicFront"/>
+      <a:lightRig rig="threePt" dir="t"/>
+    </dgm:scene3d>
+    <dgm:sp3d/>
+    <dgm:txPr/>
+    <dgm:style>
+      <a:lnRef idx="2">
+        <a:scrgbClr r="0" g="0" b="0"/>
+      </a:lnRef>
+      <a:fillRef idx="1">
+        <a:scrgbClr r="0" g="0" b="0"/>
+      </a:fillRef>
+      <a:effectRef idx="0">
+        <a:scrgbClr r="0" g="0" b="0"/>
+      </a:effectRef>
+      <a:fontRef idx="minor"/>
+    </dgm:style>
+  </dgm:styleLbl>
+  <dgm:styleLbl name="solidAlignAcc1">
+    <dgm:scene3d>
+      <a:camera prst="orthographicFront"/>
+      <a:lightRig rig="threePt" dir="t"/>
+    </dgm:scene3d>
+    <dgm:sp3d/>
+    <dgm:txPr/>
+    <dgm:style>
+      <a:lnRef idx="2">
+        <a:scrgbClr r="0" g="0" b="0"/>
+      </a:lnRef>
+      <a:fillRef idx="1">
+        <a:scrgbClr r="0" g="0" b="0"/>
+      </a:fillRef>
+      <a:effectRef idx="0">
+        <a:scrgbClr r="0" g="0" b="0"/>
+      </a:effectRef>
+      <a:fontRef idx="minor"/>
+    </dgm:style>
+  </dgm:styleLbl>
+  <dgm:styleLbl name="solidBgAcc1">
+    <dgm:scene3d>
+      <a:camera prst="orthographicFront"/>
+      <a:lightRig rig="threePt" dir="t"/>
+    </dgm:scene3d>
+    <dgm:sp3d/>
+    <dgm:txPr/>
+    <dgm:style>
+      <a:lnRef idx="2">
+        <a:scrgbClr r="0" g="0" b="0"/>
+      </a:lnRef>
+      <a:fillRef idx="1">
+        <a:scrgbClr r="0" g="0" b="0"/>
+      </a:fillRef>
+      <a:effectRef idx="0">
+        <a:scrgbClr r="0" g="0" b="0"/>
+      </a:effectRef>
+      <a:fontRef idx="minor"/>
+    </dgm:style>
+  </dgm:styleLbl>
+  <dgm:styleLbl name="fgAccFollowNode1">
+    <dgm:scene3d>
+      <a:camera prst="orthographicFront"/>
+      <a:lightRig rig="threePt" dir="t"/>
+    </dgm:scene3d>
+    <dgm:sp3d/>
+    <dgm:txPr/>
+    <dgm:style>
+      <a:lnRef idx="2">
+        <a:scrgbClr r="0" g="0" b="0"/>
+      </a:lnRef>
+      <a:fillRef idx="1">
+        <a:scrgbClr r="0" g="0" b="0"/>
+      </a:fillRef>
+      <a:effectRef idx="0">
+        <a:scrgbClr r="0" g="0" b="0"/>
+      </a:effectRef>
+      <a:fontRef idx="minor"/>
+    </dgm:style>
+  </dgm:styleLbl>
+  <dgm:styleLbl name="alignAccFollowNode1">
+    <dgm:scene3d>
+      <a:camera prst="orthographicFront"/>
+      <a:lightRig rig="threePt" dir="t"/>
+    </dgm:scene3d>
+    <dgm:sp3d/>
+    <dgm:txPr/>
+    <dgm:style>
+      <a:lnRef idx="2">
+        <a:scrgbClr r="0" g="0" b="0"/>
+      </a:lnRef>
+      <a:fillRef idx="1">
+        <a:scrgbClr r="0" g="0" b="0"/>
+      </a:fillRef>
+      <a:effectRef idx="0">
+        <a:scrgbClr r="0" g="0" b="0"/>
+      </a:effectRef>
+      <a:fontRef idx="minor"/>
+    </dgm:style>
+  </dgm:styleLbl>
+  <dgm:styleLbl name="bgAccFollowNode1">
+    <dgm:scene3d>
+      <a:camera prst="orthographicFront"/>
+      <a:lightRig rig="threePt" dir="t"/>
+    </dgm:scene3d>
+    <dgm:sp3d/>
+    <dgm:txPr/>
+    <dgm:style>
+      <a:lnRef idx="2">
+        <a:scrgbClr r="0" g="0" b="0"/>
+      </a:lnRef>
+      <a:fillRef idx="1">
+        <a:scrgbClr r="0" g="0" b="0"/>
+      </a:fillRef>
+      <a:effectRef idx="0">
+        <a:scrgbClr r="0" g="0" b="0"/>
+      </a:effectRef>
+      <a:fontRef idx="minor"/>
+    </dgm:style>
+  </dgm:styleLbl>
+  <dgm:styleLbl name="fgAcc0">
+    <dgm:scene3d>
+      <a:camera prst="orthographicFront"/>
+      <a:lightRig rig="threePt" dir="t"/>
+    </dgm:scene3d>
+    <dgm:sp3d/>
+    <dgm:txPr/>
+    <dgm:style>
+      <a:lnRef idx="2">
+        <a:scrgbClr r="0" g="0" b="0"/>
+      </a:lnRef>
+      <a:fillRef idx="1">
+        <a:scrgbClr r="0" g="0" b="0"/>
+      </a:fillRef>
+      <a:effectRef idx="0">
+        <a:scrgbClr r="0" g="0" b="0"/>
+      </a:effectRef>
+      <a:fontRef idx="minor"/>
+    </dgm:style>
+  </dgm:styleLbl>
+  <dgm:styleLbl name="fgAcc2">
+    <dgm:scene3d>
+      <a:camera prst="orthographicFront"/>
+      <a:lightRig rig="threePt" dir="t"/>
+    </dgm:scene3d>
+    <dgm:sp3d/>
+    <dgm:txPr/>
+    <dgm:style>
+      <a:lnRef idx="2">
+        <a:scrgbClr r="0" g="0" b="0"/>
+      </a:lnRef>
+      <a:fillRef idx="1">
+        <a:scrgbClr r="0" g="0" b="0"/>
+      </a:fillRef>
+      <a:effectRef idx="0">
+        <a:scrgbClr r="0" g="0" b="0"/>
+      </a:effectRef>
+      <a:fontRef idx="minor"/>
+    </dgm:style>
+  </dgm:styleLbl>
+  <dgm:styleLbl name="fgAcc3">
+    <dgm:scene3d>
+      <a:camera prst="orthographicFront"/>
+      <a:lightRig rig="threePt" dir="t"/>
+    </dgm:scene3d>
+    <dgm:sp3d/>
+    <dgm:txPr/>
+    <dgm:style>
+      <a:lnRef idx="2">
+        <a:scrgbClr r="0" g="0" b="0"/>
+      </a:lnRef>
+      <a:fillRef idx="1">
+        <a:scrgbClr r="0" g="0" b="0"/>
+      </a:fillRef>
+      <a:effectRef idx="0">
+        <a:scrgbClr r="0" g="0" b="0"/>
+      </a:effectRef>
+      <a:fontRef idx="minor"/>
+    </dgm:style>
+  </dgm:styleLbl>
+  <dgm:styleLbl name="fgAcc4">
+    <dgm:scene3d>
+      <a:camera prst="orthographicFront"/>
+      <a:lightRig rig="threePt" dir="t"/>
+    </dgm:scene3d>
+    <dgm:sp3d/>
+    <dgm:txPr/>
+    <dgm:style>
+      <a:lnRef idx="2">
+        <a:scrgbClr r="0" g="0" b="0"/>
+      </a:lnRef>
+      <a:fillRef idx="1">
+        <a:scrgbClr r="0" g="0" b="0"/>
+      </a:fillRef>
+      <a:effectRef idx="0">
+        <a:scrgbClr r="0" g="0" b="0"/>
+      </a:effectRef>
+      <a:fontRef idx="minor"/>
+    </dgm:style>
+  </dgm:styleLbl>
+  <dgm:styleLbl name="bgShp">
+    <dgm:scene3d>
+      <a:camera prst="orthographicFront"/>
+      <a:lightRig rig="threePt" dir="t"/>
+    </dgm:scene3d>
+    <dgm:sp3d/>
+    <dgm:txPr/>
+    <dgm:style>
+      <a:lnRef idx="0">
+        <a:scrgbClr r="0" g="0" b="0"/>
+      </a:lnRef>
+      <a:fillRef idx="1">
+        <a:scrgbClr r="0" g="0" b="0"/>
+      </a:fillRef>
+      <a:effectRef idx="0">
+        <a:scrgbClr r="0" g="0" b="0"/>
+      </a:effectRef>
+      <a:fontRef idx="minor"/>
+    </dgm:style>
+  </dgm:styleLbl>
+  <dgm:styleLbl name="dkBgShp">
+    <dgm:scene3d>
+      <a:camera prst="orthographicFront"/>
+      <a:lightRig rig="threePt" dir="t"/>
+    </dgm:scene3d>
+    <dgm:sp3d/>
+    <dgm:txPr/>
+    <dgm:style>
+      <a:lnRef idx="0">
+        <a:scrgbClr r="0" g="0" b="0"/>
+      </a:lnRef>
+      <a:fillRef idx="1">
+        <a:scrgbClr r="0" g="0" b="0"/>
+      </a:fillRef>
+      <a:effectRef idx="0">
+        <a:scrgbClr r="0" g="0" b="0"/>
+      </a:effectRef>
+      <a:fontRef idx="minor"/>
+    </dgm:style>
+  </dgm:styleLbl>
+  <dgm:styleLbl name="trBgShp">
+    <dgm:scene3d>
+      <a:camera prst="orthographicFront"/>
+      <a:lightRig rig="threePt" dir="t"/>
+    </dgm:scene3d>
+    <dgm:sp3d/>
+    <dgm:txPr/>
+    <dgm:style>
+      <a:lnRef idx="0">
+        <a:scrgbClr r="0" g="0" b="0"/>
+      </a:lnRef>
+      <a:fillRef idx="1">
+        <a:scrgbClr r="0" g="0" b="0"/>
+      </a:fillRef>
+      <a:effectRef idx="0">
+        <a:scrgbClr r="0" g="0" b="0"/>
+      </a:effectRef>
+      <a:fontRef idx="minor"/>
+    </dgm:style>
+  </dgm:styleLbl>
+  <dgm:styleLbl name="fgShp">
+    <dgm:scene3d>
+      <a:camera prst="orthographicFront"/>
+      <a:lightRig rig="threePt" dir="t"/>
+    </dgm:scene3d>
+    <dgm:sp3d/>
+    <dgm:txPr/>
+    <dgm:style>
+      <a:lnRef idx="2">
+        <a:scrgbClr r="0" g="0" b="0"/>
+      </a:lnRef>
+      <a:fillRef idx="1">
+        <a:scrgbClr r="0" g="0" b="0"/>
+      </a:fillRef>
+      <a:effectRef idx="0">
+        <a:scrgbClr r="0" g="0" b="0"/>
+      </a:effectRef>
+      <a:fontRef idx="minor"/>
+    </dgm:style>
+  </dgm:styleLbl>
+  <dgm:styleLbl name="revTx">
+    <dgm:scene3d>
+      <a:camera prst="orthographicFront"/>
+      <a:lightRig rig="threePt" dir="t"/>
+    </dgm:scene3d>
+    <dgm:sp3d/>
+    <dgm:txPr/>
+    <dgm:style>
+      <a:lnRef idx="0">
+        <a:scrgbClr r="0" g="0" b="0"/>
+      </a:lnRef>
+      <a:fillRef idx="0">
+        <a:scrgbClr r="0" g="0" b="0"/>
+      </a:fillRef>
+      <a:effectRef idx="0">
+        <a:scrgbClr r="0" g="0" b="0"/>
+      </a:effectRef>
+      <a:fontRef idx="minor"/>
+    </dgm:style>
+  </dgm:styleLbl>
+</dgm:styleDef>
+</file>
+
+<file path=ppt/diagrams/quickStyle5.xml><?xml version="1.0" encoding="utf-8"?>
 <dgm:styleDef xmlns:dgm="http://schemas.openxmlformats.org/drawingml/2006/diagram" xmlns:a="http://schemas.openxmlformats.org/drawingml/2006/main" uniqueId="urn:microsoft.com/office/officeart/2005/8/quickstyle/simple1">
   <dgm:title val=""/>
   <dgm:desc val=""/>
@@ -12971,7 +16544,7 @@
           <a:p>
             <a:fld id="{E70BB040-1417-463D-8924-20454A1D4474}" type="datetimeFigureOut">
               <a:rPr lang="en-IN" smtClean="0"/>
-              <a:t>06-01-2024</a:t>
+              <a:t>07-01-2024</a:t>
             </a:fld>
             <a:endParaRPr lang="en-IN"/>
           </a:p>
@@ -13171,7 +16744,7 @@
           <a:p>
             <a:fld id="{E70BB040-1417-463D-8924-20454A1D4474}" type="datetimeFigureOut">
               <a:rPr lang="en-IN" smtClean="0"/>
-              <a:t>06-01-2024</a:t>
+              <a:t>07-01-2024</a:t>
             </a:fld>
             <a:endParaRPr lang="en-IN"/>
           </a:p>
@@ -13381,7 +16954,7 @@
           <a:p>
             <a:fld id="{E70BB040-1417-463D-8924-20454A1D4474}" type="datetimeFigureOut">
               <a:rPr lang="en-IN" smtClean="0"/>
-              <a:t>06-01-2024</a:t>
+              <a:t>07-01-2024</a:t>
             </a:fld>
             <a:endParaRPr lang="en-IN"/>
           </a:p>
@@ -13581,7 +17154,7 @@
           <a:p>
             <a:fld id="{E70BB040-1417-463D-8924-20454A1D4474}" type="datetimeFigureOut">
               <a:rPr lang="en-IN" smtClean="0"/>
-              <a:t>06-01-2024</a:t>
+              <a:t>07-01-2024</a:t>
             </a:fld>
             <a:endParaRPr lang="en-IN"/>
           </a:p>
@@ -13857,7 +17430,7 @@
           <a:p>
             <a:fld id="{E70BB040-1417-463D-8924-20454A1D4474}" type="datetimeFigureOut">
               <a:rPr lang="en-IN" smtClean="0"/>
-              <a:t>06-01-2024</a:t>
+              <a:t>07-01-2024</a:t>
             </a:fld>
             <a:endParaRPr lang="en-IN"/>
           </a:p>
@@ -14125,7 +17698,7 @@
           <a:p>
             <a:fld id="{E70BB040-1417-463D-8924-20454A1D4474}" type="datetimeFigureOut">
               <a:rPr lang="en-IN" smtClean="0"/>
-              <a:t>06-01-2024</a:t>
+              <a:t>07-01-2024</a:t>
             </a:fld>
             <a:endParaRPr lang="en-IN"/>
           </a:p>
@@ -14540,7 +18113,7 @@
           <a:p>
             <a:fld id="{E70BB040-1417-463D-8924-20454A1D4474}" type="datetimeFigureOut">
               <a:rPr lang="en-IN" smtClean="0"/>
-              <a:t>06-01-2024</a:t>
+              <a:t>07-01-2024</a:t>
             </a:fld>
             <a:endParaRPr lang="en-IN"/>
           </a:p>
@@ -14682,7 +18255,7 @@
           <a:p>
             <a:fld id="{E70BB040-1417-463D-8924-20454A1D4474}" type="datetimeFigureOut">
               <a:rPr lang="en-IN" smtClean="0"/>
-              <a:t>06-01-2024</a:t>
+              <a:t>07-01-2024</a:t>
             </a:fld>
             <a:endParaRPr lang="en-IN"/>
           </a:p>
@@ -14795,7 +18368,7 @@
           <a:p>
             <a:fld id="{E70BB040-1417-463D-8924-20454A1D4474}" type="datetimeFigureOut">
               <a:rPr lang="en-IN" smtClean="0"/>
-              <a:t>06-01-2024</a:t>
+              <a:t>07-01-2024</a:t>
             </a:fld>
             <a:endParaRPr lang="en-IN"/>
           </a:p>
@@ -15108,7 +18681,7 @@
           <a:p>
             <a:fld id="{E70BB040-1417-463D-8924-20454A1D4474}" type="datetimeFigureOut">
               <a:rPr lang="en-IN" smtClean="0"/>
-              <a:t>06-01-2024</a:t>
+              <a:t>07-01-2024</a:t>
             </a:fld>
             <a:endParaRPr lang="en-IN"/>
           </a:p>
@@ -15397,7 +18970,7 @@
           <a:p>
             <a:fld id="{E70BB040-1417-463D-8924-20454A1D4474}" type="datetimeFigureOut">
               <a:rPr lang="en-IN" smtClean="0"/>
-              <a:t>06-01-2024</a:t>
+              <a:t>07-01-2024</a:t>
             </a:fld>
             <a:endParaRPr lang="en-IN"/>
           </a:p>
@@ -15640,7 +19213,7 @@
           <a:p>
             <a:fld id="{E70BB040-1417-463D-8924-20454A1D4474}" type="datetimeFigureOut">
               <a:rPr lang="en-IN" smtClean="0"/>
-              <a:t>06-01-2024</a:t>
+              <a:t>07-01-2024</a:t>
             </a:fld>
             <a:endParaRPr lang="en-IN"/>
           </a:p>
@@ -17348,182 +20921,9 @@
           </a:p>
         </p:txBody>
       </p:sp>
-      <p:sp>
-        <p:nvSpPr>
-          <p:cNvPr id="6" name="TextBox 5">
-            <a:extLst>
-              <a:ext uri="{FF2B5EF4-FFF2-40B4-BE49-F238E27FC236}">
-                <a16:creationId xmlns:a16="http://schemas.microsoft.com/office/drawing/2014/main" id="{9DA96A14-ED5C-1AF2-A167-6EA4B400FC2A}"/>
-              </a:ext>
-            </a:extLst>
-          </p:cNvPr>
-          <p:cNvSpPr txBox="1"/>
-          <p:nvPr/>
-        </p:nvSpPr>
-        <p:spPr>
-          <a:xfrm>
-            <a:off x="699713" y="1655276"/>
-            <a:ext cx="10212698" cy="5078313"/>
-          </a:xfrm>
-          <a:prstGeom prst="rect">
-            <a:avLst/>
-          </a:prstGeom>
-          <a:noFill/>
-        </p:spPr>
-        <p:txBody>
-          <a:bodyPr wrap="square" rtlCol="0">
-            <a:spAutoFit/>
-          </a:bodyPr>
-          <a:lstStyle/>
-          <a:p>
-            <a:pPr marL="285750" indent="-285750" algn="just">
-              <a:buFont typeface="Arial" panose="020B0604020202020204" pitchFamily="34" charset="0"/>
-              <a:buChar char="•"/>
-            </a:pPr>
-            <a:endParaRPr lang="en-US" b="0" i="1" dirty="0">
-              <a:effectLst/>
-              <a:latin typeface="Times New Roman" panose="02020603050405020304" pitchFamily="18" charset="0"/>
-              <a:cs typeface="Times New Roman" panose="02020603050405020304" pitchFamily="18" charset="0"/>
-            </a:endParaRPr>
-          </a:p>
-          <a:p>
-            <a:pPr marL="285750" indent="-285750" algn="just">
-              <a:buFont typeface="Arial" panose="020B0604020202020204" pitchFamily="34" charset="0"/>
-              <a:buChar char="•"/>
-            </a:pPr>
-            <a:r>
-              <a:rPr lang="en-US" b="0" i="1" dirty="0">
-                <a:effectLst/>
-                <a:latin typeface="Times New Roman" panose="02020603050405020304" pitchFamily="18" charset="0"/>
-                <a:cs typeface="Times New Roman" panose="02020603050405020304" pitchFamily="18" charset="0"/>
-              </a:rPr>
-              <a:t>The method </a:t>
-            </a:r>
-            <a:r>
-              <a:rPr lang="en-US" b="1" i="1" dirty="0">
-                <a:effectLst/>
-                <a:latin typeface="Times New Roman" panose="02020603050405020304" pitchFamily="18" charset="0"/>
-                <a:cs typeface="Times New Roman" panose="02020603050405020304" pitchFamily="18" charset="0"/>
-              </a:rPr>
-              <a:t>'</a:t>
-            </a:r>
-            <a:r>
-              <a:rPr lang="en-US" b="1" i="1" dirty="0" err="1">
-                <a:effectLst/>
-                <a:latin typeface="Times New Roman" panose="02020603050405020304" pitchFamily="18" charset="0"/>
-                <a:cs typeface="Times New Roman" panose="02020603050405020304" pitchFamily="18" charset="0"/>
-              </a:rPr>
-              <a:t>RunMultiSequenceLearningExperimentWithImage</a:t>
-            </a:r>
-            <a:r>
-              <a:rPr lang="en-US" b="1" i="1" dirty="0">
-                <a:effectLst/>
-                <a:latin typeface="Times New Roman" panose="02020603050405020304" pitchFamily="18" charset="0"/>
-                <a:cs typeface="Times New Roman" panose="02020603050405020304" pitchFamily="18" charset="0"/>
-              </a:rPr>
-              <a:t>()' </a:t>
-            </a:r>
-            <a:r>
-              <a:rPr lang="en-US" b="0" i="1" dirty="0">
-                <a:effectLst/>
-                <a:latin typeface="Times New Roman" panose="02020603050405020304" pitchFamily="18" charset="0"/>
-                <a:cs typeface="Times New Roman" panose="02020603050405020304" pitchFamily="18" charset="0"/>
-              </a:rPr>
-              <a:t>plays a pivotal role in our model's functionality by handling input images. Initially, this method initiates the process by receiving an input image. The image undergoes a crucial transformation within the </a:t>
-            </a:r>
-            <a:r>
-              <a:rPr lang="en-US" b="1" i="1" dirty="0">
-                <a:effectLst/>
-                <a:latin typeface="Times New Roman" panose="02020603050405020304" pitchFamily="18" charset="0"/>
-                <a:cs typeface="Times New Roman" panose="02020603050405020304" pitchFamily="18" charset="0"/>
-              </a:rPr>
-              <a:t>'</a:t>
-            </a:r>
-            <a:r>
-              <a:rPr lang="en-US" b="1" i="1" dirty="0" err="1">
-                <a:effectLst/>
-                <a:latin typeface="Times New Roman" panose="02020603050405020304" pitchFamily="18" charset="0"/>
-                <a:cs typeface="Times New Roman" panose="02020603050405020304" pitchFamily="18" charset="0"/>
-              </a:rPr>
-              <a:t>ConvertImageToSequence</a:t>
-            </a:r>
-            <a:r>
-              <a:rPr lang="en-US" b="1" i="1" dirty="0">
-                <a:effectLst/>
-                <a:latin typeface="Times New Roman" panose="02020603050405020304" pitchFamily="18" charset="0"/>
-                <a:cs typeface="Times New Roman" panose="02020603050405020304" pitchFamily="18" charset="0"/>
-              </a:rPr>
-              <a:t>()' </a:t>
-            </a:r>
-            <a:r>
-              <a:rPr lang="en-US" b="0" i="1" dirty="0">
-                <a:effectLst/>
-                <a:latin typeface="Times New Roman" panose="02020603050405020304" pitchFamily="18" charset="0"/>
-                <a:cs typeface="Times New Roman" panose="02020603050405020304" pitchFamily="18" charset="0"/>
-              </a:rPr>
-              <a:t>function, where it gets converted into a sequence of pixels. This transformation is vital, as it ensures that every pixel within the image is uniquely represented within the sequence.</a:t>
-            </a:r>
-          </a:p>
-          <a:p>
-            <a:pPr algn="just"/>
-            <a:endParaRPr lang="en-US" b="0" i="1" dirty="0">
-              <a:effectLst/>
-              <a:latin typeface="Times New Roman" panose="02020603050405020304" pitchFamily="18" charset="0"/>
-              <a:cs typeface="Times New Roman" panose="02020603050405020304" pitchFamily="18" charset="0"/>
-            </a:endParaRPr>
-          </a:p>
-          <a:p>
-            <a:pPr marL="285750" indent="-285750" algn="just">
-              <a:buFont typeface="Arial" panose="020B0604020202020204" pitchFamily="34" charset="0"/>
-              <a:buChar char="•"/>
-            </a:pPr>
-            <a:r>
-              <a:rPr lang="en-US" b="0" i="1" dirty="0">
-                <a:effectLst/>
-                <a:latin typeface="Times New Roman" panose="02020603050405020304" pitchFamily="18" charset="0"/>
-                <a:cs typeface="Times New Roman" panose="02020603050405020304" pitchFamily="18" charset="0"/>
-              </a:rPr>
-              <a:t>Subsequently, the model leverages this sequence of pixels to predict whether the input image corresponds to a match or a non-match. This prediction is based on whether the output pixel sequence aligns with the input pixel sequence. If a match is found between the output and input pixel sequences, the model predicts a match for the image. Conversely, if there's no correspondence between the sequences, the model predicts that the image does not match based on its pixel representation.</a:t>
-            </a:r>
-          </a:p>
-          <a:p>
-            <a:pPr algn="just"/>
-            <a:endParaRPr lang="en-US" b="0" i="1" dirty="0">
-              <a:effectLst/>
-              <a:latin typeface="Times New Roman" panose="02020603050405020304" pitchFamily="18" charset="0"/>
-              <a:cs typeface="Times New Roman" panose="02020603050405020304" pitchFamily="18" charset="0"/>
-            </a:endParaRPr>
-          </a:p>
-          <a:p>
-            <a:pPr marL="285750" indent="-285750" algn="just">
-              <a:buFont typeface="Arial" panose="020B0604020202020204" pitchFamily="34" charset="0"/>
-              <a:buChar char="•"/>
-            </a:pPr>
-            <a:r>
-              <a:rPr lang="en-US" b="0" i="1" dirty="0">
-                <a:effectLst/>
-                <a:latin typeface="Times New Roman" panose="02020603050405020304" pitchFamily="18" charset="0"/>
-                <a:cs typeface="Times New Roman" panose="02020603050405020304" pitchFamily="18" charset="0"/>
-              </a:rPr>
-              <a:t>This classification process is fundamental, as it harnesses the uniqueness of each pixel within the image. By analyzing these individual pixels and their sequences, the model determines whether the given image matches the input pixel sequence. This approach serves as a powerful tool for discerning the similarity or dissimilarity of images based on their pixel compositions</a:t>
-            </a:r>
-          </a:p>
-          <a:p>
-            <a:pPr marL="285750" indent="-285750" algn="just">
-              <a:buFont typeface="Arial" panose="020B0604020202020204" pitchFamily="34" charset="0"/>
-              <a:buChar char="•"/>
-            </a:pPr>
-            <a:endParaRPr lang="en-US" b="0" i="1" dirty="0">
-              <a:effectLst/>
-              <a:latin typeface="Times New Roman" panose="02020603050405020304" pitchFamily="18" charset="0"/>
-              <a:cs typeface="Times New Roman" panose="02020603050405020304" pitchFamily="18" charset="0"/>
-            </a:endParaRPr>
-          </a:p>
-        </p:txBody>
-      </p:sp>
       <p:pic>
         <p:nvPicPr>
-          <p:cNvPr id="8" name="image5.png">
+          <p:cNvPr id="8" name="image5.png" descr="A logo for a university&#10;&#10;Description automatically generated">
             <a:extLst>
               <a:ext uri="{FF2B5EF4-FFF2-40B4-BE49-F238E27FC236}">
                 <a16:creationId xmlns:a16="http://schemas.microsoft.com/office/drawing/2014/main" id="{620AC94A-47D9-F118-F547-B3BD3772A3A1}"/>
@@ -17566,6 +20966,34 @@
           </a:fontRef>
         </p:style>
       </p:pic>
+      <p:graphicFrame>
+        <p:nvGraphicFramePr>
+          <p:cNvPr id="22" name="TextBox 5">
+            <a:extLst>
+              <a:ext uri="{FF2B5EF4-FFF2-40B4-BE49-F238E27FC236}">
+                <a16:creationId xmlns:a16="http://schemas.microsoft.com/office/drawing/2014/main" id="{3F038EE0-6565-41D2-C6FB-17F9DF9EC9B1}"/>
+              </a:ext>
+            </a:extLst>
+          </p:cNvPr>
+          <p:cNvGraphicFramePr/>
+          <p:nvPr>
+            <p:extLst>
+              <p:ext uri="{D42A27DB-BD31-4B8C-83A1-F6EECF244321}">
+                <p14:modId xmlns:p14="http://schemas.microsoft.com/office/powerpoint/2010/main" val="1814612273"/>
+              </p:ext>
+            </p:extLst>
+          </p:nvPr>
+        </p:nvGraphicFramePr>
+        <p:xfrm>
+          <a:off x="699713" y="1563183"/>
+          <a:ext cx="10212698" cy="5355312"/>
+        </p:xfrm>
+        <a:graphic>
+          <a:graphicData uri="http://schemas.openxmlformats.org/drawingml/2006/diagram">
+            <dgm:relIds xmlns:dgm="http://schemas.openxmlformats.org/drawingml/2006/diagram" xmlns:r="http://schemas.openxmlformats.org/officeDocument/2006/relationships" r:dm="rId3" r:lo="rId4" r:qs="rId5" r:cs="rId6"/>
+          </a:graphicData>
+        </a:graphic>
+      </p:graphicFrame>
     </p:spTree>
     <p:extLst>
       <p:ext uri="{BB962C8B-B14F-4D97-AF65-F5344CB8AC3E}">
@@ -17979,8 +21407,8 @@
         </p:nvSpPr>
         <p:spPr>
           <a:xfrm>
-            <a:off x="572492" y="4170416"/>
-            <a:ext cx="10212698" cy="2585323"/>
+            <a:off x="580444" y="4397068"/>
+            <a:ext cx="10212698" cy="2062103"/>
           </a:xfrm>
           <a:prstGeom prst="rect">
             <a:avLst/>
@@ -17997,7 +21425,7 @@
               <a:buFont typeface="Arial" panose="020B0604020202020204" pitchFamily="34" charset="0"/>
               <a:buChar char="•"/>
             </a:pPr>
-            <a:endParaRPr lang="en-US" i="1" dirty="0">
+            <a:endParaRPr lang="en-US" sz="1600" dirty="0">
               <a:latin typeface="Times New Roman" panose="02020603050405020304" pitchFamily="18" charset="0"/>
               <a:cs typeface="Times New Roman" panose="02020603050405020304" pitchFamily="18" charset="0"/>
             </a:endParaRPr>
@@ -18008,13 +21436,13 @@
               <a:buChar char="•"/>
             </a:pPr>
             <a:r>
-              <a:rPr lang="en-US" i="1" dirty="0">
+              <a:rPr lang="en-US" sz="1600" dirty="0">
                 <a:latin typeface="Times New Roman" panose="02020603050405020304" pitchFamily="18" charset="0"/>
                 <a:cs typeface="Times New Roman" panose="02020603050405020304" pitchFamily="18" charset="0"/>
               </a:rPr>
               <a:t>In this context, the input image is sourced from the MNIST dataset, displaying the numeral '2'. Through a transformation, the image is converted into a sequence comprising 100 smaller sequences of pixels, encapsulating the core attributes of the handwritten '2'. While this sequence-based representation enables the model to discern similar pixel patterns indicative of the numeral '2', it's important to note potential limitations. Variations in writing styles, stroke thickness, or positioning within the image may result in diverse pixel sequences, potentially leading to misinterpretation. Consequently, even if representing the same digit, distinct pixel variations across different instances of '2' might not be correctly recognized as similar by the model, impacting its classification accuracy.</a:t>
             </a:r>
-            <a:endParaRPr lang="en-US" b="0" i="1" dirty="0">
+            <a:endParaRPr lang="en-US" sz="1600" b="0" dirty="0">
               <a:effectLst/>
               <a:latin typeface="Times New Roman" panose="02020603050405020304" pitchFamily="18" charset="0"/>
               <a:cs typeface="Times New Roman" panose="02020603050405020304" pitchFamily="18" charset="0"/>
@@ -18702,7 +22130,7 @@
         <p:spPr>
           <a:xfrm flipH="1">
             <a:off x="695648" y="5739627"/>
-            <a:ext cx="10261249" cy="923330"/>
+            <a:ext cx="10261249" cy="584775"/>
           </a:xfrm>
           <a:prstGeom prst="rect">
             <a:avLst/>
@@ -18723,14 +22151,14 @@
               <a:buChar char="•"/>
             </a:pPr>
             <a:r>
-              <a:rPr lang="en-US" i="1" dirty="0">
+              <a:rPr lang="en-US" sz="1600" dirty="0">
                 <a:effectLst/>
                 <a:latin typeface="Times New Roman" panose="02020603050405020304" pitchFamily="18" charset="0"/>
                 <a:cs typeface="Times New Roman" panose="02020603050405020304" pitchFamily="18" charset="0"/>
               </a:rPr>
               <a:t>Unit tests have been integrated to address specific scenarios. All the unit tests created for the HTM Classifier have been applied to this classifier as well. During the model's testing phase, no instances of test failures have been identified.</a:t>
             </a:r>
-            <a:endParaRPr lang="en-US" i="1" dirty="0">
+            <a:endParaRPr lang="en-US" sz="1600" dirty="0">
               <a:latin typeface="Times New Roman" panose="02020603050405020304" pitchFamily="18" charset="0"/>
               <a:cs typeface="Times New Roman" panose="02020603050405020304" pitchFamily="18" charset="0"/>
             </a:endParaRPr>
@@ -19368,7 +22796,7 @@
         </p:spPr>
         <p:txBody>
           <a:bodyPr vert="horz" lIns="91440" tIns="45720" rIns="91440" bIns="45720" rtlCol="0" anchor="ctr">
-            <a:normAutofit lnSpcReduction="10000"/>
+            <a:normAutofit/>
           </a:bodyPr>
           <a:lstStyle/>
           <a:p>
@@ -19381,7 +22809,7 @@
               </a:spcAft>
             </a:pPr>
             <a:r>
-              <a:rPr lang="en-US" i="1" dirty="0">
+              <a:rPr lang="en-US" sz="1600" dirty="0">
                 <a:latin typeface="Times New Roman" panose="02020603050405020304" pitchFamily="18" charset="0"/>
                 <a:cs typeface="Times New Roman" panose="02020603050405020304" pitchFamily="18" charset="0"/>
               </a:rPr>
@@ -19397,7 +22825,7 @@
                 <a:spcPts val="600"/>
               </a:spcAft>
             </a:pPr>
-            <a:endParaRPr lang="en-US" i="1" dirty="0">
+            <a:endParaRPr lang="en-US" sz="1600" dirty="0">
               <a:latin typeface="Times New Roman" panose="02020603050405020304" pitchFamily="18" charset="0"/>
               <a:cs typeface="Times New Roman" panose="02020603050405020304" pitchFamily="18" charset="0"/>
             </a:endParaRPr>
@@ -19412,35 +22840,35 @@
               </a:spcAft>
             </a:pPr>
             <a:r>
-              <a:rPr lang="en-US" i="1" dirty="0">
+              <a:rPr lang="en-US" sz="1600" dirty="0">
                 <a:latin typeface="Times New Roman" panose="02020603050405020304" pitchFamily="18" charset="0"/>
                 <a:cs typeface="Times New Roman" panose="02020603050405020304" pitchFamily="18" charset="0"/>
               </a:rPr>
               <a:t>Notably, our model consistently achieves a remarkable </a:t>
             </a:r>
             <a:r>
-              <a:rPr lang="en-US" b="1" i="1" dirty="0">
+              <a:rPr lang="en-US" sz="1600" b="1" dirty="0">
                 <a:latin typeface="Times New Roman" panose="02020603050405020304" pitchFamily="18" charset="0"/>
                 <a:cs typeface="Times New Roman" panose="02020603050405020304" pitchFamily="18" charset="0"/>
               </a:rPr>
               <a:t>85.71% </a:t>
             </a:r>
             <a:r>
-              <a:rPr lang="en-US" i="1" dirty="0">
+              <a:rPr lang="en-US" sz="1600" dirty="0">
                 <a:latin typeface="Times New Roman" panose="02020603050405020304" pitchFamily="18" charset="0"/>
                 <a:cs typeface="Times New Roman" panose="02020603050405020304" pitchFamily="18" charset="0"/>
               </a:rPr>
               <a:t>accuracy rate across a diverse range of normal integer input data sequences, showcasing its robustness. Moreover, in the domain of image classification, the model demonstrates a commendable </a:t>
             </a:r>
             <a:r>
-              <a:rPr lang="en-US" b="1" i="1" dirty="0">
+              <a:rPr lang="en-US" sz="1600" b="1" dirty="0">
                 <a:latin typeface="Times New Roman" panose="02020603050405020304" pitchFamily="18" charset="0"/>
                 <a:cs typeface="Times New Roman" panose="02020603050405020304" pitchFamily="18" charset="0"/>
               </a:rPr>
               <a:t>65% </a:t>
             </a:r>
             <a:r>
-              <a:rPr lang="en-US" i="1" dirty="0">
+              <a:rPr lang="en-US" sz="1600" dirty="0">
                 <a:latin typeface="Times New Roman" panose="02020603050405020304" pitchFamily="18" charset="0"/>
                 <a:cs typeface="Times New Roman" panose="02020603050405020304" pitchFamily="18" charset="0"/>
               </a:rPr>
@@ -21171,7 +24599,7 @@
             <p:ph idx="1"/>
             <p:extLst>
               <p:ext uri="{D42A27DB-BD31-4B8C-83A1-F6EECF244321}">
-                <p14:modId xmlns:p14="http://schemas.microsoft.com/office/powerpoint/2010/main" val="3888218205"/>
+                <p14:modId xmlns:p14="http://schemas.microsoft.com/office/powerpoint/2010/main" val="2397458060"/>
               </p:ext>
             </p:extLst>
           </p:nvPr>
@@ -21630,7 +25058,7 @@
             <p:ph idx="1"/>
             <p:extLst>
               <p:ext uri="{D42A27DB-BD31-4B8C-83A1-F6EECF244321}">
-                <p14:modId xmlns:p14="http://schemas.microsoft.com/office/powerpoint/2010/main" val="1478154041"/>
+                <p14:modId xmlns:p14="http://schemas.microsoft.com/office/powerpoint/2010/main" val="873874762"/>
               </p:ext>
             </p:extLst>
           </p:nvPr>
@@ -22129,7 +25557,7 @@
               </a:lnSpc>
             </a:pPr>
             <a:r>
-              <a:rPr lang="en-US" sz="1800" b="0" i="1" u="none" strike="noStrike" kern="1200" cap="none" spc="0" baseline="0" dirty="0">
+              <a:rPr lang="en-US" sz="1600" b="0" u="none" strike="noStrike" kern="1200" cap="none" spc="0" baseline="0" dirty="0">
                 <a:uFillTx/>
                 <a:latin typeface="Times New Roman" pitchFamily="18"/>
                 <a:cs typeface="Times New Roman" pitchFamily="18"/>
@@ -22137,7 +25565,7 @@
               <a:t>Machine learning involves developing statistical models and algorithms that utilize the "</a:t>
             </a:r>
             <a:r>
-              <a:rPr lang="en-US" sz="1800" b="1" i="1" u="none" strike="noStrike" kern="1200" cap="none" spc="0" baseline="0" dirty="0">
+              <a:rPr lang="en-US" sz="1600" b="1" u="none" strike="noStrike" kern="1200" cap="none" spc="0" baseline="0" dirty="0">
                 <a:uFillTx/>
                 <a:latin typeface="Times New Roman" pitchFamily="18"/>
                 <a:cs typeface="Times New Roman" pitchFamily="18"/>
@@ -22145,7 +25573,7 @@
               <a:t>learn</a:t>
             </a:r>
             <a:r>
-              <a:rPr lang="en-US" sz="1800" b="0" i="1" u="none" strike="noStrike" kern="1200" cap="none" spc="0" baseline="0" dirty="0">
+              <a:rPr lang="en-US" sz="1600" b="0" u="none" strike="noStrike" kern="1200" cap="none" spc="0" baseline="0" dirty="0">
                 <a:uFillTx/>
                 <a:latin typeface="Times New Roman" pitchFamily="18"/>
                 <a:cs typeface="Times New Roman" pitchFamily="18"/>
@@ -23843,7 +27271,7 @@
           <a:p>
             <a:pPr algn="just"/>
             <a:r>
-              <a:rPr lang="en-US" sz="1800" i="1" dirty="0">
+              <a:rPr lang="en-US" sz="1600" dirty="0">
                 <a:effectLst/>
                 <a:latin typeface="Times New Roman" panose="02020603050405020304" pitchFamily="18" charset="0"/>
                 <a:cs typeface="Times New Roman" panose="02020603050405020304" pitchFamily="18" charset="0"/>
@@ -23857,7 +27285,7 @@
               <a:buAutoNum type="arabicPeriod"/>
             </a:pPr>
             <a:r>
-              <a:rPr lang="en-US" sz="1800" b="1" i="1" dirty="0">
+              <a:rPr lang="en-US" sz="1600" b="1" dirty="0">
                 <a:effectLst/>
                 <a:latin typeface="Times New Roman" panose="02020603050405020304" pitchFamily="18" charset="0"/>
                 <a:cs typeface="Times New Roman" panose="02020603050405020304" pitchFamily="18" charset="0"/>
@@ -23865,7 +27293,7 @@
               <a:t>K-value Selection:</a:t>
             </a:r>
             <a:r>
-              <a:rPr lang="en-US" sz="1800" i="1" dirty="0">
+              <a:rPr lang="en-US" sz="1600" dirty="0">
                 <a:effectLst/>
                 <a:latin typeface="Times New Roman" panose="02020603050405020304" pitchFamily="18" charset="0"/>
                 <a:cs typeface="Times New Roman" panose="02020603050405020304" pitchFamily="18" charset="0"/>
@@ -23879,7 +27307,7 @@
               <a:buAutoNum type="arabicPeriod"/>
             </a:pPr>
             <a:r>
-              <a:rPr lang="en-US" sz="1800" b="1" i="1" dirty="0">
+              <a:rPr lang="en-US" sz="1600" b="1" dirty="0">
                 <a:effectLst/>
                 <a:latin typeface="Times New Roman" panose="02020603050405020304" pitchFamily="18" charset="0"/>
                 <a:cs typeface="Times New Roman" panose="02020603050405020304" pitchFamily="18" charset="0"/>
@@ -23887,7 +27315,7 @@
               <a:t>Distance Calculations:</a:t>
             </a:r>
             <a:r>
-              <a:rPr lang="en-US" sz="1800" i="1" dirty="0">
+              <a:rPr lang="en-US" sz="1600" dirty="0">
                 <a:effectLst/>
                 <a:latin typeface="Times New Roman" panose="02020603050405020304" pitchFamily="18" charset="0"/>
                 <a:cs typeface="Times New Roman" panose="02020603050405020304" pitchFamily="18" charset="0"/>
@@ -23900,7 +27328,7 @@
               <a:buFont typeface="+mj-lt"/>
               <a:buAutoNum type="arabicPeriod"/>
             </a:pPr>
-            <a:endParaRPr lang="en-US" sz="1800" i="1" dirty="0">
+            <a:endParaRPr lang="en-US" sz="1600" dirty="0">
               <a:effectLst/>
               <a:latin typeface="Times New Roman" panose="02020603050405020304" pitchFamily="18" charset="0"/>
               <a:cs typeface="Times New Roman" panose="02020603050405020304" pitchFamily="18" charset="0"/>
@@ -23911,7 +27339,7 @@
               <a:buFont typeface="+mj-lt"/>
               <a:buAutoNum type="arabicPeriod"/>
             </a:pPr>
-            <a:endParaRPr lang="en-US" sz="1800" i="1" dirty="0">
+            <a:endParaRPr lang="en-US" sz="1600" dirty="0">
               <a:effectLst/>
               <a:latin typeface="Times New Roman" panose="02020603050405020304" pitchFamily="18" charset="0"/>
               <a:cs typeface="Times New Roman" panose="02020603050405020304" pitchFamily="18" charset="0"/>
@@ -23922,7 +27350,7 @@
               <a:buFont typeface="+mj-lt"/>
               <a:buAutoNum type="arabicPeriod"/>
             </a:pPr>
-            <a:endParaRPr lang="en-US" sz="1800" i="1" dirty="0">
+            <a:endParaRPr lang="en-US" sz="1600" dirty="0">
               <a:effectLst/>
               <a:latin typeface="Times New Roman" panose="02020603050405020304" pitchFamily="18" charset="0"/>
               <a:cs typeface="Times New Roman" panose="02020603050405020304" pitchFamily="18" charset="0"/>
@@ -23934,7 +27362,7 @@
               <a:buAutoNum type="arabicPeriod"/>
             </a:pPr>
             <a:r>
-              <a:rPr lang="en-US" sz="1800" b="1" i="1" dirty="0">
+              <a:rPr lang="en-US" sz="1600" b="1" dirty="0">
                 <a:effectLst/>
                 <a:latin typeface="Times New Roman" panose="02020603050405020304" pitchFamily="18" charset="0"/>
                 <a:cs typeface="Times New Roman" panose="02020603050405020304" pitchFamily="18" charset="0"/>
@@ -23942,7 +27370,7 @@
               <a:t>Weightage Mechanism: </a:t>
             </a:r>
             <a:r>
-              <a:rPr lang="en-US" sz="1800" i="1" dirty="0">
+              <a:rPr lang="en-US" sz="1600" dirty="0">
                 <a:effectLst/>
                 <a:latin typeface="Times New Roman" panose="02020603050405020304" pitchFamily="18" charset="0"/>
                 <a:cs typeface="Times New Roman" panose="02020603050405020304" pitchFamily="18" charset="0"/>
@@ -23951,9 +27379,30 @@
             </a:r>
           </a:p>
           <a:p>
+            <a:pPr algn="just">
+              <a:buFont typeface="+mj-lt"/>
+              <a:buAutoNum type="arabicPeriod"/>
+            </a:pPr>
+            <a:endParaRPr lang="en-US" sz="1600" dirty="0">
+              <a:latin typeface="Times New Roman" panose="02020603050405020304" pitchFamily="18" charset="0"/>
+              <a:cs typeface="Times New Roman" panose="02020603050405020304" pitchFamily="18" charset="0"/>
+            </a:endParaRPr>
+          </a:p>
+          <a:p>
+            <a:pPr algn="just">
+              <a:buFont typeface="+mj-lt"/>
+              <a:buAutoNum type="arabicPeriod"/>
+            </a:pPr>
+            <a:endParaRPr lang="en-US" sz="1600" dirty="0">
+              <a:effectLst/>
+              <a:latin typeface="Times New Roman" panose="02020603050405020304" pitchFamily="18" charset="0"/>
+              <a:cs typeface="Times New Roman" panose="02020603050405020304" pitchFamily="18" charset="0"/>
+            </a:endParaRPr>
+          </a:p>
+          <a:p>
             <a:pPr algn="just"/>
             <a:r>
-              <a:rPr lang="en-US" sz="1800" i="1" dirty="0">
+              <a:rPr lang="en-US" sz="1600" dirty="0">
                 <a:effectLst/>
                 <a:latin typeface="Times New Roman" panose="02020603050405020304" pitchFamily="18" charset="0"/>
                 <a:cs typeface="Times New Roman" panose="02020603050405020304" pitchFamily="18" charset="0"/>
@@ -23963,7 +27412,7 @@
           </a:p>
           <a:p>
             <a:pPr algn="just"/>
-            <a:endParaRPr lang="en-IN" sz="1800" i="1" dirty="0">
+            <a:endParaRPr lang="en-IN" sz="1600" dirty="0">
               <a:latin typeface="Times New Roman" panose="02020603050405020304" pitchFamily="18" charset="0"/>
               <a:cs typeface="Times New Roman" panose="02020603050405020304" pitchFamily="18" charset="0"/>
             </a:endParaRPr>
@@ -24017,10 +27466,10 @@
       </p:pic>
       <p:pic>
         <p:nvPicPr>
-          <p:cNvPr id="17" name="Picture 16">
+          <p:cNvPr id="13" name="Picture 12">
             <a:extLst>
               <a:ext uri="{FF2B5EF4-FFF2-40B4-BE49-F238E27FC236}">
-                <a16:creationId xmlns:a16="http://schemas.microsoft.com/office/drawing/2014/main" id="{6501D045-6071-8918-AB78-EA346F61E2D7}"/>
+                <a16:creationId xmlns:a16="http://schemas.microsoft.com/office/drawing/2014/main" id="{45A52717-77A3-747C-9E75-6AFC05442A7E}"/>
               </a:ext>
             </a:extLst>
           </p:cNvPr>
@@ -24037,8 +27486,8 @@
         </p:blipFill>
         <p:spPr>
           <a:xfrm>
-            <a:off x="1879987" y="3995067"/>
-            <a:ext cx="4422085" cy="441024"/>
+            <a:off x="3407252" y="5162404"/>
+            <a:ext cx="4003150" cy="617573"/>
           </a:xfrm>
           <a:prstGeom prst="rect">
             <a:avLst/>
@@ -24047,32 +27496,49 @@
       </p:pic>
       <p:pic>
         <p:nvPicPr>
-          <p:cNvPr id="13" name="Picture 12">
+          <p:cNvPr id="1026" name="Picture 2" descr="kNN">
             <a:extLst>
               <a:ext uri="{FF2B5EF4-FFF2-40B4-BE49-F238E27FC236}">
-                <a16:creationId xmlns:a16="http://schemas.microsoft.com/office/drawing/2014/main" id="{45A52717-77A3-747C-9E75-6AFC05442A7E}"/>
+                <a16:creationId xmlns:a16="http://schemas.microsoft.com/office/drawing/2014/main" id="{452F1138-73FB-D5B8-51F2-CE2DAD095EF6}"/>
               </a:ext>
             </a:extLst>
           </p:cNvPr>
           <p:cNvPicPr>
-            <a:picLocks noChangeAspect="1"/>
+            <a:picLocks noChangeAspect="1" noChangeArrowheads="1"/>
           </p:cNvPicPr>
           <p:nvPr/>
         </p:nvPicPr>
         <p:blipFill>
-          <a:blip r:embed="rId4"/>
+          <a:blip r:embed="rId4">
+            <a:extLst>
+              <a:ext uri="{28A0092B-C50C-407E-A947-70E740481C1C}">
+                <a14:useLocalDpi xmlns:a14="http://schemas.microsoft.com/office/drawing/2010/main" val="0"/>
+              </a:ext>
+            </a:extLst>
+          </a:blip>
+          <a:srcRect/>
           <a:stretch>
             <a:fillRect/>
           </a:stretch>
         </p:blipFill>
-        <p:spPr>
+        <p:spPr bwMode="auto">
           <a:xfrm>
-            <a:off x="6667943" y="3906793"/>
-            <a:ext cx="4003150" cy="617573"/>
+            <a:off x="3753071" y="3363816"/>
+            <a:ext cx="3311511" cy="807305"/>
           </a:xfrm>
           <a:prstGeom prst="rect">
             <a:avLst/>
           </a:prstGeom>
+          <a:noFill/>
+          <a:extLst>
+            <a:ext uri="{909E8E84-426E-40DD-AFC4-6F175D3DCCD1}">
+              <a14:hiddenFill xmlns:a14="http://schemas.microsoft.com/office/drawing/2010/main">
+                <a:solidFill>
+                  <a:srgbClr val="FFFFFF"/>
+                </a:solidFill>
+              </a14:hiddenFill>
+            </a:ext>
+          </a:extLst>
         </p:spPr>
       </p:pic>
     </p:spTree>
@@ -26526,8 +29992,8 @@
         </p:nvSpPr>
         <p:spPr>
           <a:xfrm>
-            <a:off x="855518" y="5916886"/>
-            <a:ext cx="9966207" cy="923330"/>
+            <a:off x="845279" y="6025187"/>
+            <a:ext cx="9966207" cy="584775"/>
           </a:xfrm>
           <a:prstGeom prst="rect">
             <a:avLst/>
@@ -26548,28 +30014,28 @@
               <a:buChar char="•"/>
             </a:pPr>
             <a:r>
-              <a:rPr lang="en-US" i="1" dirty="0">
+              <a:rPr lang="en-US" sz="1600" dirty="0">
                 <a:latin typeface="Times New Roman" panose="02020603050405020304" pitchFamily="18" charset="0"/>
                 <a:cs typeface="Times New Roman" panose="02020603050405020304" pitchFamily="18" charset="0"/>
               </a:rPr>
               <a:t>The model takes in Input data from </a:t>
             </a:r>
             <a:r>
-              <a:rPr lang="en-US" b="1" i="1" dirty="0" err="1">
+              <a:rPr lang="en-US" sz="1600" b="1" dirty="0" err="1">
                 <a:latin typeface="Times New Roman" panose="02020603050405020304" pitchFamily="18" charset="0"/>
                 <a:cs typeface="Times New Roman" panose="02020603050405020304" pitchFamily="18" charset="0"/>
               </a:rPr>
               <a:t>RunMultiSequenceLearningExperiment</a:t>
             </a:r>
             <a:r>
-              <a:rPr lang="en-US" b="1" i="1" dirty="0">
+              <a:rPr lang="en-US" sz="1600" b="1" dirty="0">
                 <a:latin typeface="Times New Roman" panose="02020603050405020304" pitchFamily="18" charset="0"/>
                 <a:cs typeface="Times New Roman" panose="02020603050405020304" pitchFamily="18" charset="0"/>
               </a:rPr>
               <a:t>()</a:t>
             </a:r>
             <a:r>
-              <a:rPr lang="en-US" i="1" dirty="0">
+              <a:rPr lang="en-US" sz="1600" dirty="0">
                 <a:latin typeface="Times New Roman" panose="02020603050405020304" pitchFamily="18" charset="0"/>
                 <a:cs typeface="Times New Roman" panose="02020603050405020304" pitchFamily="18" charset="0"/>
               </a:rPr>

</xml_diff>